<commit_message>
php view added to powerpoint
</commit_message>
<xml_diff>
--- a/Deliverable_5.pptx
+++ b/Deliverable_5.pptx
@@ -13,13 +13,14 @@
     <p:sldId id="261" r:id="rId7"/>
     <p:sldId id="262" r:id="rId8"/>
     <p:sldId id="263" r:id="rId9"/>
-    <p:sldId id="264" r:id="rId10"/>
-    <p:sldId id="265" r:id="rId11"/>
-    <p:sldId id="266" r:id="rId12"/>
-    <p:sldId id="267" r:id="rId13"/>
-    <p:sldId id="268" r:id="rId14"/>
-    <p:sldId id="269" r:id="rId15"/>
-    <p:sldId id="270" r:id="rId16"/>
+    <p:sldId id="271" r:id="rId10"/>
+    <p:sldId id="264" r:id="rId11"/>
+    <p:sldId id="265" r:id="rId12"/>
+    <p:sldId id="266" r:id="rId13"/>
+    <p:sldId id="267" r:id="rId14"/>
+    <p:sldId id="268" r:id="rId15"/>
+    <p:sldId id="269" r:id="rId16"/>
+    <p:sldId id="270" r:id="rId17"/>
   </p:sldIdLst>
   <p:sldSz cx="9144000" cy="6858000" type="screen4x3"/>
   <p:notesSz cx="6858000" cy="9144000"/>
@@ -5460,40 +5461,70 @@
           <a:p>
             <a:pPr algn="ctr"/>
             <a:r>
+              <a:rPr lang="fr-CA" dirty="0" err="1" smtClean="0"/>
+              <a:t>Testing</a:t>
+            </a:r>
+            <a:endParaRPr lang="fr-CA" dirty="0"/>
+          </a:p>
+        </p:txBody>
+      </p:sp>
+      <p:sp>
+        <p:nvSpPr>
+          <p:cNvPr id="3" name="Content Placeholder 2"/>
+          <p:cNvSpPr>
+            <a:spLocks noGrp="1"/>
+          </p:cNvSpPr>
+          <p:nvPr>
+            <p:ph idx="1"/>
+          </p:nvPr>
+        </p:nvSpPr>
+        <p:spPr/>
+        <p:txBody>
+          <a:bodyPr/>
+          <a:lstStyle/>
+          <a:p>
+            <a:r>
               <a:rPr lang="fr-CA" dirty="0" smtClean="0"/>
-              <a:t>Release Pipeline</a:t>
+              <a:t>TO BE DONE TOMORROW</a:t>
             </a:r>
             <a:endParaRPr lang="fr-CA" dirty="0"/>
           </a:p>
         </p:txBody>
       </p:sp>
-      <p:sp>
-        <p:nvSpPr>
-          <p:cNvPr id="3" name="Content Placeholder 2"/>
-          <p:cNvSpPr>
-            <a:spLocks noGrp="1"/>
-          </p:cNvSpPr>
-          <p:nvPr>
-            <p:ph idx="1"/>
-          </p:nvPr>
-        </p:nvSpPr>
-        <p:spPr/>
-        <p:txBody>
-          <a:bodyPr/>
-          <a:lstStyle/>
-          <a:p>
-            <a:r>
-              <a:rPr lang="fr-CA" dirty="0" smtClean="0"/>
-              <a:t>TBD TOMORROW</a:t>
-            </a:r>
-            <a:endParaRPr lang="fr-CA" dirty="0"/>
-          </a:p>
-        </p:txBody>
-      </p:sp>
+      <p:pic>
+        <p:nvPicPr>
+          <p:cNvPr id="5" name="Picture 4" descr="Screen Shot 2016-11-26 at 11.15.32 PM.png"/>
+          <p:cNvPicPr>
+            <a:picLocks noChangeAspect="1"/>
+          </p:cNvPicPr>
+          <p:nvPr/>
+        </p:nvPicPr>
+        <p:blipFill>
+          <a:blip r:embed="rId2">
+            <a:extLst>
+              <a:ext uri="{28A0092B-C50C-407E-A947-70E740481C1C}">
+                <a14:useLocalDpi xmlns:a14="http://schemas.microsoft.com/office/drawing/2010/main" val="0"/>
+              </a:ext>
+            </a:extLst>
+          </a:blip>
+          <a:stretch>
+            <a:fillRect/>
+          </a:stretch>
+        </p:blipFill>
+        <p:spPr>
+          <a:xfrm>
+            <a:off x="4184316" y="2954421"/>
+            <a:ext cx="4716692" cy="3168316"/>
+          </a:xfrm>
+          <a:prstGeom prst="rect">
+            <a:avLst/>
+          </a:prstGeom>
+        </p:spPr>
+      </p:pic>
     </p:spTree>
     <p:extLst>
       <p:ext uri="{BB962C8B-B14F-4D97-AF65-F5344CB8AC3E}">
-        <p14:creationId xmlns:p14="http://schemas.microsoft.com/office/powerpoint/2010/main" val="1399793637"/>
+        <p14:creationId xmlns:p14="http://schemas.microsoft.com/office/powerpoint/2010/main" val="3555963502"/>
       </p:ext>
     </p:extLst>
   </p:cSld>
@@ -5537,6 +5568,90 @@
             <p:ph type="title"/>
           </p:nvPr>
         </p:nvSpPr>
+        <p:spPr/>
+        <p:txBody>
+          <a:bodyPr/>
+          <a:lstStyle/>
+          <a:p>
+            <a:pPr algn="ctr"/>
+            <a:r>
+              <a:rPr lang="fr-CA" dirty="0" smtClean="0"/>
+              <a:t>Release Pipeline</a:t>
+            </a:r>
+            <a:endParaRPr lang="fr-CA" dirty="0"/>
+          </a:p>
+        </p:txBody>
+      </p:sp>
+      <p:sp>
+        <p:nvSpPr>
+          <p:cNvPr id="3" name="Content Placeholder 2"/>
+          <p:cNvSpPr>
+            <a:spLocks noGrp="1"/>
+          </p:cNvSpPr>
+          <p:nvPr>
+            <p:ph idx="1"/>
+          </p:nvPr>
+        </p:nvSpPr>
+        <p:spPr/>
+        <p:txBody>
+          <a:bodyPr/>
+          <a:lstStyle/>
+          <a:p>
+            <a:r>
+              <a:rPr lang="fr-CA" dirty="0" smtClean="0"/>
+              <a:t>TBD TOMORROW</a:t>
+            </a:r>
+            <a:endParaRPr lang="fr-CA" dirty="0"/>
+          </a:p>
+        </p:txBody>
+      </p:sp>
+    </p:spTree>
+    <p:extLst>
+      <p:ext uri="{BB962C8B-B14F-4D97-AF65-F5344CB8AC3E}">
+        <p14:creationId xmlns:p14="http://schemas.microsoft.com/office/powerpoint/2010/main" val="1399793637"/>
+      </p:ext>
+    </p:extLst>
+  </p:cSld>
+  <p:clrMapOvr>
+    <a:masterClrMapping/>
+  </p:clrMapOvr>
+  <p:timing>
+    <p:tnLst>
+      <p:par>
+        <p:cTn xmlns:p14="http://schemas.microsoft.com/office/powerpoint/2010/main" id="1" dur="indefinite" restart="never" nodeType="tmRoot"/>
+      </p:par>
+    </p:tnLst>
+  </p:timing>
+</p:sld>
+</file>
+
+<file path=ppt/slides/slide12.xml><?xml version="1.0" encoding="utf-8"?>
+<p:sld xmlns:a="http://schemas.openxmlformats.org/drawingml/2006/main" xmlns:r="http://schemas.openxmlformats.org/officeDocument/2006/relationships" xmlns:p="http://schemas.openxmlformats.org/presentationml/2006/main">
+  <p:cSld>
+    <p:spTree>
+      <p:nvGrpSpPr>
+        <p:cNvPr id="1" name=""/>
+        <p:cNvGrpSpPr/>
+        <p:nvPr/>
+      </p:nvGrpSpPr>
+      <p:grpSpPr>
+        <a:xfrm>
+          <a:off x="0" y="0"/>
+          <a:ext cx="0" cy="0"/>
+          <a:chOff x="0" y="0"/>
+          <a:chExt cx="0" cy="0"/>
+        </a:xfrm>
+      </p:grpSpPr>
+      <p:sp>
+        <p:nvSpPr>
+          <p:cNvPr id="2" name="Title 1"/>
+          <p:cNvSpPr>
+            <a:spLocks noGrp="1"/>
+          </p:cNvSpPr>
+          <p:nvPr>
+            <p:ph type="title"/>
+          </p:nvPr>
+        </p:nvSpPr>
         <p:spPr>
           <a:xfrm>
             <a:off x="415925" y="1276566"/>
@@ -5610,7 +5725,7 @@
 </p:sld>
 </file>
 
-<file path=ppt/slides/slide12.xml><?xml version="1.0" encoding="utf-8"?>
+<file path=ppt/slides/slide13.xml><?xml version="1.0" encoding="utf-8"?>
 <p:sld xmlns:a="http://schemas.openxmlformats.org/drawingml/2006/main" xmlns:r="http://schemas.openxmlformats.org/officeDocument/2006/relationships" xmlns:p="http://schemas.openxmlformats.org/presentationml/2006/main">
   <p:cSld>
     <p:spTree>
@@ -5772,7 +5887,7 @@
 </p:sld>
 </file>
 
-<file path=ppt/slides/slide13.xml><?xml version="1.0" encoding="utf-8"?>
+<file path=ppt/slides/slide14.xml><?xml version="1.0" encoding="utf-8"?>
 <p:sld xmlns:a="http://schemas.openxmlformats.org/drawingml/2006/main" xmlns:r="http://schemas.openxmlformats.org/officeDocument/2006/relationships" xmlns:p="http://schemas.openxmlformats.org/presentationml/2006/main">
   <p:cSld>
     <p:spTree>
@@ -5953,7 +6068,7 @@
 </p:sld>
 </file>
 
-<file path=ppt/slides/slide14.xml><?xml version="1.0" encoding="utf-8"?>
+<file path=ppt/slides/slide15.xml><?xml version="1.0" encoding="utf-8"?>
 <p:sld xmlns:a="http://schemas.openxmlformats.org/drawingml/2006/main" xmlns:r="http://schemas.openxmlformats.org/officeDocument/2006/relationships" xmlns:p="http://schemas.openxmlformats.org/presentationml/2006/main">
   <p:cSld>
     <p:spTree>
@@ -6119,7 +6234,7 @@
 </p:sld>
 </file>
 
-<file path=ppt/slides/slide15.xml><?xml version="1.0" encoding="utf-8"?>
+<file path=ppt/slides/slide16.xml><?xml version="1.0" encoding="utf-8"?>
 <p:sld xmlns:a="http://schemas.openxmlformats.org/drawingml/2006/main" xmlns:r="http://schemas.openxmlformats.org/officeDocument/2006/relationships" xmlns:p="http://schemas.openxmlformats.org/presentationml/2006/main">
   <p:cSld>
     <p:spTree>
@@ -7303,31 +7418,12 @@
           <a:p>
             <a:pPr algn="ctr"/>
             <a:r>
+              <a:rPr lang="fr-CA" dirty="0" smtClean="0"/>
+              <a:t>Browser </a:t>
+            </a:r>
+            <a:r>
               <a:rPr lang="fr-CA" dirty="0" err="1" smtClean="0"/>
-              <a:t>Testing</a:t>
-            </a:r>
-            <a:endParaRPr lang="fr-CA" dirty="0"/>
-          </a:p>
-        </p:txBody>
-      </p:sp>
-      <p:sp>
-        <p:nvSpPr>
-          <p:cNvPr id="3" name="Content Placeholder 2"/>
-          <p:cNvSpPr>
-            <a:spLocks noGrp="1"/>
-          </p:cNvSpPr>
-          <p:nvPr>
-            <p:ph idx="1"/>
-          </p:nvPr>
-        </p:nvSpPr>
-        <p:spPr/>
-        <p:txBody>
-          <a:bodyPr/>
-          <a:lstStyle/>
-          <a:p>
-            <a:r>
-              <a:rPr lang="fr-CA" dirty="0" smtClean="0"/>
-              <a:t>TO BE DONE TOMORROW</a:t>
+              <a:t>View</a:t>
             </a:r>
             <a:endParaRPr lang="fr-CA" dirty="0"/>
           </a:p>
@@ -7335,7 +7431,7 @@
       </p:sp>
       <p:pic>
         <p:nvPicPr>
-          <p:cNvPr id="5" name="Picture 4" descr="Screen Shot 2016-11-26 at 11.15.32 PM.png"/>
+          <p:cNvPr id="4" name="Picture 3" descr="Screen Shot 2016-11-27 at 3.00.42 PM.png"/>
           <p:cNvPicPr>
             <a:picLocks noChangeAspect="1"/>
           </p:cNvPicPr>
@@ -7355,8 +7451,38 @@
         </p:blipFill>
         <p:spPr>
           <a:xfrm>
-            <a:off x="4184316" y="2954421"/>
-            <a:ext cx="4716692" cy="3168316"/>
+            <a:off x="213895" y="2599764"/>
+            <a:ext cx="4956451" cy="3750235"/>
+          </a:xfrm>
+          <a:prstGeom prst="rect">
+            <a:avLst/>
+          </a:prstGeom>
+        </p:spPr>
+      </p:pic>
+      <p:pic>
+        <p:nvPicPr>
+          <p:cNvPr id="5" name="Picture 4" descr="Screen Shot 2016-11-27 at 3.00.55 PM.png"/>
+          <p:cNvPicPr>
+            <a:picLocks noChangeAspect="1"/>
+          </p:cNvPicPr>
+          <p:nvPr/>
+        </p:nvPicPr>
+        <p:blipFill>
+          <a:blip r:embed="rId3">
+            <a:extLst>
+              <a:ext uri="{28A0092B-C50C-407E-A947-70E740481C1C}">
+                <a14:useLocalDpi xmlns:a14="http://schemas.microsoft.com/office/drawing/2010/main" val="0"/>
+              </a:ext>
+            </a:extLst>
+          </a:blip>
+          <a:stretch>
+            <a:fillRect/>
+          </a:stretch>
+        </p:blipFill>
+        <p:spPr>
+          <a:xfrm>
+            <a:off x="5170346" y="2599765"/>
+            <a:ext cx="2500156" cy="3750234"/>
           </a:xfrm>
           <a:prstGeom prst="rect">
             <a:avLst/>
@@ -7366,20 +7492,13 @@
     </p:spTree>
     <p:extLst>
       <p:ext uri="{BB962C8B-B14F-4D97-AF65-F5344CB8AC3E}">
-        <p14:creationId xmlns:p14="http://schemas.microsoft.com/office/powerpoint/2010/main" val="3555963502"/>
+        <p14:creationId xmlns:p14="http://schemas.microsoft.com/office/powerpoint/2010/main" val="2832419295"/>
       </p:ext>
     </p:extLst>
   </p:cSld>
   <p:clrMapOvr>
     <a:masterClrMapping/>
   </p:clrMapOvr>
-  <p:timing>
-    <p:tnLst>
-      <p:par>
-        <p:cTn xmlns:p14="http://schemas.microsoft.com/office/powerpoint/2010/main" id="1" dur="indefinite" restart="never" nodeType="tmRoot"/>
-      </p:par>
-    </p:tnLst>
-  </p:timing>
 </p:sld>
 </file>
 

</xml_diff>

<commit_message>
added slides for testing
</commit_message>
<xml_diff>
--- a/Deliverable_5.pptx
+++ b/Deliverable_5.pptx
@@ -15,12 +15,13 @@
     <p:sldId id="263" r:id="rId9"/>
     <p:sldId id="271" r:id="rId10"/>
     <p:sldId id="264" r:id="rId11"/>
-    <p:sldId id="265" r:id="rId12"/>
-    <p:sldId id="266" r:id="rId13"/>
-    <p:sldId id="267" r:id="rId14"/>
-    <p:sldId id="268" r:id="rId15"/>
-    <p:sldId id="269" r:id="rId16"/>
-    <p:sldId id="270" r:id="rId17"/>
+    <p:sldId id="272" r:id="rId12"/>
+    <p:sldId id="265" r:id="rId13"/>
+    <p:sldId id="266" r:id="rId14"/>
+    <p:sldId id="267" r:id="rId15"/>
+    <p:sldId id="268" r:id="rId16"/>
+    <p:sldId id="269" r:id="rId17"/>
+    <p:sldId id="270" r:id="rId18"/>
   </p:sldIdLst>
   <p:sldSz cx="9144000" cy="6858000" type="screen4x3"/>
   <p:notesSz cx="6858000" cy="9144000"/>
@@ -119,6 +120,22 @@
       </a:defRPr>
     </a:lvl9pPr>
   </p:defaultTextStyle>
+  <p:extLst>
+    <p:ext uri="{EFAFB233-063F-42B5-8137-9DF3F51BA10A}">
+      <p15:sldGuideLst xmlns:p15="http://schemas.microsoft.com/office/powerpoint/2012/main">
+        <p15:guide id="1" orient="horz" pos="2160">
+          <p15:clr>
+            <a:srgbClr val="A4A3A4"/>
+          </p15:clr>
+        </p15:guide>
+        <p15:guide id="2" pos="2880">
+          <p15:clr>
+            <a:srgbClr val="A4A3A4"/>
+          </p15:clr>
+        </p15:guide>
+      </p15:sldGuideLst>
+    </p:ext>
+  </p:extLst>
 </p:presentation>
 </file>
 
@@ -346,7 +363,7 @@
           <a:p>
             <a:fld id="{7CE38E4D-051A-41E1-86A4-E56916468FD0}" type="datetimeFigureOut">
               <a:rPr lang="en-US" smtClean="0"/>
-              <a:t>2016-11-27</a:t>
+              <a:t>11/27/16</a:t>
             </a:fld>
             <a:endParaRPr lang="en-US"/>
           </a:p>
@@ -680,7 +697,7 @@
           <a:p>
             <a:fld id="{7CE38E4D-051A-41E1-86A4-E56916468FD0}" type="datetimeFigureOut">
               <a:rPr lang="en-US" smtClean="0"/>
-              <a:t>2016-11-27</a:t>
+              <a:t>11/27/16</a:t>
             </a:fld>
             <a:endParaRPr lang="en-US"/>
           </a:p>
@@ -919,7 +936,7 @@
           <a:p>
             <a:fld id="{7CE38E4D-051A-41E1-86A4-E56916468FD0}" type="datetimeFigureOut">
               <a:rPr lang="en-US" smtClean="0"/>
-              <a:t>2016-11-27</a:t>
+              <a:t>11/27/16</a:t>
             </a:fld>
             <a:endParaRPr lang="en-US"/>
           </a:p>
@@ -1219,7 +1236,7 @@
           <a:p>
             <a:fld id="{7CE38E4D-051A-41E1-86A4-E56916468FD0}" type="datetimeFigureOut">
               <a:rPr lang="en-US" smtClean="0"/>
-              <a:t>2016-11-27</a:t>
+              <a:t>11/27/16</a:t>
             </a:fld>
             <a:endParaRPr lang="en-US"/>
           </a:p>
@@ -1435,7 +1452,7 @@
           <a:p>
             <a:fld id="{7CE38E4D-051A-41E1-86A4-E56916468FD0}" type="datetimeFigureOut">
               <a:rPr lang="en-US" smtClean="0"/>
-              <a:t>2016-11-27</a:t>
+              <a:t>11/27/16</a:t>
             </a:fld>
             <a:endParaRPr lang="en-US"/>
           </a:p>
@@ -1795,7 +1812,7 @@
           <a:p>
             <a:fld id="{7CE38E4D-051A-41E1-86A4-E56916468FD0}" type="datetimeFigureOut">
               <a:rPr lang="en-US" smtClean="0"/>
-              <a:t>2016-11-27</a:t>
+              <a:t>11/27/16</a:t>
             </a:fld>
             <a:endParaRPr lang="en-US"/>
           </a:p>
@@ -2062,7 +2079,7 @@
           <a:p>
             <a:fld id="{7CE38E4D-051A-41E1-86A4-E56916468FD0}" type="datetimeFigureOut">
               <a:rPr lang="en-US" smtClean="0"/>
-              <a:t>2016-11-27</a:t>
+              <a:t>11/27/16</a:t>
             </a:fld>
             <a:endParaRPr lang="en-US"/>
           </a:p>
@@ -2152,7 +2169,7 @@
           <a:p>
             <a:fld id="{7CE38E4D-051A-41E1-86A4-E56916468FD0}" type="datetimeFigureOut">
               <a:rPr lang="en-US" smtClean="0"/>
-              <a:t>2016-11-27</a:t>
+              <a:t>11/27/16</a:t>
             </a:fld>
             <a:endParaRPr lang="en-US"/>
           </a:p>
@@ -2453,7 +2470,7 @@
           <a:p>
             <a:fld id="{7CE38E4D-051A-41E1-86A4-E56916468FD0}" type="datetimeFigureOut">
               <a:rPr lang="en-US" smtClean="0"/>
-              <a:t>2016-11-27</a:t>
+              <a:t>11/27/16</a:t>
             </a:fld>
             <a:endParaRPr lang="en-US"/>
           </a:p>
@@ -2759,7 +2776,7 @@
           <a:p>
             <a:fld id="{7CE38E4D-051A-41E1-86A4-E56916468FD0}" type="datetimeFigureOut">
               <a:rPr lang="en-US" smtClean="0"/>
-              <a:t>2016-11-27</a:t>
+              <a:t>11/27/16</a:t>
             </a:fld>
             <a:endParaRPr lang="en-US"/>
           </a:p>
@@ -3039,7 +3056,7 @@
           <a:p>
             <a:fld id="{7CE38E4D-051A-41E1-86A4-E56916468FD0}" type="datetimeFigureOut">
               <a:rPr lang="en-US" smtClean="0"/>
-              <a:t>2016-11-27</a:t>
+              <a:t>11/27/16</a:t>
             </a:fld>
             <a:endParaRPr lang="en-US"/>
           </a:p>
@@ -3447,7 +3464,7 @@
           <a:p>
             <a:fld id="{7CE38E4D-051A-41E1-86A4-E56916468FD0}" type="datetimeFigureOut">
               <a:rPr lang="en-US" smtClean="0"/>
-              <a:t>2016-11-27</a:t>
+              <a:t>11/27/16</a:t>
             </a:fld>
             <a:endParaRPr lang="en-US"/>
           </a:p>
@@ -4007,7 +4024,7 @@
           <a:p>
             <a:fld id="{7CE38E4D-051A-41E1-86A4-E56916468FD0}" type="datetimeFigureOut">
               <a:rPr lang="en-US" smtClean="0"/>
-              <a:t>2016-11-27</a:t>
+              <a:t>11/27/16</a:t>
             </a:fld>
             <a:endParaRPr lang="en-US"/>
           </a:p>
@@ -4155,7 +4172,7 @@
           <a:p>
             <a:fld id="{7CE38E4D-051A-41E1-86A4-E56916468FD0}" type="datetimeFigureOut">
               <a:rPr lang="en-US" smtClean="0"/>
-              <a:t>2016-11-27</a:t>
+              <a:t>11/27/16</a:t>
             </a:fld>
             <a:endParaRPr lang="en-US"/>
           </a:p>
@@ -4245,7 +4262,7 @@
           <a:p>
             <a:fld id="{7CE38E4D-051A-41E1-86A4-E56916468FD0}" type="datetimeFigureOut">
               <a:rPr lang="en-US" smtClean="0"/>
-              <a:t>2016-11-27</a:t>
+              <a:t>11/27/16</a:t>
             </a:fld>
             <a:endParaRPr lang="en-US"/>
           </a:p>
@@ -4587,7 +4604,7 @@
           <a:p>
             <a:fld id="{7CE38E4D-051A-41E1-86A4-E56916468FD0}" type="datetimeFigureOut">
               <a:rPr lang="en-US" smtClean="0"/>
-              <a:t>2016-11-27</a:t>
+              <a:t>11/27/16</a:t>
             </a:fld>
             <a:endParaRPr lang="en-US"/>
           </a:p>
@@ -4796,7 +4813,7 @@
           <a:p>
             <a:fld id="{7CE38E4D-051A-41E1-86A4-E56916468FD0}" type="datetimeFigureOut">
               <a:rPr lang="en-US" smtClean="0"/>
-              <a:t>2016-11-27</a:t>
+              <a:t>11/27/16</a:t>
             </a:fld>
             <a:endParaRPr lang="en-US"/>
           </a:p>
@@ -5420,7 +5437,7 @@
   <p:timing>
     <p:tnLst>
       <p:par>
-        <p:cTn xmlns:p14="http://schemas.microsoft.com/office/powerpoint/2010/main" id="1" dur="indefinite" restart="never" nodeType="tmRoot"/>
+        <p:cTn id="1" dur="indefinite" restart="never" nodeType="tmRoot"/>
       </p:par>
     </p:tnLst>
   </p:timing>
@@ -5485,8 +5502,69 @@
           <a:p>
             <a:r>
               <a:rPr lang="fr-CA" dirty="0" smtClean="0"/>
-              <a:t>TO BE DONE TOMORROW</a:t>
-            </a:r>
+              <a:t>Unit </a:t>
+            </a:r>
+            <a:r>
+              <a:rPr lang="fr-CA" dirty="0" err="1" smtClean="0"/>
+              <a:t>Testing</a:t>
+            </a:r>
+            <a:endParaRPr lang="fr-CA" dirty="0" smtClean="0"/>
+          </a:p>
+          <a:p>
+            <a:pPr lvl="1"/>
+            <a:r>
+              <a:rPr lang="fr-CA" dirty="0" err="1" smtClean="0"/>
+              <a:t>Tested</a:t>
+            </a:r>
+            <a:r>
+              <a:rPr lang="fr-CA" dirty="0" smtClean="0"/>
+              <a:t> </a:t>
+            </a:r>
+            <a:r>
+              <a:rPr lang="fr-CA" dirty="0" err="1" smtClean="0"/>
+              <a:t>Edge</a:t>
+            </a:r>
+            <a:r>
+              <a:rPr lang="fr-CA" dirty="0" smtClean="0"/>
+              <a:t> Cases</a:t>
+            </a:r>
+          </a:p>
+          <a:p>
+            <a:pPr lvl="1"/>
+            <a:r>
+              <a:rPr lang="fr-CA" dirty="0" err="1" smtClean="0"/>
+              <a:t>Equivalence</a:t>
+            </a:r>
+            <a:r>
+              <a:rPr lang="fr-CA" dirty="0" smtClean="0"/>
+              <a:t> </a:t>
+            </a:r>
+            <a:r>
+              <a:rPr lang="fr-CA" dirty="0" err="1" smtClean="0"/>
+              <a:t>Partitioning</a:t>
+            </a:r>
+            <a:endParaRPr lang="fr-CA" dirty="0" smtClean="0"/>
+          </a:p>
+          <a:p>
+            <a:pPr lvl="1"/>
+            <a:r>
+              <a:rPr lang="fr-CA" dirty="0" smtClean="0"/>
+              <a:t>No </a:t>
+            </a:r>
+            <a:r>
+              <a:rPr lang="fr-CA" dirty="0" err="1" smtClean="0"/>
+              <a:t>Views</a:t>
+            </a:r>
+            <a:endParaRPr lang="fr-CA" dirty="0" smtClean="0"/>
+          </a:p>
+          <a:p>
+            <a:pPr lvl="1"/>
+            <a:r>
+              <a:rPr lang="fr-CA" dirty="0" smtClean="0"/>
+              <a:t>None for Android</a:t>
+            </a:r>
+          </a:p>
+          <a:p>
             <a:endParaRPr lang="fr-CA" dirty="0"/>
           </a:p>
         </p:txBody>
@@ -5534,7 +5612,7 @@
   <p:timing>
     <p:tnLst>
       <p:par>
-        <p:cTn xmlns:p14="http://schemas.microsoft.com/office/powerpoint/2010/main" id="1" dur="indefinite" restart="never" nodeType="tmRoot"/>
+        <p:cTn id="1" dur="indefinite" restart="never" nodeType="tmRoot"/>
       </p:par>
     </p:tnLst>
   </p:timing>
@@ -5575,40 +5653,145 @@
           <a:p>
             <a:pPr algn="ctr"/>
             <a:r>
+              <a:rPr lang="fr-CA" dirty="0" err="1" smtClean="0"/>
+              <a:t>Testing</a:t>
+            </a:r>
+            <a:endParaRPr lang="fr-CA" dirty="0"/>
+          </a:p>
+        </p:txBody>
+      </p:sp>
+      <p:sp>
+        <p:nvSpPr>
+          <p:cNvPr id="3" name="Content Placeholder 2"/>
+          <p:cNvSpPr>
+            <a:spLocks noGrp="1"/>
+          </p:cNvSpPr>
+          <p:nvPr>
+            <p:ph idx="1"/>
+          </p:nvPr>
+        </p:nvSpPr>
+        <p:spPr/>
+        <p:txBody>
+          <a:bodyPr/>
+          <a:lstStyle/>
+          <a:p>
+            <a:pPr lvl="1"/>
+            <a:r>
+              <a:rPr lang="fr-CA" dirty="0" err="1"/>
+              <a:t>Add</a:t>
+            </a:r>
+            <a:r>
+              <a:rPr lang="fr-CA" dirty="0"/>
+              <a:t> Food </a:t>
+            </a:r>
+            <a:r>
+              <a:rPr lang="fr-CA" dirty="0" err="1"/>
+              <a:t>Supply</a:t>
+            </a:r>
+            <a:r>
+              <a:rPr lang="fr-CA" dirty="0"/>
+              <a:t>:</a:t>
+            </a:r>
+          </a:p>
+          <a:p>
+            <a:pPr lvl="2"/>
+            <a:r>
+              <a:rPr lang="fr-CA" dirty="0"/>
+              <a:t>No </a:t>
+            </a:r>
+            <a:r>
+              <a:rPr lang="fr-CA" dirty="0" err="1" smtClean="0"/>
+              <a:t>name</a:t>
+            </a:r>
+            <a:endParaRPr lang="fr-CA" dirty="0" smtClean="0"/>
+          </a:p>
+          <a:p>
+            <a:pPr lvl="2"/>
+            <a:r>
               <a:rPr lang="fr-CA" dirty="0" smtClean="0"/>
-              <a:t>Release Pipeline</a:t>
+              <a:t>Name </a:t>
+            </a:r>
+            <a:r>
+              <a:rPr lang="fr-CA" dirty="0" err="1" smtClean="0"/>
+              <a:t>with</a:t>
+            </a:r>
+            <a:r>
+              <a:rPr lang="fr-CA" dirty="0" smtClean="0"/>
+              <a:t> </a:t>
+            </a:r>
+            <a:r>
+              <a:rPr lang="fr-CA" dirty="0" err="1" smtClean="0"/>
+              <a:t>Spaces</a:t>
             </a:r>
             <a:endParaRPr lang="fr-CA" dirty="0"/>
           </a:p>
-        </p:txBody>
-      </p:sp>
-      <p:sp>
-        <p:nvSpPr>
-          <p:cNvPr id="3" name="Content Placeholder 2"/>
-          <p:cNvSpPr>
-            <a:spLocks noGrp="1"/>
-          </p:cNvSpPr>
-          <p:nvPr>
-            <p:ph idx="1"/>
-          </p:nvPr>
-        </p:nvSpPr>
-        <p:spPr/>
-        <p:txBody>
-          <a:bodyPr/>
-          <a:lstStyle/>
-          <a:p>
-            <a:r>
-              <a:rPr lang="fr-CA" dirty="0" smtClean="0"/>
-              <a:t>TBD TOMORROW</a:t>
+          <a:p>
+            <a:pPr lvl="2"/>
+            <a:r>
+              <a:rPr lang="fr-CA" dirty="0"/>
+              <a:t>0 </a:t>
+            </a:r>
+            <a:r>
+              <a:rPr lang="fr-CA" dirty="0" err="1"/>
+              <a:t>supply</a:t>
             </a:r>
             <a:endParaRPr lang="fr-CA" dirty="0"/>
           </a:p>
-        </p:txBody>
-      </p:sp>
+          <a:p>
+            <a:pPr lvl="2"/>
+            <a:r>
+              <a:rPr lang="fr-CA" dirty="0" err="1"/>
+              <a:t>Negative</a:t>
+            </a:r>
+            <a:r>
+              <a:rPr lang="fr-CA" dirty="0"/>
+              <a:t> </a:t>
+            </a:r>
+            <a:r>
+              <a:rPr lang="fr-CA" dirty="0" err="1"/>
+              <a:t>Supply</a:t>
+            </a:r>
+            <a:endParaRPr lang="fr-CA" dirty="0"/>
+          </a:p>
+          <a:p>
+            <a:endParaRPr lang="fr-CA" dirty="0"/>
+          </a:p>
+        </p:txBody>
+      </p:sp>
+      <p:pic>
+        <p:nvPicPr>
+          <p:cNvPr id="5" name="Picture 4" descr="Screen Shot 2016-11-26 at 11.15.32 PM.png"/>
+          <p:cNvPicPr>
+            <a:picLocks noChangeAspect="1"/>
+          </p:cNvPicPr>
+          <p:nvPr/>
+        </p:nvPicPr>
+        <p:blipFill>
+          <a:blip r:embed="rId2">
+            <a:extLst>
+              <a:ext uri="{28A0092B-C50C-407E-A947-70E740481C1C}">
+                <a14:useLocalDpi xmlns:a14="http://schemas.microsoft.com/office/drawing/2010/main" val="0"/>
+              </a:ext>
+            </a:extLst>
+          </a:blip>
+          <a:stretch>
+            <a:fillRect/>
+          </a:stretch>
+        </p:blipFill>
+        <p:spPr>
+          <a:xfrm>
+            <a:off x="4184316" y="2954421"/>
+            <a:ext cx="4716692" cy="3168316"/>
+          </a:xfrm>
+          <a:prstGeom prst="rect">
+            <a:avLst/>
+          </a:prstGeom>
+        </p:spPr>
+      </p:pic>
     </p:spTree>
     <p:extLst>
       <p:ext uri="{BB962C8B-B14F-4D97-AF65-F5344CB8AC3E}">
-        <p14:creationId xmlns:p14="http://schemas.microsoft.com/office/powerpoint/2010/main" val="1399793637"/>
+        <p14:creationId xmlns:p14="http://schemas.microsoft.com/office/powerpoint/2010/main" val="2070788475"/>
       </p:ext>
     </p:extLst>
   </p:cSld>
@@ -5618,7 +5801,7 @@
   <p:timing>
     <p:tnLst>
       <p:par>
-        <p:cTn xmlns:p14="http://schemas.microsoft.com/office/powerpoint/2010/main" id="1" dur="indefinite" restart="never" nodeType="tmRoot"/>
+        <p:cTn id="1" dur="indefinite" restart="never" nodeType="tmRoot"/>
       </p:par>
     </p:tnLst>
   </p:timing>
@@ -5652,6 +5835,90 @@
             <p:ph type="title"/>
           </p:nvPr>
         </p:nvSpPr>
+        <p:spPr/>
+        <p:txBody>
+          <a:bodyPr/>
+          <a:lstStyle/>
+          <a:p>
+            <a:pPr algn="ctr"/>
+            <a:r>
+              <a:rPr lang="fr-CA" dirty="0" smtClean="0"/>
+              <a:t>Release Pipeline</a:t>
+            </a:r>
+            <a:endParaRPr lang="fr-CA" dirty="0"/>
+          </a:p>
+        </p:txBody>
+      </p:sp>
+      <p:sp>
+        <p:nvSpPr>
+          <p:cNvPr id="3" name="Content Placeholder 2"/>
+          <p:cNvSpPr>
+            <a:spLocks noGrp="1"/>
+          </p:cNvSpPr>
+          <p:nvPr>
+            <p:ph idx="1"/>
+          </p:nvPr>
+        </p:nvSpPr>
+        <p:spPr/>
+        <p:txBody>
+          <a:bodyPr/>
+          <a:lstStyle/>
+          <a:p>
+            <a:r>
+              <a:rPr lang="fr-CA" dirty="0" smtClean="0"/>
+              <a:t>TBD TOMORROW</a:t>
+            </a:r>
+            <a:endParaRPr lang="fr-CA" dirty="0"/>
+          </a:p>
+        </p:txBody>
+      </p:sp>
+    </p:spTree>
+    <p:extLst>
+      <p:ext uri="{BB962C8B-B14F-4D97-AF65-F5344CB8AC3E}">
+        <p14:creationId xmlns:p14="http://schemas.microsoft.com/office/powerpoint/2010/main" val="1399793637"/>
+      </p:ext>
+    </p:extLst>
+  </p:cSld>
+  <p:clrMapOvr>
+    <a:masterClrMapping/>
+  </p:clrMapOvr>
+  <p:timing>
+    <p:tnLst>
+      <p:par>
+        <p:cTn id="1" dur="indefinite" restart="never" nodeType="tmRoot"/>
+      </p:par>
+    </p:tnLst>
+  </p:timing>
+</p:sld>
+</file>
+
+<file path=ppt/slides/slide13.xml><?xml version="1.0" encoding="utf-8"?>
+<p:sld xmlns:a="http://schemas.openxmlformats.org/drawingml/2006/main" xmlns:r="http://schemas.openxmlformats.org/officeDocument/2006/relationships" xmlns:p="http://schemas.openxmlformats.org/presentationml/2006/main">
+  <p:cSld>
+    <p:spTree>
+      <p:nvGrpSpPr>
+        <p:cNvPr id="1" name=""/>
+        <p:cNvGrpSpPr/>
+        <p:nvPr/>
+      </p:nvGrpSpPr>
+      <p:grpSpPr>
+        <a:xfrm>
+          <a:off x="0" y="0"/>
+          <a:ext cx="0" cy="0"/>
+          <a:chOff x="0" y="0"/>
+          <a:chExt cx="0" cy="0"/>
+        </a:xfrm>
+      </p:grpSpPr>
+      <p:sp>
+        <p:nvSpPr>
+          <p:cNvPr id="2" name="Title 1"/>
+          <p:cNvSpPr>
+            <a:spLocks noGrp="1"/>
+          </p:cNvSpPr>
+          <p:nvPr>
+            <p:ph type="title"/>
+          </p:nvPr>
+        </p:nvSpPr>
         <p:spPr>
           <a:xfrm>
             <a:off x="415925" y="1276566"/>
@@ -5718,14 +5985,14 @@
   <p:timing>
     <p:tnLst>
       <p:par>
-        <p:cTn xmlns:p14="http://schemas.microsoft.com/office/powerpoint/2010/main" id="1" dur="indefinite" restart="never" nodeType="tmRoot"/>
+        <p:cTn id="1" dur="indefinite" restart="never" nodeType="tmRoot"/>
       </p:par>
     </p:tnLst>
   </p:timing>
 </p:sld>
 </file>
 
-<file path=ppt/slides/slide13.xml><?xml version="1.0" encoding="utf-8"?>
+<file path=ppt/slides/slide14.xml><?xml version="1.0" encoding="utf-8"?>
 <p:sld xmlns:a="http://schemas.openxmlformats.org/drawingml/2006/main" xmlns:r="http://schemas.openxmlformats.org/officeDocument/2006/relationships" xmlns:p="http://schemas.openxmlformats.org/presentationml/2006/main">
   <p:cSld>
     <p:spTree>
@@ -5880,14 +6147,14 @@
   <p:timing>
     <p:tnLst>
       <p:par>
-        <p:cTn xmlns:p14="http://schemas.microsoft.com/office/powerpoint/2010/main" id="1" dur="indefinite" restart="never" nodeType="tmRoot"/>
+        <p:cTn id="1" dur="indefinite" restart="never" nodeType="tmRoot"/>
       </p:par>
     </p:tnLst>
   </p:timing>
 </p:sld>
 </file>
 
-<file path=ppt/slides/slide14.xml><?xml version="1.0" encoding="utf-8"?>
+<file path=ppt/slides/slide15.xml><?xml version="1.0" encoding="utf-8"?>
 <p:sld xmlns:a="http://schemas.openxmlformats.org/drawingml/2006/main" xmlns:r="http://schemas.openxmlformats.org/officeDocument/2006/relationships" xmlns:p="http://schemas.openxmlformats.org/presentationml/2006/main">
   <p:cSld>
     <p:spTree>
@@ -6061,14 +6328,14 @@
   <p:timing>
     <p:tnLst>
       <p:par>
-        <p:cTn xmlns:p14="http://schemas.microsoft.com/office/powerpoint/2010/main" id="1" dur="indefinite" restart="never" nodeType="tmRoot"/>
+        <p:cTn id="1" dur="indefinite" restart="never" nodeType="tmRoot"/>
       </p:par>
     </p:tnLst>
   </p:timing>
 </p:sld>
 </file>
 
-<file path=ppt/slides/slide15.xml><?xml version="1.0" encoding="utf-8"?>
+<file path=ppt/slides/slide16.xml><?xml version="1.0" encoding="utf-8"?>
 <p:sld xmlns:a="http://schemas.openxmlformats.org/drawingml/2006/main" xmlns:r="http://schemas.openxmlformats.org/officeDocument/2006/relationships" xmlns:p="http://schemas.openxmlformats.org/presentationml/2006/main">
   <p:cSld>
     <p:spTree>
@@ -6227,14 +6494,14 @@
   <p:timing>
     <p:tnLst>
       <p:par>
-        <p:cTn xmlns:p14="http://schemas.microsoft.com/office/powerpoint/2010/main" id="1" dur="indefinite" restart="never" nodeType="tmRoot"/>
+        <p:cTn id="1" dur="indefinite" restart="never" nodeType="tmRoot"/>
       </p:par>
     </p:tnLst>
   </p:timing>
 </p:sld>
 </file>
 
-<file path=ppt/slides/slide16.xml><?xml version="1.0" encoding="utf-8"?>
+<file path=ppt/slides/slide17.xml><?xml version="1.0" encoding="utf-8"?>
 <p:sld xmlns:a="http://schemas.openxmlformats.org/drawingml/2006/main" xmlns:r="http://schemas.openxmlformats.org/officeDocument/2006/relationships" xmlns:p="http://schemas.openxmlformats.org/presentationml/2006/main">
   <p:cSld>
     <p:spTree>
@@ -6412,7 +6679,7 @@
   <p:timing>
     <p:tnLst>
       <p:par>
-        <p:cTn xmlns:p14="http://schemas.microsoft.com/office/powerpoint/2010/main" id="1" dur="indefinite" restart="never" nodeType="tmRoot"/>
+        <p:cTn id="1" dur="indefinite" restart="never" nodeType="tmRoot"/>
       </p:par>
     </p:tnLst>
   </p:timing>
@@ -6520,7 +6787,7 @@
   <p:timing>
     <p:tnLst>
       <p:par>
-        <p:cTn xmlns:p14="http://schemas.microsoft.com/office/powerpoint/2010/main" id="1" dur="indefinite" restart="never" nodeType="tmRoot"/>
+        <p:cTn id="1" dur="indefinite" restart="never" nodeType="tmRoot"/>
       </p:par>
     </p:tnLst>
   </p:timing>
@@ -6665,7 +6932,7 @@
   <p:timing>
     <p:tnLst>
       <p:par>
-        <p:cTn xmlns:p14="http://schemas.microsoft.com/office/powerpoint/2010/main" id="1" dur="indefinite" restart="never" nodeType="tmRoot"/>
+        <p:cTn id="1" dur="indefinite" restart="never" nodeType="tmRoot"/>
       </p:par>
     </p:tnLst>
   </p:timing>
@@ -6760,7 +7027,7 @@
   <p:timing>
     <p:tnLst>
       <p:par>
-        <p:cTn xmlns:p14="http://schemas.microsoft.com/office/powerpoint/2010/main" id="1" dur="indefinite" restart="never" nodeType="tmRoot"/>
+        <p:cTn id="1" dur="indefinite" restart="never" nodeType="tmRoot"/>
       </p:par>
     </p:tnLst>
   </p:timing>
@@ -6901,7 +7168,7 @@
   <p:timing>
     <p:tnLst>
       <p:par>
-        <p:cTn xmlns:p14="http://schemas.microsoft.com/office/powerpoint/2010/main" id="1" dur="indefinite" restart="never" nodeType="tmRoot"/>
+        <p:cTn id="1" dur="indefinite" restart="never" nodeType="tmRoot"/>
       </p:par>
     </p:tnLst>
   </p:timing>
@@ -6996,7 +7263,7 @@
   <p:timing>
     <p:tnLst>
       <p:par>
-        <p:cTn xmlns:p14="http://schemas.microsoft.com/office/powerpoint/2010/main" id="1" dur="indefinite" restart="never" nodeType="tmRoot"/>
+        <p:cTn id="1" dur="indefinite" restart="never" nodeType="tmRoot"/>
       </p:par>
     </p:tnLst>
   </p:timing>
@@ -7133,7 +7400,7 @@
   <p:timing>
     <p:tnLst>
       <p:par>
-        <p:cTn xmlns:p14="http://schemas.microsoft.com/office/powerpoint/2010/main" id="1" dur="indefinite" restart="never" nodeType="tmRoot">
+        <p:cTn id="1" dur="indefinite" restart="never" nodeType="tmRoot">
           <p:childTnLst>
             <p:seq concurrent="1" nextAc="seek">
               <p:cTn id="2" dur="indefinite" nodeType="mainSeq">
@@ -7377,7 +7644,7 @@
   <p:timing>
     <p:tnLst>
       <p:par>
-        <p:cTn xmlns:p14="http://schemas.microsoft.com/office/powerpoint/2010/main" id="1" dur="indefinite" restart="never" nodeType="tmRoot"/>
+        <p:cTn id="1" dur="indefinite" restart="never" nodeType="tmRoot"/>
       </p:par>
     </p:tnLst>
   </p:timing>

</xml_diff>

<commit_message>
Added to the ppx
</commit_message>
<xml_diff>
--- a/Deliverable_5.pptx
+++ b/Deliverable_5.pptx
@@ -4,6 +4,9 @@
   <p:sldMasterIdLst>
     <p:sldMasterId id="2147483660" r:id="rId1"/>
   </p:sldMasterIdLst>
+  <p:notesMasterIdLst>
+    <p:notesMasterId r:id="rId25"/>
+  </p:notesMasterIdLst>
   <p:sldIdLst>
     <p:sldId id="256" r:id="rId2"/>
     <p:sldId id="258" r:id="rId3"/>
@@ -16,12 +19,18 @@
     <p:sldId id="271" r:id="rId10"/>
     <p:sldId id="264" r:id="rId11"/>
     <p:sldId id="272" r:id="rId12"/>
-    <p:sldId id="265" r:id="rId13"/>
-    <p:sldId id="266" r:id="rId14"/>
-    <p:sldId id="267" r:id="rId15"/>
-    <p:sldId id="268" r:id="rId16"/>
-    <p:sldId id="269" r:id="rId17"/>
-    <p:sldId id="270" r:id="rId18"/>
+    <p:sldId id="273" r:id="rId13"/>
+    <p:sldId id="274" r:id="rId14"/>
+    <p:sldId id="275" r:id="rId15"/>
+    <p:sldId id="276" r:id="rId16"/>
+    <p:sldId id="277" r:id="rId17"/>
+    <p:sldId id="266" r:id="rId18"/>
+    <p:sldId id="267" r:id="rId19"/>
+    <p:sldId id="268" r:id="rId20"/>
+    <p:sldId id="269" r:id="rId21"/>
+    <p:sldId id="270" r:id="rId22"/>
+    <p:sldId id="278" r:id="rId23"/>
+    <p:sldId id="279" r:id="rId24"/>
   </p:sldIdLst>
   <p:sldSz cx="9144000" cy="6858000" type="screen4x3"/>
   <p:notesSz cx="6858000" cy="9144000"/>
@@ -139,6 +148,356 @@
 </p:presentation>
 </file>
 
+<file path=ppt/notesMasters/notesMaster1.xml><?xml version="1.0" encoding="utf-8"?>
+<p:notesMaster xmlns:a="http://schemas.openxmlformats.org/drawingml/2006/main" xmlns:r="http://schemas.openxmlformats.org/officeDocument/2006/relationships" xmlns:p="http://schemas.openxmlformats.org/presentationml/2006/main">
+  <p:cSld>
+    <p:bg>
+      <p:bgRef idx="1001">
+        <a:schemeClr val="bg1"/>
+      </p:bgRef>
+    </p:bg>
+    <p:spTree>
+      <p:nvGrpSpPr>
+        <p:cNvPr id="1" name=""/>
+        <p:cNvGrpSpPr/>
+        <p:nvPr/>
+      </p:nvGrpSpPr>
+      <p:grpSpPr>
+        <a:xfrm>
+          <a:off x="0" y="0"/>
+          <a:ext cx="0" cy="0"/>
+          <a:chOff x="0" y="0"/>
+          <a:chExt cx="0" cy="0"/>
+        </a:xfrm>
+      </p:grpSpPr>
+      <p:sp>
+        <p:nvSpPr>
+          <p:cNvPr id="2" name="Header Placeholder 1"/>
+          <p:cNvSpPr>
+            <a:spLocks noGrp="1"/>
+          </p:cNvSpPr>
+          <p:nvPr>
+            <p:ph type="hdr" sz="quarter"/>
+          </p:nvPr>
+        </p:nvSpPr>
+        <p:spPr>
+          <a:xfrm>
+            <a:off x="0" y="0"/>
+            <a:ext cx="2971800" cy="458788"/>
+          </a:xfrm>
+          <a:prstGeom prst="rect">
+            <a:avLst/>
+          </a:prstGeom>
+        </p:spPr>
+        <p:txBody>
+          <a:bodyPr vert="horz" lIns="91440" tIns="45720" rIns="91440" bIns="45720" rtlCol="0"/>
+          <a:lstStyle>
+            <a:lvl1pPr algn="l">
+              <a:defRPr sz="1200"/>
+            </a:lvl1pPr>
+          </a:lstStyle>
+          <a:p>
+            <a:endParaRPr lang="en-CA"/>
+          </a:p>
+        </p:txBody>
+      </p:sp>
+      <p:sp>
+        <p:nvSpPr>
+          <p:cNvPr id="3" name="Date Placeholder 2"/>
+          <p:cNvSpPr>
+            <a:spLocks noGrp="1"/>
+          </p:cNvSpPr>
+          <p:nvPr>
+            <p:ph type="dt" idx="1"/>
+          </p:nvPr>
+        </p:nvSpPr>
+        <p:spPr>
+          <a:xfrm>
+            <a:off x="3884613" y="0"/>
+            <a:ext cx="2971800" cy="458788"/>
+          </a:xfrm>
+          <a:prstGeom prst="rect">
+            <a:avLst/>
+          </a:prstGeom>
+        </p:spPr>
+        <p:txBody>
+          <a:bodyPr vert="horz" lIns="91440" tIns="45720" rIns="91440" bIns="45720" rtlCol="0"/>
+          <a:lstStyle>
+            <a:lvl1pPr algn="r">
+              <a:defRPr sz="1200"/>
+            </a:lvl1pPr>
+          </a:lstStyle>
+          <a:p>
+            <a:fld id="{F7805AAA-764A-4262-89B1-10BF35787060}" type="datetimeFigureOut">
+              <a:rPr lang="en-CA" smtClean="0"/>
+              <a:t>2016-11-29</a:t>
+            </a:fld>
+            <a:endParaRPr lang="en-CA"/>
+          </a:p>
+        </p:txBody>
+      </p:sp>
+      <p:sp>
+        <p:nvSpPr>
+          <p:cNvPr id="4" name="Slide Image Placeholder 3"/>
+          <p:cNvSpPr>
+            <a:spLocks noGrp="1" noRot="1" noChangeAspect="1"/>
+          </p:cNvSpPr>
+          <p:nvPr>
+            <p:ph type="sldImg" idx="2"/>
+          </p:nvPr>
+        </p:nvSpPr>
+        <p:spPr>
+          <a:xfrm>
+            <a:off x="1371600" y="1143000"/>
+            <a:ext cx="4114800" cy="3086100"/>
+          </a:xfrm>
+          <a:prstGeom prst="rect">
+            <a:avLst/>
+          </a:prstGeom>
+          <a:noFill/>
+          <a:ln w="12700">
+            <a:solidFill>
+              <a:prstClr val="black"/>
+            </a:solidFill>
+          </a:ln>
+        </p:spPr>
+        <p:txBody>
+          <a:bodyPr vert="horz" lIns="91440" tIns="45720" rIns="91440" bIns="45720" rtlCol="0" anchor="ctr"/>
+          <a:lstStyle/>
+          <a:p>
+            <a:endParaRPr lang="en-CA"/>
+          </a:p>
+        </p:txBody>
+      </p:sp>
+      <p:sp>
+        <p:nvSpPr>
+          <p:cNvPr id="5" name="Notes Placeholder 4"/>
+          <p:cNvSpPr>
+            <a:spLocks noGrp="1"/>
+          </p:cNvSpPr>
+          <p:nvPr>
+            <p:ph type="body" sz="quarter" idx="3"/>
+          </p:nvPr>
+        </p:nvSpPr>
+        <p:spPr>
+          <a:xfrm>
+            <a:off x="685800" y="4400550"/>
+            <a:ext cx="5486400" cy="3600450"/>
+          </a:xfrm>
+          <a:prstGeom prst="rect">
+            <a:avLst/>
+          </a:prstGeom>
+        </p:spPr>
+        <p:txBody>
+          <a:bodyPr vert="horz" lIns="91440" tIns="45720" rIns="91440" bIns="45720" rtlCol="0"/>
+          <a:lstStyle/>
+          <a:p>
+            <a:pPr lvl="0"/>
+            <a:r>
+              <a:rPr lang="en-US"/>
+              <a:t>Edit Master text styles</a:t>
+            </a:r>
+          </a:p>
+          <a:p>
+            <a:pPr lvl="1"/>
+            <a:r>
+              <a:rPr lang="en-US"/>
+              <a:t>Second level</a:t>
+            </a:r>
+          </a:p>
+          <a:p>
+            <a:pPr lvl="2"/>
+            <a:r>
+              <a:rPr lang="en-US"/>
+              <a:t>Third level</a:t>
+            </a:r>
+          </a:p>
+          <a:p>
+            <a:pPr lvl="3"/>
+            <a:r>
+              <a:rPr lang="en-US"/>
+              <a:t>Fourth level</a:t>
+            </a:r>
+          </a:p>
+          <a:p>
+            <a:pPr lvl="4"/>
+            <a:r>
+              <a:rPr lang="en-US"/>
+              <a:t>Fifth level</a:t>
+            </a:r>
+            <a:endParaRPr lang="en-CA"/>
+          </a:p>
+        </p:txBody>
+      </p:sp>
+      <p:sp>
+        <p:nvSpPr>
+          <p:cNvPr id="6" name="Footer Placeholder 5"/>
+          <p:cNvSpPr>
+            <a:spLocks noGrp="1"/>
+          </p:cNvSpPr>
+          <p:nvPr>
+            <p:ph type="ftr" sz="quarter" idx="4"/>
+          </p:nvPr>
+        </p:nvSpPr>
+        <p:spPr>
+          <a:xfrm>
+            <a:off x="0" y="8685213"/>
+            <a:ext cx="2971800" cy="458787"/>
+          </a:xfrm>
+          <a:prstGeom prst="rect">
+            <a:avLst/>
+          </a:prstGeom>
+        </p:spPr>
+        <p:txBody>
+          <a:bodyPr vert="horz" lIns="91440" tIns="45720" rIns="91440" bIns="45720" rtlCol="0" anchor="b"/>
+          <a:lstStyle>
+            <a:lvl1pPr algn="l">
+              <a:defRPr sz="1200"/>
+            </a:lvl1pPr>
+          </a:lstStyle>
+          <a:p>
+            <a:endParaRPr lang="en-CA"/>
+          </a:p>
+        </p:txBody>
+      </p:sp>
+      <p:sp>
+        <p:nvSpPr>
+          <p:cNvPr id="7" name="Slide Number Placeholder 6"/>
+          <p:cNvSpPr>
+            <a:spLocks noGrp="1"/>
+          </p:cNvSpPr>
+          <p:nvPr>
+            <p:ph type="sldNum" sz="quarter" idx="5"/>
+          </p:nvPr>
+        </p:nvSpPr>
+        <p:spPr>
+          <a:xfrm>
+            <a:off x="3884613" y="8685213"/>
+            <a:ext cx="2971800" cy="458787"/>
+          </a:xfrm>
+          <a:prstGeom prst="rect">
+            <a:avLst/>
+          </a:prstGeom>
+        </p:spPr>
+        <p:txBody>
+          <a:bodyPr vert="horz" lIns="91440" tIns="45720" rIns="91440" bIns="45720" rtlCol="0" anchor="b"/>
+          <a:lstStyle>
+            <a:lvl1pPr algn="r">
+              <a:defRPr sz="1200"/>
+            </a:lvl1pPr>
+          </a:lstStyle>
+          <a:p>
+            <a:fld id="{3ED01D4B-AD20-4153-84BC-6D01C3C17814}" type="slidenum">
+              <a:rPr lang="en-CA" smtClean="0"/>
+              <a:t>‹#›</a:t>
+            </a:fld>
+            <a:endParaRPr lang="en-CA"/>
+          </a:p>
+        </p:txBody>
+      </p:sp>
+    </p:spTree>
+    <p:extLst>
+      <p:ext uri="{BB962C8B-B14F-4D97-AF65-F5344CB8AC3E}">
+        <p14:creationId xmlns:p14="http://schemas.microsoft.com/office/powerpoint/2010/main" val="617832920"/>
+      </p:ext>
+    </p:extLst>
+  </p:cSld>
+  <p:clrMap bg1="lt1" tx1="dk1" bg2="lt2" tx2="dk2" accent1="accent1" accent2="accent2" accent3="accent3" accent4="accent4" accent5="accent5" accent6="accent6" hlink="hlink" folHlink="folHlink"/>
+  <p:notesStyle>
+    <a:lvl1pPr marL="0" algn="l" defTabSz="914400" rtl="0" eaLnBrk="1" latinLnBrk="0" hangingPunct="1">
+      <a:defRPr sz="1200" kern="1200">
+        <a:solidFill>
+          <a:schemeClr val="tx1"/>
+        </a:solidFill>
+        <a:latin typeface="+mn-lt"/>
+        <a:ea typeface="+mn-ea"/>
+        <a:cs typeface="+mn-cs"/>
+      </a:defRPr>
+    </a:lvl1pPr>
+    <a:lvl2pPr marL="457200" algn="l" defTabSz="914400" rtl="0" eaLnBrk="1" latinLnBrk="0" hangingPunct="1">
+      <a:defRPr sz="1200" kern="1200">
+        <a:solidFill>
+          <a:schemeClr val="tx1"/>
+        </a:solidFill>
+        <a:latin typeface="+mn-lt"/>
+        <a:ea typeface="+mn-ea"/>
+        <a:cs typeface="+mn-cs"/>
+      </a:defRPr>
+    </a:lvl2pPr>
+    <a:lvl3pPr marL="914400" algn="l" defTabSz="914400" rtl="0" eaLnBrk="1" latinLnBrk="0" hangingPunct="1">
+      <a:defRPr sz="1200" kern="1200">
+        <a:solidFill>
+          <a:schemeClr val="tx1"/>
+        </a:solidFill>
+        <a:latin typeface="+mn-lt"/>
+        <a:ea typeface="+mn-ea"/>
+        <a:cs typeface="+mn-cs"/>
+      </a:defRPr>
+    </a:lvl3pPr>
+    <a:lvl4pPr marL="1371600" algn="l" defTabSz="914400" rtl="0" eaLnBrk="1" latinLnBrk="0" hangingPunct="1">
+      <a:defRPr sz="1200" kern="1200">
+        <a:solidFill>
+          <a:schemeClr val="tx1"/>
+        </a:solidFill>
+        <a:latin typeface="+mn-lt"/>
+        <a:ea typeface="+mn-ea"/>
+        <a:cs typeface="+mn-cs"/>
+      </a:defRPr>
+    </a:lvl4pPr>
+    <a:lvl5pPr marL="1828800" algn="l" defTabSz="914400" rtl="0" eaLnBrk="1" latinLnBrk="0" hangingPunct="1">
+      <a:defRPr sz="1200" kern="1200">
+        <a:solidFill>
+          <a:schemeClr val="tx1"/>
+        </a:solidFill>
+        <a:latin typeface="+mn-lt"/>
+        <a:ea typeface="+mn-ea"/>
+        <a:cs typeface="+mn-cs"/>
+      </a:defRPr>
+    </a:lvl5pPr>
+    <a:lvl6pPr marL="2286000" algn="l" defTabSz="914400" rtl="0" eaLnBrk="1" latinLnBrk="0" hangingPunct="1">
+      <a:defRPr sz="1200" kern="1200">
+        <a:solidFill>
+          <a:schemeClr val="tx1"/>
+        </a:solidFill>
+        <a:latin typeface="+mn-lt"/>
+        <a:ea typeface="+mn-ea"/>
+        <a:cs typeface="+mn-cs"/>
+      </a:defRPr>
+    </a:lvl6pPr>
+    <a:lvl7pPr marL="2743200" algn="l" defTabSz="914400" rtl="0" eaLnBrk="1" latinLnBrk="0" hangingPunct="1">
+      <a:defRPr sz="1200" kern="1200">
+        <a:solidFill>
+          <a:schemeClr val="tx1"/>
+        </a:solidFill>
+        <a:latin typeface="+mn-lt"/>
+        <a:ea typeface="+mn-ea"/>
+        <a:cs typeface="+mn-cs"/>
+      </a:defRPr>
+    </a:lvl7pPr>
+    <a:lvl8pPr marL="3200400" algn="l" defTabSz="914400" rtl="0" eaLnBrk="1" latinLnBrk="0" hangingPunct="1">
+      <a:defRPr sz="1200" kern="1200">
+        <a:solidFill>
+          <a:schemeClr val="tx1"/>
+        </a:solidFill>
+        <a:latin typeface="+mn-lt"/>
+        <a:ea typeface="+mn-ea"/>
+        <a:cs typeface="+mn-cs"/>
+      </a:defRPr>
+    </a:lvl8pPr>
+    <a:lvl9pPr marL="3657600" algn="l" defTabSz="914400" rtl="0" eaLnBrk="1" latinLnBrk="0" hangingPunct="1">
+      <a:defRPr sz="1200" kern="1200">
+        <a:solidFill>
+          <a:schemeClr val="tx1"/>
+        </a:solidFill>
+        <a:latin typeface="+mn-lt"/>
+        <a:ea typeface="+mn-ea"/>
+        <a:cs typeface="+mn-cs"/>
+      </a:defRPr>
+    </a:lvl9pPr>
+  </p:notesStyle>
+</p:notesMaster>
+</file>
+
 <file path=ppt/slideLayouts/slideLayout1.xml><?xml version="1.0" encoding="utf-8"?>
 <p:sldLayout xmlns:a="http://schemas.openxmlformats.org/drawingml/2006/main" xmlns:r="http://schemas.openxmlformats.org/officeDocument/2006/relationships" xmlns:p="http://schemas.openxmlformats.org/presentationml/2006/main" type="title" preserve="1">
   <p:cSld name="Title Slide">
@@ -217,7 +576,7 @@
           </a:lstStyle>
           <a:p>
             <a:r>
-              <a:rPr lang="en-CA" smtClean="0"/>
+              <a:rPr lang="en-CA"/>
               <a:t>Click to edit Master title style</a:t>
             </a:r>
             <a:endParaRPr/>
@@ -339,7 +698,7 @@
           </a:lstStyle>
           <a:p>
             <a:r>
-              <a:rPr lang="en-CA" smtClean="0"/>
+              <a:rPr lang="en-CA"/>
               <a:t>Click to edit Master subtitle style</a:t>
             </a:r>
             <a:endParaRPr dirty="0"/>
@@ -361,9 +720,9 @@
           <a:bodyPr/>
           <a:lstStyle/>
           <a:p>
-            <a:fld id="{7CE38E4D-051A-41E1-86A4-E56916468FD0}" type="datetimeFigureOut">
+            <a:fld id="{2C95243B-3204-49B9-9153-5DC712CA66CA}" type="datetime1">
               <a:rPr lang="en-US" smtClean="0"/>
-              <a:t>11/27/16</a:t>
+              <a:t>11/29/2016</a:t>
             </a:fld>
             <a:endParaRPr lang="en-US"/>
           </a:p>
@@ -538,7 +897,7 @@
           </a:lstStyle>
           <a:p>
             <a:r>
-              <a:rPr lang="en-CA" smtClean="0"/>
+              <a:rPr lang="en-CA"/>
               <a:t>Click to edit Master title style</a:t>
             </a:r>
             <a:endParaRPr/>
@@ -603,7 +962,7 @@
           </a:lstStyle>
           <a:p>
             <a:r>
-              <a:rPr lang="en-CA" smtClean="0"/>
+              <a:rPr lang="en-CA"/>
               <a:t>Drag picture to placeholder or click icon to add</a:t>
             </a:r>
             <a:endParaRPr/>
@@ -674,7 +1033,7 @@
           <a:p>
             <a:pPr lvl="0"/>
             <a:r>
-              <a:rPr lang="en-CA" smtClean="0"/>
+              <a:rPr lang="en-CA"/>
               <a:t>Click to edit Master text styles</a:t>
             </a:r>
           </a:p>
@@ -695,9 +1054,9 @@
           <a:bodyPr/>
           <a:lstStyle/>
           <a:p>
-            <a:fld id="{7CE38E4D-051A-41E1-86A4-E56916468FD0}" type="datetimeFigureOut">
+            <a:fld id="{74F686FD-7527-4BC9-911B-810F5230F2C9}" type="datetime1">
               <a:rPr lang="en-US" smtClean="0"/>
-              <a:t>11/27/16</a:t>
+              <a:t>11/29/2016</a:t>
             </a:fld>
             <a:endParaRPr lang="en-US"/>
           </a:p>
@@ -835,7 +1194,7 @@
           </a:lstStyle>
           <a:p>
             <a:r>
-              <a:rPr lang="en-CA" smtClean="0"/>
+              <a:rPr lang="en-CA"/>
               <a:t>Click to edit Master title style</a:t>
             </a:r>
             <a:endParaRPr dirty="0"/>
@@ -913,7 +1272,7 @@
           <a:p>
             <a:pPr lvl="0"/>
             <a:r>
-              <a:rPr lang="en-CA" smtClean="0"/>
+              <a:rPr lang="en-CA"/>
               <a:t>Click to edit Master text styles</a:t>
             </a:r>
           </a:p>
@@ -934,9 +1293,9 @@
           <a:bodyPr/>
           <a:lstStyle/>
           <a:p>
-            <a:fld id="{7CE38E4D-051A-41E1-86A4-E56916468FD0}" type="datetimeFigureOut">
+            <a:fld id="{E50121F8-520D-48A6-8C59-F518097FFFB4}" type="datetime1">
               <a:rPr lang="en-US" smtClean="0"/>
-              <a:t>11/27/16</a:t>
+              <a:t>11/29/2016</a:t>
             </a:fld>
             <a:endParaRPr lang="en-US"/>
           </a:p>
@@ -987,7 +1346,7 @@
           </a:lstStyle>
           <a:p>
             <a:r>
-              <a:rPr lang="en-CA" smtClean="0"/>
+              <a:rPr lang="en-CA"/>
               <a:t>Drag picture to placeholder or click icon to add</a:t>
             </a:r>
             <a:endParaRPr/>
@@ -1045,7 +1404,7 @@
           </a:lstStyle>
           <a:p>
             <a:r>
-              <a:rPr lang="en-CA" smtClean="0"/>
+              <a:rPr lang="en-CA"/>
               <a:t>Drag picture to placeholder or click icon to add</a:t>
             </a:r>
             <a:endParaRPr/>
@@ -1135,7 +1494,7 @@
           </a:lstStyle>
           <a:p>
             <a:r>
-              <a:rPr lang="en-CA" smtClean="0"/>
+              <a:rPr lang="en-CA"/>
               <a:t>Click to edit Master title style</a:t>
             </a:r>
             <a:endParaRPr/>
@@ -1213,7 +1572,7 @@
           <a:p>
             <a:pPr lvl="0"/>
             <a:r>
-              <a:rPr lang="en-CA" smtClean="0"/>
+              <a:rPr lang="en-CA"/>
               <a:t>Click to edit Master text styles</a:t>
             </a:r>
           </a:p>
@@ -1234,9 +1593,9 @@
           <a:bodyPr/>
           <a:lstStyle/>
           <a:p>
-            <a:fld id="{7CE38E4D-051A-41E1-86A4-E56916468FD0}" type="datetimeFigureOut">
+            <a:fld id="{3BB9FF3A-17E0-4305-9390-B64A8AE1671E}" type="datetime1">
               <a:rPr lang="en-US" smtClean="0"/>
-              <a:t>11/27/16</a:t>
+              <a:t>11/29/2016</a:t>
             </a:fld>
             <a:endParaRPr lang="en-US"/>
           </a:p>
@@ -1351,7 +1710,7 @@
           </a:lstStyle>
           <a:p>
             <a:r>
-              <a:rPr lang="en-CA" smtClean="0"/>
+              <a:rPr lang="en-CA"/>
               <a:t>Click to edit Master title style</a:t>
             </a:r>
             <a:endParaRPr/>
@@ -1429,7 +1788,7 @@
           <a:p>
             <a:pPr lvl="0"/>
             <a:r>
-              <a:rPr lang="en-CA" smtClean="0"/>
+              <a:rPr lang="en-CA"/>
               <a:t>Click to edit Master text styles</a:t>
             </a:r>
           </a:p>
@@ -1450,9 +1809,9 @@
           <a:bodyPr/>
           <a:lstStyle/>
           <a:p>
-            <a:fld id="{7CE38E4D-051A-41E1-86A4-E56916468FD0}" type="datetimeFigureOut">
+            <a:fld id="{6A0D4AAE-82DD-462D-B7E6-44989E39F8A0}" type="datetime1">
               <a:rPr lang="en-US" smtClean="0"/>
-              <a:t>11/27/16</a:t>
+              <a:t>11/29/2016</a:t>
             </a:fld>
             <a:endParaRPr lang="en-US"/>
           </a:p>
@@ -1503,7 +1862,7 @@
           </a:lstStyle>
           <a:p>
             <a:r>
-              <a:rPr lang="en-CA" smtClean="0"/>
+              <a:rPr lang="en-CA"/>
               <a:t>Drag picture to placeholder or click icon to add</a:t>
             </a:r>
             <a:endParaRPr/>
@@ -1536,7 +1895,7 @@
           </a:lstStyle>
           <a:p>
             <a:r>
-              <a:rPr lang="en-CA" smtClean="0"/>
+              <a:rPr lang="en-CA"/>
               <a:t>Drag picture to placeholder or click icon to add</a:t>
             </a:r>
             <a:endParaRPr/>
@@ -1569,7 +1928,7 @@
           </a:lstStyle>
           <a:p>
             <a:r>
-              <a:rPr lang="en-CA" smtClean="0"/>
+              <a:rPr lang="en-CA"/>
               <a:t>Drag picture to placeholder or click icon to add</a:t>
             </a:r>
             <a:endParaRPr/>
@@ -1680,7 +2039,7 @@
           <a:lstStyle/>
           <a:p>
             <a:r>
-              <a:rPr lang="en-CA" smtClean="0"/>
+              <a:rPr lang="en-CA"/>
               <a:t>Click to edit Master title style</a:t>
             </a:r>
             <a:endParaRPr/>
@@ -1760,35 +2119,35 @@
           <a:p>
             <a:pPr lvl="0"/>
             <a:r>
-              <a:rPr lang="en-CA" smtClean="0"/>
+              <a:rPr lang="en-CA"/>
               <a:t>Click to edit Master text styles</a:t>
             </a:r>
           </a:p>
           <a:p>
             <a:pPr lvl="1"/>
             <a:r>
-              <a:rPr lang="en-CA" smtClean="0"/>
+              <a:rPr lang="en-CA"/>
               <a:t>Second level</a:t>
             </a:r>
           </a:p>
           <a:p>
             <a:pPr lvl="2"/>
             <a:r>
-              <a:rPr lang="en-CA" smtClean="0"/>
+              <a:rPr lang="en-CA"/>
               <a:t>Third level</a:t>
             </a:r>
           </a:p>
           <a:p>
             <a:pPr lvl="3"/>
             <a:r>
-              <a:rPr lang="en-CA" smtClean="0"/>
+              <a:rPr lang="en-CA"/>
               <a:t>Fourth level</a:t>
             </a:r>
           </a:p>
           <a:p>
             <a:pPr lvl="4"/>
             <a:r>
-              <a:rPr lang="en-CA" smtClean="0"/>
+              <a:rPr lang="en-CA"/>
               <a:t>Fifth level</a:t>
             </a:r>
             <a:endParaRPr dirty="0"/>
@@ -1810,9 +2169,9 @@
           <a:bodyPr/>
           <a:lstStyle/>
           <a:p>
-            <a:fld id="{7CE38E4D-051A-41E1-86A4-E56916468FD0}" type="datetimeFigureOut">
+            <a:fld id="{C19927EA-3FA8-43B8-93B9-31A904DCB859}" type="datetime1">
               <a:rPr lang="en-US" smtClean="0"/>
-              <a:t>11/27/16</a:t>
+              <a:t>11/29/2016</a:t>
             </a:fld>
             <a:endParaRPr lang="en-US"/>
           </a:p>
@@ -1942,7 +2301,7 @@
           <a:lstStyle/>
           <a:p>
             <a:r>
-              <a:rPr lang="en-CA" smtClean="0"/>
+              <a:rPr lang="en-CA"/>
               <a:t>Click to edit Master title style</a:t>
             </a:r>
             <a:endParaRPr/>
@@ -2027,35 +2386,35 @@
           <a:p>
             <a:pPr lvl="0"/>
             <a:r>
-              <a:rPr lang="en-CA" smtClean="0"/>
+              <a:rPr lang="en-CA"/>
               <a:t>Click to edit Master text styles</a:t>
             </a:r>
           </a:p>
           <a:p>
             <a:pPr lvl="1"/>
             <a:r>
-              <a:rPr lang="en-CA" smtClean="0"/>
+              <a:rPr lang="en-CA"/>
               <a:t>Second level</a:t>
             </a:r>
           </a:p>
           <a:p>
             <a:pPr lvl="2"/>
             <a:r>
-              <a:rPr lang="en-CA" smtClean="0"/>
+              <a:rPr lang="en-CA"/>
               <a:t>Third level</a:t>
             </a:r>
           </a:p>
           <a:p>
             <a:pPr lvl="3"/>
             <a:r>
-              <a:rPr lang="en-CA" smtClean="0"/>
+              <a:rPr lang="en-CA"/>
               <a:t>Fourth level</a:t>
             </a:r>
           </a:p>
           <a:p>
             <a:pPr lvl="4"/>
             <a:r>
-              <a:rPr lang="en-CA" smtClean="0"/>
+              <a:rPr lang="en-CA"/>
               <a:t>Fifth level</a:t>
             </a:r>
             <a:endParaRPr dirty="0"/>
@@ -2077,9 +2436,9 @@
           <a:bodyPr/>
           <a:lstStyle/>
           <a:p>
-            <a:fld id="{7CE38E4D-051A-41E1-86A4-E56916468FD0}" type="datetimeFigureOut">
+            <a:fld id="{5F85AEF8-B7FD-46B5-B914-C2F7CC454AEB}" type="datetime1">
               <a:rPr lang="en-US" smtClean="0"/>
-              <a:t>11/27/16</a:t>
+              <a:t>11/29/2016</a:t>
             </a:fld>
             <a:endParaRPr lang="en-US"/>
           </a:p>
@@ -2167,9 +2526,9 @@
           <a:bodyPr/>
           <a:lstStyle/>
           <a:p>
-            <a:fld id="{7CE38E4D-051A-41E1-86A4-E56916468FD0}" type="datetimeFigureOut">
+            <a:fld id="{0622A0DD-DCB8-4BBE-ABF7-BA036909C239}" type="datetime1">
               <a:rPr lang="en-US" smtClean="0"/>
-              <a:t>11/27/16</a:t>
+              <a:t>11/29/2016</a:t>
             </a:fld>
             <a:endParaRPr lang="en-US"/>
           </a:p>
@@ -2371,7 +2730,7 @@
           <a:lstStyle/>
           <a:p>
             <a:r>
-              <a:rPr lang="en-CA" smtClean="0"/>
+              <a:rPr lang="en-CA"/>
               <a:t>Click to edit Master title style</a:t>
             </a:r>
             <a:endParaRPr/>
@@ -2418,35 +2777,35 @@
           <a:p>
             <a:pPr lvl="0"/>
             <a:r>
-              <a:rPr lang="en-CA" smtClean="0"/>
+              <a:rPr lang="en-CA"/>
               <a:t>Click to edit Master text styles</a:t>
             </a:r>
           </a:p>
           <a:p>
             <a:pPr lvl="1"/>
             <a:r>
-              <a:rPr lang="en-CA" smtClean="0"/>
+              <a:rPr lang="en-CA"/>
               <a:t>Second level</a:t>
             </a:r>
           </a:p>
           <a:p>
             <a:pPr lvl="2"/>
             <a:r>
-              <a:rPr lang="en-CA" smtClean="0"/>
+              <a:rPr lang="en-CA"/>
               <a:t>Third level</a:t>
             </a:r>
           </a:p>
           <a:p>
             <a:pPr lvl="3"/>
             <a:r>
-              <a:rPr lang="en-CA" smtClean="0"/>
+              <a:rPr lang="en-CA"/>
               <a:t>Fourth level</a:t>
             </a:r>
           </a:p>
           <a:p>
             <a:pPr lvl="4"/>
             <a:r>
-              <a:rPr lang="en-CA" smtClean="0"/>
+              <a:rPr lang="en-CA"/>
               <a:t>Fifth level</a:t>
             </a:r>
             <a:endParaRPr dirty="0"/>
@@ -2468,9 +2827,9 @@
           <a:bodyPr/>
           <a:lstStyle/>
           <a:p>
-            <a:fld id="{7CE38E4D-051A-41E1-86A4-E56916468FD0}" type="datetimeFigureOut">
+            <a:fld id="{9177164F-74FA-4CB8-9B5B-662FD7CFA6B9}" type="datetime1">
               <a:rPr lang="en-US" smtClean="0"/>
-              <a:t>11/27/16</a:t>
+              <a:t>11/29/2016</a:t>
             </a:fld>
             <a:endParaRPr lang="en-US"/>
           </a:p>
@@ -2595,7 +2954,7 @@
           <a:lstStyle/>
           <a:p>
             <a:r>
-              <a:rPr lang="en-CA" smtClean="0"/>
+              <a:rPr lang="en-CA"/>
               <a:t>Click to edit Master title style</a:t>
             </a:r>
             <a:endParaRPr/>
@@ -2724,35 +3083,35 @@
           <a:p>
             <a:pPr lvl="0"/>
             <a:r>
-              <a:rPr lang="en-CA" smtClean="0"/>
+              <a:rPr lang="en-CA"/>
               <a:t>Click to edit Master text styles</a:t>
             </a:r>
           </a:p>
           <a:p>
             <a:pPr lvl="1"/>
             <a:r>
-              <a:rPr lang="en-CA" smtClean="0"/>
+              <a:rPr lang="en-CA"/>
               <a:t>Second level</a:t>
             </a:r>
           </a:p>
           <a:p>
             <a:pPr lvl="2"/>
             <a:r>
-              <a:rPr lang="en-CA" smtClean="0"/>
+              <a:rPr lang="en-CA"/>
               <a:t>Third level</a:t>
             </a:r>
           </a:p>
           <a:p>
             <a:pPr lvl="3"/>
             <a:r>
-              <a:rPr lang="en-CA" smtClean="0"/>
+              <a:rPr lang="en-CA"/>
               <a:t>Fourth level</a:t>
             </a:r>
           </a:p>
           <a:p>
             <a:pPr lvl="4"/>
             <a:r>
-              <a:rPr lang="en-CA" smtClean="0"/>
+              <a:rPr lang="en-CA"/>
               <a:t>Fifth level</a:t>
             </a:r>
             <a:endParaRPr dirty="0"/>
@@ -2774,9 +3133,9 @@
           <a:bodyPr/>
           <a:lstStyle/>
           <a:p>
-            <a:fld id="{7CE38E4D-051A-41E1-86A4-E56916468FD0}" type="datetimeFigureOut">
+            <a:fld id="{80E9FE78-BEA2-42AA-ABA2-4F3DBE40661E}" type="datetime1">
               <a:rPr lang="en-US" smtClean="0"/>
-              <a:t>11/27/16</a:t>
+              <a:t>11/29/2016</a:t>
             </a:fld>
             <a:endParaRPr lang="en-US"/>
           </a:p>
@@ -2910,7 +3269,7 @@
           </a:lstStyle>
           <a:p>
             <a:r>
-              <a:rPr lang="en-CA" smtClean="0"/>
+              <a:rPr lang="en-CA"/>
               <a:t>Click to edit Master title style</a:t>
             </a:r>
             <a:endParaRPr dirty="0"/>
@@ -3033,7 +3392,7 @@
           <a:p>
             <a:pPr lvl="0"/>
             <a:r>
-              <a:rPr lang="en-CA" smtClean="0"/>
+              <a:rPr lang="en-CA"/>
               <a:t>Click to edit Master text styles</a:t>
             </a:r>
           </a:p>
@@ -3054,9 +3413,9 @@
           <a:bodyPr/>
           <a:lstStyle/>
           <a:p>
-            <a:fld id="{7CE38E4D-051A-41E1-86A4-E56916468FD0}" type="datetimeFigureOut">
+            <a:fld id="{7A7E742C-2A8E-46FF-B5F9-FBFD4DD3A72F}" type="datetime1">
               <a:rPr lang="en-US" smtClean="0"/>
-              <a:t>11/27/16</a:t>
+              <a:t>11/29/2016</a:t>
             </a:fld>
             <a:endParaRPr lang="en-US"/>
           </a:p>
@@ -3180,7 +3539,7 @@
           <a:lstStyle/>
           <a:p>
             <a:r>
-              <a:rPr lang="en-CA" smtClean="0"/>
+              <a:rPr lang="en-CA"/>
               <a:t>Click to edit Master title style</a:t>
             </a:r>
             <a:endParaRPr/>
@@ -3282,35 +3641,35 @@
           <a:p>
             <a:pPr lvl="0"/>
             <a:r>
-              <a:rPr lang="en-CA" smtClean="0"/>
+              <a:rPr lang="en-CA"/>
               <a:t>Click to edit Master text styles</a:t>
             </a:r>
           </a:p>
           <a:p>
             <a:pPr lvl="1"/>
             <a:r>
-              <a:rPr lang="en-CA" smtClean="0"/>
+              <a:rPr lang="en-CA"/>
               <a:t>Second level</a:t>
             </a:r>
           </a:p>
           <a:p>
             <a:pPr lvl="2"/>
             <a:r>
-              <a:rPr lang="en-CA" smtClean="0"/>
+              <a:rPr lang="en-CA"/>
               <a:t>Third level</a:t>
             </a:r>
           </a:p>
           <a:p>
             <a:pPr lvl="3"/>
             <a:r>
-              <a:rPr lang="en-CA" smtClean="0"/>
+              <a:rPr lang="en-CA"/>
               <a:t>Fourth level</a:t>
             </a:r>
           </a:p>
           <a:p>
             <a:pPr lvl="4"/>
             <a:r>
-              <a:rPr lang="en-CA" smtClean="0"/>
+              <a:rPr lang="en-CA"/>
               <a:t>Fifth level</a:t>
             </a:r>
             <a:endParaRPr dirty="0"/>
@@ -3412,35 +3771,35 @@
           <a:p>
             <a:pPr lvl="0"/>
             <a:r>
-              <a:rPr lang="en-CA" smtClean="0"/>
+              <a:rPr lang="en-CA"/>
               <a:t>Click to edit Master text styles</a:t>
             </a:r>
           </a:p>
           <a:p>
             <a:pPr lvl="1"/>
             <a:r>
-              <a:rPr lang="en-CA" smtClean="0"/>
+              <a:rPr lang="en-CA"/>
               <a:t>Second level</a:t>
             </a:r>
           </a:p>
           <a:p>
             <a:pPr lvl="2"/>
             <a:r>
-              <a:rPr lang="en-CA" smtClean="0"/>
+              <a:rPr lang="en-CA"/>
               <a:t>Third level</a:t>
             </a:r>
           </a:p>
           <a:p>
             <a:pPr lvl="3"/>
             <a:r>
-              <a:rPr lang="en-CA" smtClean="0"/>
+              <a:rPr lang="en-CA"/>
               <a:t>Fourth level</a:t>
             </a:r>
           </a:p>
           <a:p>
             <a:pPr lvl="4"/>
             <a:r>
-              <a:rPr lang="en-CA" smtClean="0"/>
+              <a:rPr lang="en-CA"/>
               <a:t>Fifth level</a:t>
             </a:r>
             <a:endParaRPr dirty="0"/>
@@ -3462,9 +3821,9 @@
           <a:bodyPr/>
           <a:lstStyle/>
           <a:p>
-            <a:fld id="{7CE38E4D-051A-41E1-86A4-E56916468FD0}" type="datetimeFigureOut">
+            <a:fld id="{EC6B436B-803D-4EBD-AFA9-4A1FDDAC9946}" type="datetime1">
               <a:rPr lang="en-US" smtClean="0"/>
-              <a:t>11/27/16</a:t>
+              <a:t>11/29/2016</a:t>
             </a:fld>
             <a:endParaRPr lang="en-US"/>
           </a:p>
@@ -3592,7 +3951,7 @@
           </a:lstStyle>
           <a:p>
             <a:r>
-              <a:rPr lang="en-CA" smtClean="0"/>
+              <a:rPr lang="en-CA"/>
               <a:t>Click to edit Master title style</a:t>
             </a:r>
             <a:endParaRPr/>
@@ -3667,7 +4026,7 @@
           <a:p>
             <a:pPr lvl="0"/>
             <a:r>
-              <a:rPr lang="en-CA" smtClean="0"/>
+              <a:rPr lang="en-CA"/>
               <a:t>Click to edit Master text styles</a:t>
             </a:r>
           </a:p>
@@ -3768,35 +4127,35 @@
           <a:p>
             <a:pPr lvl="0"/>
             <a:r>
-              <a:rPr lang="en-CA" smtClean="0"/>
+              <a:rPr lang="en-CA"/>
               <a:t>Click to edit Master text styles</a:t>
             </a:r>
           </a:p>
           <a:p>
             <a:pPr lvl="1"/>
             <a:r>
-              <a:rPr lang="en-CA" smtClean="0"/>
+              <a:rPr lang="en-CA"/>
               <a:t>Second level</a:t>
             </a:r>
           </a:p>
           <a:p>
             <a:pPr lvl="2"/>
             <a:r>
-              <a:rPr lang="en-CA" smtClean="0"/>
+              <a:rPr lang="en-CA"/>
               <a:t>Third level</a:t>
             </a:r>
           </a:p>
           <a:p>
             <a:pPr lvl="3"/>
             <a:r>
-              <a:rPr lang="en-CA" smtClean="0"/>
+              <a:rPr lang="en-CA"/>
               <a:t>Fourth level</a:t>
             </a:r>
           </a:p>
           <a:p>
             <a:pPr lvl="4"/>
             <a:r>
-              <a:rPr lang="en-CA" smtClean="0"/>
+              <a:rPr lang="en-CA"/>
               <a:t>Fifth level</a:t>
             </a:r>
             <a:endParaRPr dirty="0"/>
@@ -3871,7 +4230,7 @@
           <a:p>
             <a:pPr lvl="0"/>
             <a:r>
-              <a:rPr lang="en-CA" smtClean="0"/>
+              <a:rPr lang="en-CA"/>
               <a:t>Click to edit Master text styles</a:t>
             </a:r>
           </a:p>
@@ -3972,35 +4331,35 @@
           <a:p>
             <a:pPr lvl="0"/>
             <a:r>
-              <a:rPr lang="en-CA" smtClean="0"/>
+              <a:rPr lang="en-CA"/>
               <a:t>Click to edit Master text styles</a:t>
             </a:r>
           </a:p>
           <a:p>
             <a:pPr lvl="1"/>
             <a:r>
-              <a:rPr lang="en-CA" smtClean="0"/>
+              <a:rPr lang="en-CA"/>
               <a:t>Second level</a:t>
             </a:r>
           </a:p>
           <a:p>
             <a:pPr lvl="2"/>
             <a:r>
-              <a:rPr lang="en-CA" smtClean="0"/>
+              <a:rPr lang="en-CA"/>
               <a:t>Third level</a:t>
             </a:r>
           </a:p>
           <a:p>
             <a:pPr lvl="3"/>
             <a:r>
-              <a:rPr lang="en-CA" smtClean="0"/>
+              <a:rPr lang="en-CA"/>
               <a:t>Fourth level</a:t>
             </a:r>
           </a:p>
           <a:p>
             <a:pPr lvl="4"/>
             <a:r>
-              <a:rPr lang="en-CA" smtClean="0"/>
+              <a:rPr lang="en-CA"/>
               <a:t>Fifth level</a:t>
             </a:r>
             <a:endParaRPr dirty="0"/>
@@ -4022,9 +4381,9 @@
           <a:bodyPr/>
           <a:lstStyle/>
           <a:p>
-            <a:fld id="{7CE38E4D-051A-41E1-86A4-E56916468FD0}" type="datetimeFigureOut">
+            <a:fld id="{59369CFD-0A25-4FD9-88F8-ACD9F30E477C}" type="datetime1">
               <a:rPr lang="en-US" smtClean="0"/>
-              <a:t>11/27/16</a:t>
+              <a:t>11/29/2016</a:t>
             </a:fld>
             <a:endParaRPr lang="en-US"/>
           </a:p>
@@ -4148,7 +4507,7 @@
           <a:lstStyle/>
           <a:p>
             <a:r>
-              <a:rPr lang="en-CA" smtClean="0"/>
+              <a:rPr lang="en-CA"/>
               <a:t>Click to edit Master title style</a:t>
             </a:r>
             <a:endParaRPr/>
@@ -4170,9 +4529,9 @@
           <a:bodyPr/>
           <a:lstStyle/>
           <a:p>
-            <a:fld id="{7CE38E4D-051A-41E1-86A4-E56916468FD0}" type="datetimeFigureOut">
+            <a:fld id="{8DC3DC1D-9899-460F-A841-78CA654D383D}" type="datetime1">
               <a:rPr lang="en-US" smtClean="0"/>
-              <a:t>11/27/16</a:t>
+              <a:t>11/29/2016</a:t>
             </a:fld>
             <a:endParaRPr lang="en-US"/>
           </a:p>
@@ -4260,9 +4619,9 @@
           <a:bodyPr/>
           <a:lstStyle/>
           <a:p>
-            <a:fld id="{7CE38E4D-051A-41E1-86A4-E56916468FD0}" type="datetimeFigureOut">
+            <a:fld id="{3AACFB54-97A0-49AB-97FB-216ECFDECFA0}" type="datetime1">
               <a:rPr lang="en-US" smtClean="0"/>
-              <a:t>11/27/16</a:t>
+              <a:t>11/29/2016</a:t>
             </a:fld>
             <a:endParaRPr lang="en-US"/>
           </a:p>
@@ -4400,7 +4759,7 @@
           </a:lstStyle>
           <a:p>
             <a:r>
-              <a:rPr lang="en-CA" smtClean="0"/>
+              <a:rPr lang="en-CA"/>
               <a:t>Click to edit Master title style</a:t>
             </a:r>
             <a:endParaRPr/>
@@ -4459,35 +4818,35 @@
           <a:p>
             <a:pPr lvl="0"/>
             <a:r>
-              <a:rPr lang="en-CA" smtClean="0"/>
+              <a:rPr lang="en-CA"/>
               <a:t>Click to edit Master text styles</a:t>
             </a:r>
           </a:p>
           <a:p>
             <a:pPr lvl="1"/>
             <a:r>
-              <a:rPr lang="en-CA" smtClean="0"/>
+              <a:rPr lang="en-CA"/>
               <a:t>Second level</a:t>
             </a:r>
           </a:p>
           <a:p>
             <a:pPr lvl="2"/>
             <a:r>
-              <a:rPr lang="en-CA" smtClean="0"/>
+              <a:rPr lang="en-CA"/>
               <a:t>Third level</a:t>
             </a:r>
           </a:p>
           <a:p>
             <a:pPr lvl="3"/>
             <a:r>
-              <a:rPr lang="en-CA" smtClean="0"/>
+              <a:rPr lang="en-CA"/>
               <a:t>Fourth level</a:t>
             </a:r>
           </a:p>
           <a:p>
             <a:pPr lvl="4"/>
             <a:r>
-              <a:rPr lang="en-CA" smtClean="0"/>
+              <a:rPr lang="en-CA"/>
               <a:t>Fifth level</a:t>
             </a:r>
             <a:endParaRPr dirty="0"/>
@@ -4581,7 +4940,7 @@
               <a:buNone/>
             </a:pPr>
             <a:r>
-              <a:rPr lang="en-CA" smtClean="0"/>
+              <a:rPr lang="en-CA"/>
               <a:t>Click to edit Master text styles</a:t>
             </a:r>
           </a:p>
@@ -4602,9 +4961,9 @@
           <a:bodyPr/>
           <a:lstStyle/>
           <a:p>
-            <a:fld id="{7CE38E4D-051A-41E1-86A4-E56916468FD0}" type="datetimeFigureOut">
+            <a:fld id="{8DF80C95-1EBD-48A9-8279-190D726CD90B}" type="datetime1">
               <a:rPr lang="en-US" smtClean="0"/>
-              <a:t>11/27/16</a:t>
+              <a:t>11/29/2016</a:t>
             </a:fld>
             <a:endParaRPr lang="en-US"/>
           </a:p>
@@ -4708,7 +5067,7 @@
           <a:lstStyle/>
           <a:p>
             <a:r>
-              <a:rPr lang="en-CA" smtClean="0"/>
+              <a:rPr lang="en-CA"/>
               <a:t>Click to edit Master title style</a:t>
             </a:r>
             <a:endParaRPr/>
@@ -4742,35 +5101,35 @@
           <a:p>
             <a:pPr lvl="0"/>
             <a:r>
-              <a:rPr lang="en-CA" smtClean="0"/>
+              <a:rPr lang="en-CA"/>
               <a:t>Click to edit Master text styles</a:t>
             </a:r>
           </a:p>
           <a:p>
             <a:pPr lvl="1"/>
             <a:r>
-              <a:rPr lang="en-CA" smtClean="0"/>
+              <a:rPr lang="en-CA"/>
               <a:t>Second level</a:t>
             </a:r>
           </a:p>
           <a:p>
             <a:pPr lvl="2"/>
             <a:r>
-              <a:rPr lang="en-CA" smtClean="0"/>
+              <a:rPr lang="en-CA"/>
               <a:t>Third level</a:t>
             </a:r>
           </a:p>
           <a:p>
             <a:pPr lvl="3"/>
             <a:r>
-              <a:rPr lang="en-CA" smtClean="0"/>
+              <a:rPr lang="en-CA"/>
               <a:t>Fourth level</a:t>
             </a:r>
           </a:p>
           <a:p>
             <a:pPr lvl="4"/>
             <a:r>
-              <a:rPr lang="en-CA" smtClean="0"/>
+              <a:rPr lang="en-CA"/>
               <a:t>Fifth level</a:t>
             </a:r>
             <a:endParaRPr dirty="0"/>
@@ -4811,9 +5170,9 @@
             </a:lvl1pPr>
           </a:lstStyle>
           <a:p>
-            <a:fld id="{7CE38E4D-051A-41E1-86A4-E56916468FD0}" type="datetimeFigureOut">
+            <a:fld id="{79B136B0-5659-4479-A06E-E667F6904DE6}" type="datetime1">
               <a:rPr lang="en-US" smtClean="0"/>
-              <a:t>11/27/16</a:t>
+              <a:t>11/29/2016</a:t>
             </a:fld>
             <a:endParaRPr lang="en-US"/>
           </a:p>
@@ -4967,6 +5326,7 @@
     <p:sldLayoutId id="2147483675" r:id="rId15"/>
     <p:sldLayoutId id="2147483676" r:id="rId16"/>
   </p:sldLayoutIdLst>
+  <p:hf hdr="0" ftr="0" dt="0"/>
   <p:txStyles>
     <p:titleStyle>
       <a:lvl1pPr algn="l" defTabSz="914400" rtl="0" eaLnBrk="1" latinLnBrk="0" hangingPunct="1">
@@ -5348,10 +5708,9 @@
           <a:lstStyle/>
           <a:p>
             <a:r>
-              <a:rPr lang="fr-CA" dirty="0" smtClean="0"/>
+              <a:rPr lang="fr-CA" dirty="0"/>
               <a:t>Food Truck Management</a:t>
             </a:r>
-            <a:endParaRPr lang="fr-CA" dirty="0"/>
           </a:p>
         </p:txBody>
       </p:sp>
@@ -5376,51 +5735,73 @@
           <a:lstStyle/>
           <a:p>
             <a:r>
-              <a:rPr lang="fr-CA" dirty="0" smtClean="0"/>
+              <a:rPr lang="fr-CA" dirty="0"/>
               <a:t>Noah </a:t>
             </a:r>
             <a:r>
-              <a:rPr lang="fr-CA" dirty="0" err="1" smtClean="0"/>
+              <a:rPr lang="fr-CA" dirty="0" err="1"/>
               <a:t>Levine</a:t>
             </a:r>
-            <a:endParaRPr lang="fr-CA" dirty="0" smtClean="0"/>
-          </a:p>
-          <a:p>
-            <a:r>
-              <a:rPr lang="fr-CA" dirty="0" smtClean="0"/>
+            <a:endParaRPr lang="fr-CA" dirty="0"/>
+          </a:p>
+          <a:p>
+            <a:r>
+              <a:rPr lang="fr-CA" dirty="0"/>
               <a:t>Jordan </a:t>
             </a:r>
             <a:r>
-              <a:rPr lang="fr-CA" dirty="0" err="1" smtClean="0"/>
+              <a:rPr lang="fr-CA" dirty="0" err="1"/>
               <a:t>Itzkovitz</a:t>
             </a:r>
-            <a:endParaRPr lang="fr-CA" dirty="0" smtClean="0"/>
-          </a:p>
-          <a:p>
-            <a:r>
-              <a:rPr lang="fr-CA" dirty="0" err="1" smtClean="0"/>
+            <a:endParaRPr lang="fr-CA" dirty="0"/>
+          </a:p>
+          <a:p>
+            <a:r>
+              <a:rPr lang="fr-CA" dirty="0" err="1"/>
               <a:t>Spiro</a:t>
             </a:r>
             <a:r>
-              <a:rPr lang="fr-CA" dirty="0" smtClean="0"/>
+              <a:rPr lang="fr-CA" dirty="0"/>
               <a:t> </a:t>
             </a:r>
             <a:r>
-              <a:rPr lang="fr-CA" dirty="0" err="1" smtClean="0"/>
+              <a:rPr lang="fr-CA" dirty="0" err="1"/>
               <a:t>Mavroidakos</a:t>
             </a:r>
-            <a:endParaRPr lang="fr-CA" dirty="0" smtClean="0"/>
-          </a:p>
-          <a:p>
-            <a:r>
-              <a:rPr lang="fr-CA" dirty="0" err="1" smtClean="0"/>
+            <a:endParaRPr lang="fr-CA" dirty="0"/>
+          </a:p>
+          <a:p>
+            <a:r>
+              <a:rPr lang="fr-CA" dirty="0" err="1"/>
               <a:t>Jake</a:t>
             </a:r>
             <a:r>
-              <a:rPr lang="fr-CA" dirty="0" smtClean="0"/>
+              <a:rPr lang="fr-CA" dirty="0"/>
               <a:t> Zhu</a:t>
             </a:r>
-            <a:endParaRPr lang="fr-CA" dirty="0"/>
+          </a:p>
+        </p:txBody>
+      </p:sp>
+      <p:sp>
+        <p:nvSpPr>
+          <p:cNvPr id="4" name="Slide Number Placeholder 3"/>
+          <p:cNvSpPr>
+            <a:spLocks noGrp="1"/>
+          </p:cNvSpPr>
+          <p:nvPr>
+            <p:ph type="sldNum" sz="quarter" idx="12"/>
+          </p:nvPr>
+        </p:nvSpPr>
+        <p:spPr/>
+        <p:txBody>
+          <a:bodyPr/>
+          <a:lstStyle/>
+          <a:p>
+            <a:fld id="{886BB73A-582F-4420-9A14-CB10A2B2E5E8}" type="slidenum">
+              <a:rPr lang="en-US" smtClean="0"/>
+              <a:t>1</a:t>
+            </a:fld>
+            <a:endParaRPr lang="en-US"/>
           </a:p>
         </p:txBody>
       </p:sp>
@@ -5434,13 +5815,6 @@
   <p:clrMapOvr>
     <a:masterClrMapping/>
   </p:clrMapOvr>
-  <p:timing>
-    <p:tnLst>
-      <p:par>
-        <p:cTn id="1" dur="indefinite" restart="never" nodeType="tmRoot"/>
-      </p:par>
-    </p:tnLst>
-  </p:timing>
 </p:sld>
 </file>
 
@@ -5478,7 +5852,7 @@
           <a:p>
             <a:pPr algn="ctr"/>
             <a:r>
-              <a:rPr lang="fr-CA" dirty="0" err="1" smtClean="0"/>
+              <a:rPr lang="fr-CA" dirty="0" err="1"/>
               <a:t>Testing</a:t>
             </a:r>
             <a:endParaRPr lang="fr-CA" dirty="0"/>
@@ -5501,66 +5875,66 @@
           <a:lstStyle/>
           <a:p>
             <a:r>
-              <a:rPr lang="fr-CA" dirty="0" smtClean="0"/>
+              <a:rPr lang="fr-CA" dirty="0"/>
               <a:t>Unit </a:t>
             </a:r>
             <a:r>
-              <a:rPr lang="fr-CA" dirty="0" err="1" smtClean="0"/>
+              <a:rPr lang="fr-CA" dirty="0" err="1"/>
               <a:t>Testing</a:t>
             </a:r>
-            <a:endParaRPr lang="fr-CA" dirty="0" smtClean="0"/>
+            <a:endParaRPr lang="fr-CA" dirty="0"/>
           </a:p>
           <a:p>
             <a:pPr lvl="1"/>
             <a:r>
-              <a:rPr lang="fr-CA" dirty="0" err="1" smtClean="0"/>
+              <a:rPr lang="fr-CA" dirty="0" err="1"/>
               <a:t>Tested</a:t>
             </a:r>
             <a:r>
-              <a:rPr lang="fr-CA" dirty="0" smtClean="0"/>
+              <a:rPr lang="fr-CA" dirty="0"/>
               <a:t> </a:t>
             </a:r>
             <a:r>
-              <a:rPr lang="fr-CA" dirty="0" err="1" smtClean="0"/>
+              <a:rPr lang="fr-CA" dirty="0" err="1"/>
               <a:t>Edge</a:t>
             </a:r>
             <a:r>
-              <a:rPr lang="fr-CA" dirty="0" smtClean="0"/>
+              <a:rPr lang="fr-CA" dirty="0"/>
               <a:t> Cases</a:t>
             </a:r>
           </a:p>
           <a:p>
             <a:pPr lvl="1"/>
             <a:r>
-              <a:rPr lang="fr-CA" dirty="0" err="1" smtClean="0"/>
+              <a:rPr lang="fr-CA" dirty="0" err="1"/>
               <a:t>Equivalence</a:t>
             </a:r>
             <a:r>
-              <a:rPr lang="fr-CA" dirty="0" smtClean="0"/>
+              <a:rPr lang="fr-CA" dirty="0"/>
               <a:t> </a:t>
             </a:r>
             <a:r>
-              <a:rPr lang="fr-CA" dirty="0" err="1" smtClean="0"/>
+              <a:rPr lang="fr-CA" dirty="0" err="1"/>
               <a:t>Partitioning</a:t>
             </a:r>
-            <a:endParaRPr lang="fr-CA" dirty="0" smtClean="0"/>
+            <a:endParaRPr lang="fr-CA" dirty="0"/>
           </a:p>
           <a:p>
             <a:pPr lvl="1"/>
             <a:r>
-              <a:rPr lang="fr-CA" dirty="0" smtClean="0"/>
+              <a:rPr lang="fr-CA" dirty="0"/>
               <a:t>No </a:t>
             </a:r>
             <a:r>
-              <a:rPr lang="fr-CA" dirty="0" err="1" smtClean="0"/>
+              <a:rPr lang="fr-CA" dirty="0" err="1"/>
               <a:t>Views</a:t>
             </a:r>
-            <a:endParaRPr lang="fr-CA" dirty="0" smtClean="0"/>
+            <a:endParaRPr lang="fr-CA" dirty="0"/>
           </a:p>
           <a:p>
             <a:pPr lvl="1"/>
             <a:r>
-              <a:rPr lang="fr-CA" dirty="0" smtClean="0"/>
+              <a:rPr lang="fr-CA" dirty="0"/>
               <a:t>None for Android</a:t>
             </a:r>
           </a:p>
@@ -5578,7 +5952,7 @@
           <p:nvPr/>
         </p:nvPicPr>
         <p:blipFill>
-          <a:blip r:embed="rId2">
+          <a:blip r:embed="rId2" cstate="email">
             <a:extLst>
               <a:ext uri="{28A0092B-C50C-407E-A947-70E740481C1C}">
                 <a14:useLocalDpi xmlns:a14="http://schemas.microsoft.com/office/drawing/2010/main" val="0"/>
@@ -5599,6 +5973,29 @@
           </a:prstGeom>
         </p:spPr>
       </p:pic>
+      <p:sp>
+        <p:nvSpPr>
+          <p:cNvPr id="4" name="Slide Number Placeholder 3"/>
+          <p:cNvSpPr>
+            <a:spLocks noGrp="1"/>
+          </p:cNvSpPr>
+          <p:nvPr>
+            <p:ph type="sldNum" sz="quarter" idx="12"/>
+          </p:nvPr>
+        </p:nvSpPr>
+        <p:spPr/>
+        <p:txBody>
+          <a:bodyPr/>
+          <a:lstStyle/>
+          <a:p>
+            <a:fld id="{886BB73A-582F-4420-9A14-CB10A2B2E5E8}" type="slidenum">
+              <a:rPr lang="en-US" smtClean="0"/>
+              <a:t>10</a:t>
+            </a:fld>
+            <a:endParaRPr lang="en-US"/>
+          </a:p>
+        </p:txBody>
+      </p:sp>
     </p:spTree>
     <p:extLst>
       <p:ext uri="{BB962C8B-B14F-4D97-AF65-F5344CB8AC3E}">
@@ -5609,13 +6006,6 @@
   <p:clrMapOvr>
     <a:masterClrMapping/>
   </p:clrMapOvr>
-  <p:timing>
-    <p:tnLst>
-      <p:par>
-        <p:cTn id="1" dur="indefinite" restart="never" nodeType="tmRoot"/>
-      </p:par>
-    </p:tnLst>
-  </p:timing>
 </p:sld>
 </file>
 
@@ -5653,7 +6043,7 @@
           <a:p>
             <a:pPr algn="ctr"/>
             <a:r>
-              <a:rPr lang="fr-CA" dirty="0" err="1" smtClean="0"/>
+              <a:rPr lang="fr-CA" dirty="0" err="1"/>
               <a:t>Testing</a:t>
             </a:r>
             <a:endParaRPr lang="fr-CA" dirty="0"/>
@@ -5674,6 +6064,22 @@
         <p:txBody>
           <a:bodyPr/>
           <a:lstStyle/>
+          <a:p>
+            <a:pPr lvl="1"/>
+            <a:r>
+              <a:rPr lang="fr-CA" dirty="0" err="1"/>
+              <a:t>Equivalence</a:t>
+            </a:r>
+            <a:r>
+              <a:rPr lang="fr-CA" dirty="0"/>
+              <a:t> </a:t>
+            </a:r>
+            <a:r>
+              <a:rPr lang="fr-CA" dirty="0" err="1"/>
+              <a:t>Partitioning</a:t>
+            </a:r>
+            <a:endParaRPr lang="fr-CA" dirty="0"/>
+          </a:p>
           <a:p>
             <a:pPr lvl="1"/>
             <a:r>
@@ -5697,51 +6103,38 @@
             <a:pPr lvl="2"/>
             <a:r>
               <a:rPr lang="fr-CA" dirty="0"/>
+              <a:t>Partition </a:t>
+            </a:r>
+            <a:r>
+              <a:rPr lang="fr-CA" dirty="0" err="1"/>
+              <a:t>Around</a:t>
+            </a:r>
+            <a:r>
+              <a:rPr lang="fr-CA" dirty="0"/>
+              <a:t> 0</a:t>
+            </a:r>
+          </a:p>
+          <a:p>
+            <a:pPr lvl="2"/>
+            <a:r>
+              <a:rPr lang="fr-CA" dirty="0"/>
               <a:t>No </a:t>
             </a:r>
             <a:r>
-              <a:rPr lang="fr-CA" dirty="0" err="1" smtClean="0"/>
+              <a:rPr lang="fr-CA" dirty="0" err="1"/>
               <a:t>name</a:t>
             </a:r>
-            <a:endParaRPr lang="fr-CA" dirty="0" smtClean="0"/>
+            <a:endParaRPr lang="fr-CA" dirty="0"/>
           </a:p>
           <a:p>
             <a:pPr lvl="2"/>
             <a:r>
-              <a:rPr lang="fr-CA" dirty="0" smtClean="0"/>
+              <a:rPr lang="fr-CA" dirty="0"/>
               <a:t>Name </a:t>
             </a:r>
             <a:r>
-              <a:rPr lang="fr-CA" dirty="0" err="1" smtClean="0"/>
+              <a:rPr lang="fr-CA" dirty="0" err="1"/>
               <a:t>with</a:t>
-            </a:r>
-            <a:r>
-              <a:rPr lang="fr-CA" dirty="0" smtClean="0"/>
-              <a:t> </a:t>
-            </a:r>
-            <a:r>
-              <a:rPr lang="fr-CA" dirty="0" err="1" smtClean="0"/>
-              <a:t>Spaces</a:t>
-            </a:r>
-            <a:endParaRPr lang="fr-CA" dirty="0"/>
-          </a:p>
-          <a:p>
-            <a:pPr lvl="2"/>
-            <a:r>
-              <a:rPr lang="fr-CA" dirty="0"/>
-              <a:t>0 </a:t>
-            </a:r>
-            <a:r>
-              <a:rPr lang="fr-CA" dirty="0" err="1"/>
-              <a:t>supply</a:t>
-            </a:r>
-            <a:endParaRPr lang="fr-CA" dirty="0"/>
-          </a:p>
-          <a:p>
-            <a:pPr lvl="2"/>
-            <a:r>
-              <a:rPr lang="fr-CA" dirty="0" err="1"/>
-              <a:t>Negative</a:t>
             </a:r>
             <a:r>
               <a:rPr lang="fr-CA" dirty="0"/>
@@ -5749,7 +6142,7 @@
             </a:r>
             <a:r>
               <a:rPr lang="fr-CA" dirty="0" err="1"/>
-              <a:t>Supply</a:t>
+              <a:t>Spaces</a:t>
             </a:r>
             <a:endParaRPr lang="fr-CA" dirty="0"/>
           </a:p>
@@ -5767,7 +6160,7 @@
           <p:nvPr/>
         </p:nvPicPr>
         <p:blipFill>
-          <a:blip r:embed="rId2">
+          <a:blip r:embed="rId2" cstate="email">
             <a:extLst>
               <a:ext uri="{28A0092B-C50C-407E-A947-70E740481C1C}">
                 <a14:useLocalDpi xmlns:a14="http://schemas.microsoft.com/office/drawing/2010/main" val="0"/>
@@ -5788,6 +6181,29 @@
           </a:prstGeom>
         </p:spPr>
       </p:pic>
+      <p:sp>
+        <p:nvSpPr>
+          <p:cNvPr id="4" name="Slide Number Placeholder 3"/>
+          <p:cNvSpPr>
+            <a:spLocks noGrp="1"/>
+          </p:cNvSpPr>
+          <p:nvPr>
+            <p:ph type="sldNum" sz="quarter" idx="12"/>
+          </p:nvPr>
+        </p:nvSpPr>
+        <p:spPr/>
+        <p:txBody>
+          <a:bodyPr/>
+          <a:lstStyle/>
+          <a:p>
+            <a:fld id="{886BB73A-582F-4420-9A14-CB10A2B2E5E8}" type="slidenum">
+              <a:rPr lang="en-US" smtClean="0"/>
+              <a:t>11</a:t>
+            </a:fld>
+            <a:endParaRPr lang="en-US"/>
+          </a:p>
+        </p:txBody>
+      </p:sp>
     </p:spTree>
     <p:extLst>
       <p:ext uri="{BB962C8B-B14F-4D97-AF65-F5344CB8AC3E}">
@@ -5798,13 +6214,6 @@
   <p:clrMapOvr>
     <a:masterClrMapping/>
   </p:clrMapOvr>
-  <p:timing>
-    <p:tnLst>
-      <p:par>
-        <p:cTn id="1" dur="indefinite" restart="never" nodeType="tmRoot"/>
-      </p:par>
-    </p:tnLst>
-  </p:timing>
 </p:sld>
 </file>
 
@@ -5832,63 +6241,283 @@
             <a:spLocks noGrp="1"/>
           </p:cNvSpPr>
           <p:nvPr>
-            <p:ph type="title"/>
-          </p:nvPr>
-        </p:nvSpPr>
-        <p:spPr/>
-        <p:txBody>
-          <a:bodyPr/>
-          <a:lstStyle/>
-          <a:p>
-            <a:pPr algn="ctr"/>
-            <a:r>
-              <a:rPr lang="fr-CA" dirty="0" smtClean="0"/>
+            <p:ph type="ctrTitle"/>
+          </p:nvPr>
+        </p:nvSpPr>
+        <p:spPr>
+          <a:xfrm>
+            <a:off x="1143000" y="1092353"/>
+            <a:ext cx="6858000" cy="806786"/>
+          </a:xfrm>
+        </p:spPr>
+        <p:txBody>
+          <a:bodyPr/>
+          <a:lstStyle/>
+          <a:p>
+            <a:r>
+              <a:rPr lang="en-CA" dirty="0"/>
               <a:t>Release Pipeline</a:t>
             </a:r>
-            <a:endParaRPr lang="fr-CA" dirty="0"/>
-          </a:p>
-        </p:txBody>
-      </p:sp>
-      <p:sp>
-        <p:nvSpPr>
-          <p:cNvPr id="3" name="Content Placeholder 2"/>
-          <p:cNvSpPr>
-            <a:spLocks noGrp="1"/>
-          </p:cNvSpPr>
-          <p:nvPr>
-            <p:ph idx="1"/>
-          </p:nvPr>
-        </p:nvSpPr>
-        <p:spPr/>
-        <p:txBody>
-          <a:bodyPr/>
-          <a:lstStyle/>
-          <a:p>
-            <a:r>
-              <a:rPr lang="fr-CA" dirty="0" smtClean="0"/>
-              <a:t>TBD TOMORROW</a:t>
-            </a:r>
-            <a:endParaRPr lang="fr-CA" dirty="0"/>
+          </a:p>
+        </p:txBody>
+      </p:sp>
+      <p:sp>
+        <p:nvSpPr>
+          <p:cNvPr id="3" name="Subtitle 2"/>
+          <p:cNvSpPr>
+            <a:spLocks noGrp="1"/>
+          </p:cNvSpPr>
+          <p:nvPr>
+            <p:ph type="subTitle" idx="1"/>
+          </p:nvPr>
+        </p:nvSpPr>
+        <p:spPr>
+          <a:xfrm>
+            <a:off x="397852" y="2222256"/>
+            <a:ext cx="2450856" cy="2591533"/>
+          </a:xfrm>
+        </p:spPr>
+        <p:txBody>
+          <a:bodyPr>
+            <a:noAutofit/>
+          </a:bodyPr>
+          <a:lstStyle/>
+          <a:p>
+            <a:pPr algn="l"/>
+            <a:r>
+              <a:rPr lang="en-CA" sz="2000" dirty="0"/>
+              <a:t>Available for :</a:t>
+            </a:r>
+          </a:p>
+          <a:p>
+            <a:pPr marL="257175" indent="-257175" algn="l">
+              <a:buFont typeface="Arial" panose="020B0604020202020204" pitchFamily="34" charset="0"/>
+              <a:buChar char="•"/>
+            </a:pPr>
+            <a:r>
+              <a:rPr lang="en-CA" sz="2000" dirty="0"/>
+              <a:t>Android</a:t>
+            </a:r>
+          </a:p>
+          <a:p>
+            <a:pPr marL="257175" indent="-257175" algn="l">
+              <a:buFont typeface="Arial" panose="020B0604020202020204" pitchFamily="34" charset="0"/>
+              <a:buChar char="•"/>
+            </a:pPr>
+            <a:r>
+              <a:rPr lang="en-CA" sz="2000" dirty="0"/>
+              <a:t>IOS</a:t>
+            </a:r>
+          </a:p>
+          <a:p>
+            <a:pPr marL="257175" indent="-257175" algn="l">
+              <a:buFont typeface="Arial" panose="020B0604020202020204" pitchFamily="34" charset="0"/>
+              <a:buChar char="•"/>
+            </a:pPr>
+            <a:r>
+              <a:rPr lang="en-CA" sz="2000" dirty="0"/>
+              <a:t>Personal computers</a:t>
+            </a:r>
+          </a:p>
+        </p:txBody>
+      </p:sp>
+      <p:pic>
+        <p:nvPicPr>
+          <p:cNvPr id="1026" name="Picture 2" descr="Image result for android png"/>
+          <p:cNvPicPr>
+            <a:picLocks noChangeAspect="1" noChangeArrowheads="1"/>
+          </p:cNvPicPr>
+          <p:nvPr/>
+        </p:nvPicPr>
+        <p:blipFill>
+          <a:blip r:embed="rId2" cstate="email">
+            <a:extLst>
+              <a:ext uri="{28A0092B-C50C-407E-A947-70E740481C1C}">
+                <a14:useLocalDpi xmlns:a14="http://schemas.microsoft.com/office/drawing/2010/main" val="0"/>
+              </a:ext>
+            </a:extLst>
+          </a:blip>
+          <a:srcRect/>
+          <a:stretch>
+            <a:fillRect/>
+          </a:stretch>
+        </p:blipFill>
+        <p:spPr bwMode="auto">
+          <a:xfrm>
+            <a:off x="3768127" y="2119781"/>
+            <a:ext cx="1925240" cy="1540192"/>
+          </a:xfrm>
+          <a:prstGeom prst="rect">
+            <a:avLst/>
+          </a:prstGeom>
+          <a:noFill/>
+          <a:extLst>
+            <a:ext uri="{909E8E84-426E-40DD-AFC4-6F175D3DCCD1}">
+              <a14:hiddenFill xmlns:a14="http://schemas.microsoft.com/office/drawing/2010/main">
+                <a:solidFill>
+                  <a:srgbClr val="FFFFFF"/>
+                </a:solidFill>
+              </a14:hiddenFill>
+            </a:ext>
+          </a:extLst>
+        </p:spPr>
+      </p:pic>
+      <p:pic>
+        <p:nvPicPr>
+          <p:cNvPr id="1028" name="Picture 4" descr="Image result for IOS"/>
+          <p:cNvPicPr>
+            <a:picLocks noChangeAspect="1" noChangeArrowheads="1"/>
+          </p:cNvPicPr>
+          <p:nvPr/>
+        </p:nvPicPr>
+        <p:blipFill>
+          <a:blip r:embed="rId3" cstate="email">
+            <a:extLst>
+              <a:ext uri="{28A0092B-C50C-407E-A947-70E740481C1C}">
+                <a14:useLocalDpi xmlns:a14="http://schemas.microsoft.com/office/drawing/2010/main" val="0"/>
+              </a:ext>
+            </a:extLst>
+          </a:blip>
+          <a:srcRect/>
+          <a:stretch>
+            <a:fillRect/>
+          </a:stretch>
+        </p:blipFill>
+        <p:spPr bwMode="auto">
+          <a:xfrm>
+            <a:off x="4036299" y="3880614"/>
+            <a:ext cx="1388896" cy="1388896"/>
+          </a:xfrm>
+          <a:prstGeom prst="rect">
+            <a:avLst/>
+          </a:prstGeom>
+          <a:noFill/>
+          <a:extLst>
+            <a:ext uri="{909E8E84-426E-40DD-AFC4-6F175D3DCCD1}">
+              <a14:hiddenFill xmlns:a14="http://schemas.microsoft.com/office/drawing/2010/main">
+                <a:solidFill>
+                  <a:srgbClr val="FFFFFF"/>
+                </a:solidFill>
+              </a14:hiddenFill>
+            </a:ext>
+          </a:extLst>
+        </p:spPr>
+      </p:pic>
+      <p:pic>
+        <p:nvPicPr>
+          <p:cNvPr id="1030" name="Picture 6" descr="Image result for pc"/>
+          <p:cNvPicPr>
+            <a:picLocks noChangeAspect="1" noChangeArrowheads="1"/>
+          </p:cNvPicPr>
+          <p:nvPr/>
+        </p:nvPicPr>
+        <p:blipFill>
+          <a:blip r:embed="rId4" cstate="email">
+            <a:extLst>
+              <a:ext uri="{28A0092B-C50C-407E-A947-70E740481C1C}">
+                <a14:useLocalDpi xmlns:a14="http://schemas.microsoft.com/office/drawing/2010/main" val="0"/>
+              </a:ext>
+            </a:extLst>
+          </a:blip>
+          <a:srcRect/>
+          <a:stretch>
+            <a:fillRect/>
+          </a:stretch>
+        </p:blipFill>
+        <p:spPr bwMode="auto">
+          <a:xfrm>
+            <a:off x="5733678" y="2222257"/>
+            <a:ext cx="2554978" cy="1437716"/>
+          </a:xfrm>
+          <a:prstGeom prst="rect">
+            <a:avLst/>
+          </a:prstGeom>
+          <a:noFill/>
+          <a:extLst>
+            <a:ext uri="{909E8E84-426E-40DD-AFC4-6F175D3DCCD1}">
+              <a14:hiddenFill xmlns:a14="http://schemas.microsoft.com/office/drawing/2010/main">
+                <a:solidFill>
+                  <a:srgbClr val="FFFFFF"/>
+                </a:solidFill>
+              </a14:hiddenFill>
+            </a:ext>
+          </a:extLst>
+        </p:spPr>
+      </p:pic>
+      <p:pic>
+        <p:nvPicPr>
+          <p:cNvPr id="1036" name="Picture 12" descr="Image result for mac"/>
+          <p:cNvPicPr>
+            <a:picLocks noChangeAspect="1" noChangeArrowheads="1"/>
+          </p:cNvPicPr>
+          <p:nvPr/>
+        </p:nvPicPr>
+        <p:blipFill>
+          <a:blip r:embed="rId5" cstate="email">
+            <a:extLst>
+              <a:ext uri="{28A0092B-C50C-407E-A947-70E740481C1C}">
+                <a14:useLocalDpi xmlns:a14="http://schemas.microsoft.com/office/drawing/2010/main" val="0"/>
+              </a:ext>
+            </a:extLst>
+          </a:blip>
+          <a:srcRect/>
+          <a:stretch>
+            <a:fillRect/>
+          </a:stretch>
+        </p:blipFill>
+        <p:spPr bwMode="auto">
+          <a:xfrm>
+            <a:off x="6009816" y="3917237"/>
+            <a:ext cx="2278840" cy="1315650"/>
+          </a:xfrm>
+          <a:prstGeom prst="rect">
+            <a:avLst/>
+          </a:prstGeom>
+          <a:noFill/>
+          <a:extLst>
+            <a:ext uri="{909E8E84-426E-40DD-AFC4-6F175D3DCCD1}">
+              <a14:hiddenFill xmlns:a14="http://schemas.microsoft.com/office/drawing/2010/main">
+                <a:solidFill>
+                  <a:srgbClr val="FFFFFF"/>
+                </a:solidFill>
+              </a14:hiddenFill>
+            </a:ext>
+          </a:extLst>
+        </p:spPr>
+      </p:pic>
+      <p:sp>
+        <p:nvSpPr>
+          <p:cNvPr id="4" name="Slide Number Placeholder 3"/>
+          <p:cNvSpPr>
+            <a:spLocks noGrp="1"/>
+          </p:cNvSpPr>
+          <p:nvPr>
+            <p:ph type="sldNum" sz="quarter" idx="12"/>
+          </p:nvPr>
+        </p:nvSpPr>
+        <p:spPr/>
+        <p:txBody>
+          <a:bodyPr/>
+          <a:lstStyle/>
+          <a:p>
+            <a:fld id="{886BB73A-582F-4420-9A14-CB10A2B2E5E8}" type="slidenum">
+              <a:rPr lang="en-US" smtClean="0"/>
+              <a:t>12</a:t>
+            </a:fld>
+            <a:endParaRPr lang="en-US"/>
           </a:p>
         </p:txBody>
       </p:sp>
     </p:spTree>
     <p:extLst>
       <p:ext uri="{BB962C8B-B14F-4D97-AF65-F5344CB8AC3E}">
-        <p14:creationId xmlns:p14="http://schemas.microsoft.com/office/powerpoint/2010/main" val="1399793637"/>
+        <p14:creationId xmlns:p14="http://schemas.microsoft.com/office/powerpoint/2010/main" val="195821075"/>
       </p:ext>
     </p:extLst>
   </p:cSld>
   <p:clrMapOvr>
     <a:masterClrMapping/>
   </p:clrMapOvr>
-  <p:timing>
-    <p:tnLst>
-      <p:par>
-        <p:cTn id="1" dur="indefinite" restart="never" nodeType="tmRoot"/>
-      </p:par>
-    </p:tnLst>
-  </p:timing>
 </p:sld>
 </file>
 
@@ -5919,76 +6548,153 @@
             <p:ph type="title"/>
           </p:nvPr>
         </p:nvSpPr>
-        <p:spPr>
-          <a:xfrm>
-            <a:off x="415925" y="1276566"/>
-            <a:ext cx="8308975" cy="1143000"/>
-          </a:xfrm>
-        </p:spPr>
-        <p:txBody>
-          <a:bodyPr/>
-          <a:lstStyle/>
-          <a:p>
-            <a:pPr algn="ctr"/>
-            <a:r>
-              <a:rPr lang="fr-CA" dirty="0" smtClean="0"/>
-              <a:t>Cool </a:t>
-            </a:r>
-            <a:r>
-              <a:rPr lang="fr-CA" dirty="0" err="1" smtClean="0"/>
-              <a:t>Features</a:t>
-            </a:r>
-            <a:endParaRPr lang="fr-CA" dirty="0"/>
+        <p:spPr/>
+        <p:txBody>
+          <a:bodyPr/>
+          <a:lstStyle/>
+          <a:p>
+            <a:r>
+              <a:rPr lang="en-CA" dirty="0"/>
+              <a:t>Release Pipeline</a:t>
+            </a:r>
+          </a:p>
+        </p:txBody>
+      </p:sp>
+      <p:sp>
+        <p:nvSpPr>
+          <p:cNvPr id="4" name="Content Placeholder 3"/>
+          <p:cNvSpPr>
+            <a:spLocks noGrp="1"/>
+          </p:cNvSpPr>
+          <p:nvPr>
+            <p:ph idx="1"/>
+          </p:nvPr>
+        </p:nvSpPr>
+        <p:spPr/>
+        <p:txBody>
+          <a:bodyPr/>
+          <a:lstStyle/>
+          <a:p>
+            <a:r>
+              <a:rPr lang="en-CA" dirty="0"/>
+              <a:t>3 Phases:</a:t>
+            </a:r>
+          </a:p>
+          <a:p>
+            <a:pPr marL="685800" lvl="1" indent="-342900">
+              <a:lnSpc>
+                <a:spcPct val="150000"/>
+              </a:lnSpc>
+              <a:buFont typeface="+mj-lt"/>
+              <a:buAutoNum type="arabicPeriod"/>
+            </a:pPr>
+            <a:r>
+              <a:rPr lang="en-CA" sz="2100" dirty="0"/>
+              <a:t>Integration</a:t>
+            </a:r>
+          </a:p>
+          <a:p>
+            <a:pPr marL="685800" lvl="1" indent="-342900">
+              <a:lnSpc>
+                <a:spcPct val="150000"/>
+              </a:lnSpc>
+              <a:buFont typeface="+mj-lt"/>
+              <a:buAutoNum type="arabicPeriod"/>
+            </a:pPr>
+            <a:r>
+              <a:rPr lang="en-CA" sz="2100" dirty="0"/>
+              <a:t>Build </a:t>
+            </a:r>
+          </a:p>
+          <a:p>
+            <a:pPr marL="685800" lvl="1" indent="-342900">
+              <a:lnSpc>
+                <a:spcPct val="150000"/>
+              </a:lnSpc>
+              <a:buFont typeface="+mj-lt"/>
+              <a:buAutoNum type="arabicPeriod"/>
+            </a:pPr>
+            <a:r>
+              <a:rPr lang="en-CA" sz="2100" dirty="0"/>
+              <a:t>Deployment</a:t>
+            </a:r>
           </a:p>
         </p:txBody>
       </p:sp>
       <p:pic>
         <p:nvPicPr>
-          <p:cNvPr id="6" name="Picture 5" descr="Screen Shot 2016-11-26 at 11.16.07 PM.png"/>
+          <p:cNvPr id="3076" name="Picture 4" descr="http://zeroturnaround.com/wp-content/uploads/2012/08/Deployment-pipeline1.jpg"/>
           <p:cNvPicPr>
-            <a:picLocks noChangeAspect="1"/>
+            <a:picLocks noChangeAspect="1" noChangeArrowheads="1"/>
           </p:cNvPicPr>
           <p:nvPr/>
         </p:nvPicPr>
         <p:blipFill>
-          <a:blip r:embed="rId2">
+          <a:blip r:embed="rId2" cstate="email">
             <a:extLst>
               <a:ext uri="{28A0092B-C50C-407E-A947-70E740481C1C}">
                 <a14:useLocalDpi xmlns:a14="http://schemas.microsoft.com/office/drawing/2010/main" val="0"/>
               </a:ext>
             </a:extLst>
           </a:blip>
+          <a:srcRect/>
           <a:stretch>
             <a:fillRect/>
           </a:stretch>
         </p:blipFill>
-        <p:spPr>
-          <a:xfrm>
-            <a:off x="2879558" y="2599765"/>
-            <a:ext cx="3831389" cy="3846838"/>
+        <p:spPr bwMode="auto">
+          <a:xfrm>
+            <a:off x="3893198" y="3454257"/>
+            <a:ext cx="4286250" cy="928688"/>
           </a:xfrm>
           <a:prstGeom prst="rect">
             <a:avLst/>
           </a:prstGeom>
+          <a:noFill/>
+          <a:extLst>
+            <a:ext uri="{909E8E84-426E-40DD-AFC4-6F175D3DCCD1}">
+              <a14:hiddenFill xmlns:a14="http://schemas.microsoft.com/office/drawing/2010/main">
+                <a:solidFill>
+                  <a:srgbClr val="FFFFFF"/>
+                </a:solidFill>
+              </a14:hiddenFill>
+            </a:ext>
+          </a:extLst>
         </p:spPr>
       </p:pic>
+      <p:sp>
+        <p:nvSpPr>
+          <p:cNvPr id="3" name="Slide Number Placeholder 2"/>
+          <p:cNvSpPr>
+            <a:spLocks noGrp="1"/>
+          </p:cNvSpPr>
+          <p:nvPr>
+            <p:ph type="sldNum" sz="quarter" idx="12"/>
+          </p:nvPr>
+        </p:nvSpPr>
+        <p:spPr/>
+        <p:txBody>
+          <a:bodyPr/>
+          <a:lstStyle/>
+          <a:p>
+            <a:fld id="{886BB73A-582F-4420-9A14-CB10A2B2E5E8}" type="slidenum">
+              <a:rPr lang="en-US" smtClean="0"/>
+              <a:t>13</a:t>
+            </a:fld>
+            <a:endParaRPr lang="en-US"/>
+          </a:p>
+        </p:txBody>
+      </p:sp>
     </p:spTree>
     <p:extLst>
       <p:ext uri="{BB962C8B-B14F-4D97-AF65-F5344CB8AC3E}">
-        <p14:creationId xmlns:p14="http://schemas.microsoft.com/office/powerpoint/2010/main" val="1688917300"/>
+        <p14:creationId xmlns:p14="http://schemas.microsoft.com/office/powerpoint/2010/main" val="182093774"/>
       </p:ext>
     </p:extLst>
   </p:cSld>
   <p:clrMapOvr>
     <a:masterClrMapping/>
   </p:clrMapOvr>
-  <p:timing>
-    <p:tnLst>
-      <p:par>
-        <p:cTn id="1" dur="indefinite" restart="never" nodeType="tmRoot"/>
-      </p:par>
-    </p:tnLst>
-  </p:timing>
 </p:sld>
 </file>
 
@@ -6024,17 +6730,630 @@
           <a:bodyPr/>
           <a:lstStyle/>
           <a:p>
+            <a:r>
+              <a:rPr lang="en-CA" dirty="0"/>
+              <a:t>Integration</a:t>
+            </a:r>
+          </a:p>
+        </p:txBody>
+      </p:sp>
+      <p:sp>
+        <p:nvSpPr>
+          <p:cNvPr id="3" name="Content Placeholder 2"/>
+          <p:cNvSpPr>
+            <a:spLocks noGrp="1"/>
+          </p:cNvSpPr>
+          <p:nvPr>
+            <p:ph idx="1"/>
+          </p:nvPr>
+        </p:nvSpPr>
+        <p:spPr>
+          <a:xfrm>
+            <a:off x="415925" y="2806460"/>
+            <a:ext cx="3341771" cy="3263504"/>
+          </a:xfrm>
+        </p:spPr>
+        <p:txBody>
+          <a:bodyPr/>
+          <a:lstStyle/>
+          <a:p>
+            <a:r>
+              <a:rPr lang="en-CA" dirty="0"/>
+              <a:t>Unit Testing </a:t>
+            </a:r>
+          </a:p>
+          <a:p>
+            <a:r>
+              <a:rPr lang="en-CA" dirty="0"/>
+              <a:t>Integration Testing</a:t>
+            </a:r>
+          </a:p>
+          <a:p>
+            <a:r>
+              <a:rPr lang="en-CA" dirty="0"/>
+              <a:t>Automated testing</a:t>
+            </a:r>
+          </a:p>
+          <a:p>
+            <a:r>
+              <a:rPr lang="en-CA" dirty="0"/>
+              <a:t>Code reviews</a:t>
+            </a:r>
+          </a:p>
+        </p:txBody>
+      </p:sp>
+      <p:pic>
+        <p:nvPicPr>
+          <p:cNvPr id="4098" name="Picture 2" descr="http://ardalis.com/wp-content/files/media/image/Windows-Live-Writer/57c036e98a36_12C55/image_9.png"/>
+          <p:cNvPicPr>
+            <a:picLocks noChangeAspect="1" noChangeArrowheads="1"/>
+          </p:cNvPicPr>
+          <p:nvPr/>
+        </p:nvPicPr>
+        <p:blipFill>
+          <a:blip r:embed="rId2" cstate="email">
+            <a:extLst>
+              <a:ext uri="{28A0092B-C50C-407E-A947-70E740481C1C}">
+                <a14:useLocalDpi xmlns:a14="http://schemas.microsoft.com/office/drawing/2010/main" val="0"/>
+              </a:ext>
+            </a:extLst>
+          </a:blip>
+          <a:srcRect/>
+          <a:stretch>
+            <a:fillRect/>
+          </a:stretch>
+        </p:blipFill>
+        <p:spPr bwMode="auto">
+          <a:xfrm>
+            <a:off x="3230104" y="3067658"/>
+            <a:ext cx="3233862" cy="2312946"/>
+          </a:xfrm>
+          <a:prstGeom prst="rect">
+            <a:avLst/>
+          </a:prstGeom>
+          <a:noFill/>
+          <a:extLst>
+            <a:ext uri="{909E8E84-426E-40DD-AFC4-6F175D3DCCD1}">
+              <a14:hiddenFill xmlns:a14="http://schemas.microsoft.com/office/drawing/2010/main">
+                <a:solidFill>
+                  <a:srgbClr val="FFFFFF"/>
+                </a:solidFill>
+              </a14:hiddenFill>
+            </a:ext>
+          </a:extLst>
+        </p:spPr>
+      </p:pic>
+      <p:pic>
+        <p:nvPicPr>
+          <p:cNvPr id="4100" name="Picture 4" descr="http://www.ibeta.com/wp-content/uploads/Code-Review.jpg"/>
+          <p:cNvPicPr>
+            <a:picLocks noChangeAspect="1" noChangeArrowheads="1"/>
+          </p:cNvPicPr>
+          <p:nvPr/>
+        </p:nvPicPr>
+        <p:blipFill>
+          <a:blip r:embed="rId3" cstate="email">
+            <a:extLst>
+              <a:ext uri="{28A0092B-C50C-407E-A947-70E740481C1C}">
+                <a14:useLocalDpi xmlns:a14="http://schemas.microsoft.com/office/drawing/2010/main" val="0"/>
+              </a:ext>
+            </a:extLst>
+          </a:blip>
+          <a:srcRect/>
+          <a:stretch>
+            <a:fillRect/>
+          </a:stretch>
+        </p:blipFill>
+        <p:spPr bwMode="auto">
+          <a:xfrm>
+            <a:off x="6571875" y="2993014"/>
+            <a:ext cx="2312945" cy="2312945"/>
+          </a:xfrm>
+          <a:prstGeom prst="rect">
+            <a:avLst/>
+          </a:prstGeom>
+          <a:noFill/>
+          <a:extLst>
+            <a:ext uri="{909E8E84-426E-40DD-AFC4-6F175D3DCCD1}">
+              <a14:hiddenFill xmlns:a14="http://schemas.microsoft.com/office/drawing/2010/main">
+                <a:solidFill>
+                  <a:srgbClr val="FFFFFF"/>
+                </a:solidFill>
+              </a14:hiddenFill>
+            </a:ext>
+          </a:extLst>
+        </p:spPr>
+      </p:pic>
+      <p:sp>
+        <p:nvSpPr>
+          <p:cNvPr id="4" name="Slide Number Placeholder 3"/>
+          <p:cNvSpPr>
+            <a:spLocks noGrp="1"/>
+          </p:cNvSpPr>
+          <p:nvPr>
+            <p:ph type="sldNum" sz="quarter" idx="12"/>
+          </p:nvPr>
+        </p:nvSpPr>
+        <p:spPr/>
+        <p:txBody>
+          <a:bodyPr/>
+          <a:lstStyle/>
+          <a:p>
+            <a:fld id="{886BB73A-582F-4420-9A14-CB10A2B2E5E8}" type="slidenum">
+              <a:rPr lang="en-US" smtClean="0"/>
+              <a:t>14</a:t>
+            </a:fld>
+            <a:endParaRPr lang="en-US"/>
+          </a:p>
+        </p:txBody>
+      </p:sp>
+    </p:spTree>
+    <p:extLst>
+      <p:ext uri="{BB962C8B-B14F-4D97-AF65-F5344CB8AC3E}">
+        <p14:creationId xmlns:p14="http://schemas.microsoft.com/office/powerpoint/2010/main" val="3569090430"/>
+      </p:ext>
+    </p:extLst>
+  </p:cSld>
+  <p:clrMapOvr>
+    <a:masterClrMapping/>
+  </p:clrMapOvr>
+</p:sld>
+</file>
+
+<file path=ppt/slides/slide15.xml><?xml version="1.0" encoding="utf-8"?>
+<p:sld xmlns:a="http://schemas.openxmlformats.org/drawingml/2006/main" xmlns:r="http://schemas.openxmlformats.org/officeDocument/2006/relationships" xmlns:p="http://schemas.openxmlformats.org/presentationml/2006/main">
+  <p:cSld>
+    <p:spTree>
+      <p:nvGrpSpPr>
+        <p:cNvPr id="1" name=""/>
+        <p:cNvGrpSpPr/>
+        <p:nvPr/>
+      </p:nvGrpSpPr>
+      <p:grpSpPr>
+        <a:xfrm>
+          <a:off x="0" y="0"/>
+          <a:ext cx="0" cy="0"/>
+          <a:chOff x="0" y="0"/>
+          <a:chExt cx="0" cy="0"/>
+        </a:xfrm>
+      </p:grpSpPr>
+      <p:sp>
+        <p:nvSpPr>
+          <p:cNvPr id="2" name="Title 1"/>
+          <p:cNvSpPr>
+            <a:spLocks noGrp="1"/>
+          </p:cNvSpPr>
+          <p:nvPr>
+            <p:ph type="title"/>
+          </p:nvPr>
+        </p:nvSpPr>
+        <p:spPr/>
+        <p:txBody>
+          <a:bodyPr/>
+          <a:lstStyle/>
+          <a:p>
+            <a:r>
+              <a:rPr lang="en-CA" dirty="0"/>
+              <a:t>Build</a:t>
+            </a:r>
+          </a:p>
+        </p:txBody>
+      </p:sp>
+      <p:sp>
+        <p:nvSpPr>
+          <p:cNvPr id="3" name="Content Placeholder 2"/>
+          <p:cNvSpPr>
+            <a:spLocks noGrp="1"/>
+          </p:cNvSpPr>
+          <p:nvPr>
+            <p:ph idx="1"/>
+          </p:nvPr>
+        </p:nvSpPr>
+        <p:spPr>
+          <a:xfrm>
+            <a:off x="415925" y="2907955"/>
+            <a:ext cx="3113171" cy="3263504"/>
+          </a:xfrm>
+        </p:spPr>
+        <p:txBody>
+          <a:bodyPr/>
+          <a:lstStyle/>
+          <a:p>
+            <a:r>
+              <a:rPr lang="en-CA" dirty="0"/>
+              <a:t>No Build system</a:t>
+            </a:r>
+          </a:p>
+          <a:p>
+            <a:endParaRPr lang="en-CA" dirty="0"/>
+          </a:p>
+        </p:txBody>
+      </p:sp>
+      <p:pic>
+        <p:nvPicPr>
+          <p:cNvPr id="5130" name="Picture 10" descr="http://valuebound.com/sites/default/files/2015-12/Beginners_guide_setting_up-git.jpg"/>
+          <p:cNvPicPr>
+            <a:picLocks noChangeAspect="1" noChangeArrowheads="1"/>
+          </p:cNvPicPr>
+          <p:nvPr/>
+        </p:nvPicPr>
+        <p:blipFill>
+          <a:blip r:embed="rId2" cstate="email">
+            <a:extLst>
+              <a:ext uri="{28A0092B-C50C-407E-A947-70E740481C1C}">
+                <a14:useLocalDpi xmlns:a14="http://schemas.microsoft.com/office/drawing/2010/main" val="0"/>
+              </a:ext>
+            </a:extLst>
+          </a:blip>
+          <a:srcRect/>
+          <a:stretch>
+            <a:fillRect/>
+          </a:stretch>
+        </p:blipFill>
+        <p:spPr bwMode="auto">
+          <a:xfrm>
+            <a:off x="4222896" y="3076259"/>
+            <a:ext cx="2143125" cy="2143125"/>
+          </a:xfrm>
+          <a:prstGeom prst="rect">
+            <a:avLst/>
+          </a:prstGeom>
+          <a:noFill/>
+          <a:extLst>
+            <a:ext uri="{909E8E84-426E-40DD-AFC4-6F175D3DCCD1}">
+              <a14:hiddenFill xmlns:a14="http://schemas.microsoft.com/office/drawing/2010/main">
+                <a:solidFill>
+                  <a:srgbClr val="FFFFFF"/>
+                </a:solidFill>
+              </a14:hiddenFill>
+            </a:ext>
+          </a:extLst>
+        </p:spPr>
+      </p:pic>
+      <p:sp>
+        <p:nvSpPr>
+          <p:cNvPr id="4" name="Slide Number Placeholder 3"/>
+          <p:cNvSpPr>
+            <a:spLocks noGrp="1"/>
+          </p:cNvSpPr>
+          <p:nvPr>
+            <p:ph type="sldNum" sz="quarter" idx="12"/>
+          </p:nvPr>
+        </p:nvSpPr>
+        <p:spPr/>
+        <p:txBody>
+          <a:bodyPr/>
+          <a:lstStyle/>
+          <a:p>
+            <a:fld id="{886BB73A-582F-4420-9A14-CB10A2B2E5E8}" type="slidenum">
+              <a:rPr lang="en-US" smtClean="0"/>
+              <a:t>15</a:t>
+            </a:fld>
+            <a:endParaRPr lang="en-US"/>
+          </a:p>
+        </p:txBody>
+      </p:sp>
+    </p:spTree>
+    <p:extLst>
+      <p:ext uri="{BB962C8B-B14F-4D97-AF65-F5344CB8AC3E}">
+        <p14:creationId xmlns:p14="http://schemas.microsoft.com/office/powerpoint/2010/main" val="601657674"/>
+      </p:ext>
+    </p:extLst>
+  </p:cSld>
+  <p:clrMapOvr>
+    <a:masterClrMapping/>
+  </p:clrMapOvr>
+</p:sld>
+</file>
+
+<file path=ppt/slides/slide16.xml><?xml version="1.0" encoding="utf-8"?>
+<p:sld xmlns:a="http://schemas.openxmlformats.org/drawingml/2006/main" xmlns:r="http://schemas.openxmlformats.org/officeDocument/2006/relationships" xmlns:p="http://schemas.openxmlformats.org/presentationml/2006/main">
+  <p:cSld>
+    <p:spTree>
+      <p:nvGrpSpPr>
+        <p:cNvPr id="1" name=""/>
+        <p:cNvGrpSpPr/>
+        <p:nvPr/>
+      </p:nvGrpSpPr>
+      <p:grpSpPr>
+        <a:xfrm>
+          <a:off x="0" y="0"/>
+          <a:ext cx="0" cy="0"/>
+          <a:chOff x="0" y="0"/>
+          <a:chExt cx="0" cy="0"/>
+        </a:xfrm>
+      </p:grpSpPr>
+      <p:sp>
+        <p:nvSpPr>
+          <p:cNvPr id="2" name="Title 1"/>
+          <p:cNvSpPr>
+            <a:spLocks noGrp="1"/>
+          </p:cNvSpPr>
+          <p:nvPr>
+            <p:ph type="title"/>
+          </p:nvPr>
+        </p:nvSpPr>
+        <p:spPr/>
+        <p:txBody>
+          <a:bodyPr/>
+          <a:lstStyle/>
+          <a:p>
+            <a:r>
+              <a:rPr lang="en-CA" dirty="0"/>
+              <a:t>Deployment </a:t>
+            </a:r>
+          </a:p>
+        </p:txBody>
+      </p:sp>
+      <p:sp>
+        <p:nvSpPr>
+          <p:cNvPr id="3" name="Content Placeholder 2"/>
+          <p:cNvSpPr>
+            <a:spLocks noGrp="1"/>
+          </p:cNvSpPr>
+          <p:nvPr>
+            <p:ph idx="1"/>
+          </p:nvPr>
+        </p:nvSpPr>
+        <p:spPr>
+          <a:xfrm>
+            <a:off x="548174" y="2837330"/>
+            <a:ext cx="3498182" cy="3263504"/>
+          </a:xfrm>
+        </p:spPr>
+        <p:txBody>
+          <a:bodyPr/>
+          <a:lstStyle/>
+          <a:p>
+            <a:r>
+              <a:rPr lang="en-CA" dirty="0"/>
+              <a:t>New iteration Delivery</a:t>
+            </a:r>
+          </a:p>
+          <a:p>
+            <a:r>
+              <a:rPr lang="en-CA" dirty="0"/>
+              <a:t>Rework</a:t>
+            </a:r>
+          </a:p>
+        </p:txBody>
+      </p:sp>
+      <p:pic>
+        <p:nvPicPr>
+          <p:cNvPr id="6146" name="Picture 2" descr="http://www.damagedworkflow.com/cms/wordpress/wp-content/uploads/2013/02/PackageIcon.png"/>
+          <p:cNvPicPr>
+            <a:picLocks noChangeAspect="1" noChangeArrowheads="1"/>
+          </p:cNvPicPr>
+          <p:nvPr/>
+        </p:nvPicPr>
+        <p:blipFill>
+          <a:blip r:embed="rId2" cstate="email">
+            <a:extLst>
+              <a:ext uri="{28A0092B-C50C-407E-A947-70E740481C1C}">
+                <a14:useLocalDpi xmlns:a14="http://schemas.microsoft.com/office/drawing/2010/main" val="0"/>
+              </a:ext>
+            </a:extLst>
+          </a:blip>
+          <a:srcRect/>
+          <a:stretch>
+            <a:fillRect/>
+          </a:stretch>
+        </p:blipFill>
+        <p:spPr bwMode="auto">
+          <a:xfrm>
+            <a:off x="4572001" y="2007332"/>
+            <a:ext cx="2965283" cy="2965283"/>
+          </a:xfrm>
+          <a:prstGeom prst="rect">
+            <a:avLst/>
+          </a:prstGeom>
+          <a:noFill/>
+          <a:extLst>
+            <a:ext uri="{909E8E84-426E-40DD-AFC4-6F175D3DCCD1}">
+              <a14:hiddenFill xmlns:a14="http://schemas.microsoft.com/office/drawing/2010/main">
+                <a:solidFill>
+                  <a:srgbClr val="FFFFFF"/>
+                </a:solidFill>
+              </a14:hiddenFill>
+            </a:ext>
+          </a:extLst>
+        </p:spPr>
+      </p:pic>
+      <p:sp>
+        <p:nvSpPr>
+          <p:cNvPr id="4" name="Slide Number Placeholder 3"/>
+          <p:cNvSpPr>
+            <a:spLocks noGrp="1"/>
+          </p:cNvSpPr>
+          <p:nvPr>
+            <p:ph type="sldNum" sz="quarter" idx="12"/>
+          </p:nvPr>
+        </p:nvSpPr>
+        <p:spPr/>
+        <p:txBody>
+          <a:bodyPr/>
+          <a:lstStyle/>
+          <a:p>
+            <a:fld id="{886BB73A-582F-4420-9A14-CB10A2B2E5E8}" type="slidenum">
+              <a:rPr lang="en-US" smtClean="0"/>
+              <a:t>16</a:t>
+            </a:fld>
+            <a:endParaRPr lang="en-US"/>
+          </a:p>
+        </p:txBody>
+      </p:sp>
+    </p:spTree>
+    <p:extLst>
+      <p:ext uri="{BB962C8B-B14F-4D97-AF65-F5344CB8AC3E}">
+        <p14:creationId xmlns:p14="http://schemas.microsoft.com/office/powerpoint/2010/main" val="2574563331"/>
+      </p:ext>
+    </p:extLst>
+  </p:cSld>
+  <p:clrMapOvr>
+    <a:masterClrMapping/>
+  </p:clrMapOvr>
+</p:sld>
+</file>
+
+<file path=ppt/slides/slide17.xml><?xml version="1.0" encoding="utf-8"?>
+<p:sld xmlns:a="http://schemas.openxmlformats.org/drawingml/2006/main" xmlns:r="http://schemas.openxmlformats.org/officeDocument/2006/relationships" xmlns:p="http://schemas.openxmlformats.org/presentationml/2006/main">
+  <p:cSld>
+    <p:spTree>
+      <p:nvGrpSpPr>
+        <p:cNvPr id="1" name=""/>
+        <p:cNvGrpSpPr/>
+        <p:nvPr/>
+      </p:nvGrpSpPr>
+      <p:grpSpPr>
+        <a:xfrm>
+          <a:off x="0" y="0"/>
+          <a:ext cx="0" cy="0"/>
+          <a:chOff x="0" y="0"/>
+          <a:chExt cx="0" cy="0"/>
+        </a:xfrm>
+      </p:grpSpPr>
+      <p:sp>
+        <p:nvSpPr>
+          <p:cNvPr id="2" name="Title 1"/>
+          <p:cNvSpPr>
+            <a:spLocks noGrp="1"/>
+          </p:cNvSpPr>
+          <p:nvPr>
+            <p:ph type="title"/>
+          </p:nvPr>
+        </p:nvSpPr>
+        <p:spPr>
+          <a:xfrm>
+            <a:off x="415925" y="1276566"/>
+            <a:ext cx="8308975" cy="1143000"/>
+          </a:xfrm>
+        </p:spPr>
+        <p:txBody>
+          <a:bodyPr/>
+          <a:lstStyle/>
+          <a:p>
             <a:pPr algn="ctr"/>
             <a:r>
-              <a:rPr lang="fr-CA" dirty="0" err="1" smtClean="0"/>
+              <a:rPr lang="fr-CA" dirty="0"/>
+              <a:t>Cool </a:t>
+            </a:r>
+            <a:r>
+              <a:rPr lang="fr-CA" dirty="0" err="1"/>
+              <a:t>Features</a:t>
+            </a:r>
+            <a:endParaRPr lang="fr-CA" dirty="0"/>
+          </a:p>
+        </p:txBody>
+      </p:sp>
+      <p:pic>
+        <p:nvPicPr>
+          <p:cNvPr id="6" name="Picture 5" descr="Screen Shot 2016-11-26 at 11.16.07 PM.png"/>
+          <p:cNvPicPr>
+            <a:picLocks noChangeAspect="1"/>
+          </p:cNvPicPr>
+          <p:nvPr/>
+        </p:nvPicPr>
+        <p:blipFill>
+          <a:blip r:embed="rId2" cstate="email">
+            <a:extLst>
+              <a:ext uri="{28A0092B-C50C-407E-A947-70E740481C1C}">
+                <a14:useLocalDpi xmlns:a14="http://schemas.microsoft.com/office/drawing/2010/main" val="0"/>
+              </a:ext>
+            </a:extLst>
+          </a:blip>
+          <a:stretch>
+            <a:fillRect/>
+          </a:stretch>
+        </p:blipFill>
+        <p:spPr>
+          <a:xfrm>
+            <a:off x="2879558" y="2599765"/>
+            <a:ext cx="3831389" cy="3846838"/>
+          </a:xfrm>
+          <a:prstGeom prst="rect">
+            <a:avLst/>
+          </a:prstGeom>
+        </p:spPr>
+      </p:pic>
+      <p:sp>
+        <p:nvSpPr>
+          <p:cNvPr id="3" name="Slide Number Placeholder 2"/>
+          <p:cNvSpPr>
+            <a:spLocks noGrp="1"/>
+          </p:cNvSpPr>
+          <p:nvPr>
+            <p:ph type="sldNum" sz="quarter" idx="12"/>
+          </p:nvPr>
+        </p:nvSpPr>
+        <p:spPr/>
+        <p:txBody>
+          <a:bodyPr/>
+          <a:lstStyle/>
+          <a:p>
+            <a:fld id="{886BB73A-582F-4420-9A14-CB10A2B2E5E8}" type="slidenum">
+              <a:rPr lang="en-US" smtClean="0"/>
+              <a:t>17</a:t>
+            </a:fld>
+            <a:endParaRPr lang="en-US"/>
+          </a:p>
+        </p:txBody>
+      </p:sp>
+    </p:spTree>
+    <p:extLst>
+      <p:ext uri="{BB962C8B-B14F-4D97-AF65-F5344CB8AC3E}">
+        <p14:creationId xmlns:p14="http://schemas.microsoft.com/office/powerpoint/2010/main" val="1688917300"/>
+      </p:ext>
+    </p:extLst>
+  </p:cSld>
+  <p:clrMapOvr>
+    <a:masterClrMapping/>
+  </p:clrMapOvr>
+</p:sld>
+</file>
+
+<file path=ppt/slides/slide18.xml><?xml version="1.0" encoding="utf-8"?>
+<p:sld xmlns:a="http://schemas.openxmlformats.org/drawingml/2006/main" xmlns:r="http://schemas.openxmlformats.org/officeDocument/2006/relationships" xmlns:p="http://schemas.openxmlformats.org/presentationml/2006/main">
+  <p:cSld>
+    <p:spTree>
+      <p:nvGrpSpPr>
+        <p:cNvPr id="1" name=""/>
+        <p:cNvGrpSpPr/>
+        <p:nvPr/>
+      </p:nvGrpSpPr>
+      <p:grpSpPr>
+        <a:xfrm>
+          <a:off x="0" y="0"/>
+          <a:ext cx="0" cy="0"/>
+          <a:chOff x="0" y="0"/>
+          <a:chExt cx="0" cy="0"/>
+        </a:xfrm>
+      </p:grpSpPr>
+      <p:sp>
+        <p:nvSpPr>
+          <p:cNvPr id="2" name="Title 1"/>
+          <p:cNvSpPr>
+            <a:spLocks noGrp="1"/>
+          </p:cNvSpPr>
+          <p:nvPr>
+            <p:ph type="title"/>
+          </p:nvPr>
+        </p:nvSpPr>
+        <p:spPr/>
+        <p:txBody>
+          <a:bodyPr/>
+          <a:lstStyle/>
+          <a:p>
+            <a:pPr algn="ctr"/>
+            <a:r>
+              <a:rPr lang="fr-CA" dirty="0" err="1"/>
               <a:t>View</a:t>
             </a:r>
             <a:r>
-              <a:rPr lang="fr-CA" dirty="0" smtClean="0"/>
+              <a:rPr lang="fr-CA" dirty="0"/>
               <a:t> </a:t>
             </a:r>
             <a:r>
-              <a:rPr lang="fr-CA" dirty="0" err="1" smtClean="0"/>
+              <a:rPr lang="fr-CA" dirty="0" err="1"/>
               <a:t>Supply</a:t>
             </a:r>
             <a:endParaRPr lang="fr-CA" dirty="0"/>
@@ -6080,7 +7399,7 @@
           <p:nvPr/>
         </p:nvPicPr>
         <p:blipFill>
-          <a:blip r:embed="rId3">
+          <a:blip r:embed="rId3" cstate="email">
             <a:extLst>
               <a:ext uri="{28A0092B-C50C-407E-A947-70E740481C1C}">
                 <a14:useLocalDpi xmlns:a14="http://schemas.microsoft.com/office/drawing/2010/main" val="0"/>
@@ -6134,6 +7453,29 @@
           </a:fontRef>
         </p:style>
       </p:cxnSp>
+      <p:sp>
+        <p:nvSpPr>
+          <p:cNvPr id="3" name="Slide Number Placeholder 2"/>
+          <p:cNvSpPr>
+            <a:spLocks noGrp="1"/>
+          </p:cNvSpPr>
+          <p:nvPr>
+            <p:ph type="sldNum" sz="quarter" idx="12"/>
+          </p:nvPr>
+        </p:nvSpPr>
+        <p:spPr/>
+        <p:txBody>
+          <a:bodyPr/>
+          <a:lstStyle/>
+          <a:p>
+            <a:fld id="{886BB73A-582F-4420-9A14-CB10A2B2E5E8}" type="slidenum">
+              <a:rPr lang="en-US" smtClean="0"/>
+              <a:t>18</a:t>
+            </a:fld>
+            <a:endParaRPr lang="en-US"/>
+          </a:p>
+        </p:txBody>
+      </p:sp>
     </p:spTree>
     <p:extLst>
       <p:ext uri="{BB962C8B-B14F-4D97-AF65-F5344CB8AC3E}">
@@ -6144,17 +7486,10 @@
   <p:clrMapOvr>
     <a:masterClrMapping/>
   </p:clrMapOvr>
-  <p:timing>
-    <p:tnLst>
-      <p:par>
-        <p:cTn id="1" dur="indefinite" restart="never" nodeType="tmRoot"/>
-      </p:par>
-    </p:tnLst>
-  </p:timing>
 </p:sld>
 </file>
 
-<file path=ppt/slides/slide15.xml><?xml version="1.0" encoding="utf-8"?>
+<file path=ppt/slides/slide19.xml><?xml version="1.0" encoding="utf-8"?>
 <p:sld xmlns:a="http://schemas.openxmlformats.org/drawingml/2006/main" xmlns:r="http://schemas.openxmlformats.org/officeDocument/2006/relationships" xmlns:p="http://schemas.openxmlformats.org/presentationml/2006/main">
   <p:cSld>
     <p:spTree>
@@ -6188,15 +7523,15 @@
           <a:p>
             <a:pPr algn="ctr"/>
             <a:r>
-              <a:rPr lang="fr-CA" dirty="0" err="1" smtClean="0"/>
+              <a:rPr lang="fr-CA" dirty="0" err="1"/>
               <a:t>Fire</a:t>
             </a:r>
             <a:r>
-              <a:rPr lang="fr-CA" dirty="0" smtClean="0"/>
+              <a:rPr lang="fr-CA" dirty="0"/>
               <a:t> an </a:t>
             </a:r>
             <a:r>
-              <a:rPr lang="fr-CA" dirty="0" err="1" smtClean="0"/>
+              <a:rPr lang="fr-CA" dirty="0" err="1"/>
               <a:t>Employee</a:t>
             </a:r>
             <a:endParaRPr lang="fr-CA" dirty="0"/>
@@ -6231,7 +7566,7 @@
           <p:nvPr/>
         </p:nvPicPr>
         <p:blipFill>
-          <a:blip r:embed="rId2">
+          <a:blip r:embed="rId2" cstate="email">
             <a:extLst>
               <a:ext uri="{28A0092B-C50C-407E-A947-70E740481C1C}">
                 <a14:useLocalDpi xmlns:a14="http://schemas.microsoft.com/office/drawing/2010/main" val="0"/>
@@ -6261,7 +7596,7 @@
           <p:nvPr/>
         </p:nvPicPr>
         <p:blipFill>
-          <a:blip r:embed="rId3">
+          <a:blip r:embed="rId3" cstate="email">
             <a:extLst>
               <a:ext uri="{28A0092B-C50C-407E-A947-70E740481C1C}">
                 <a14:useLocalDpi xmlns:a14="http://schemas.microsoft.com/office/drawing/2010/main" val="0"/>
@@ -6315,6 +7650,29 @@
           </a:fontRef>
         </p:style>
       </p:cxnSp>
+      <p:sp>
+        <p:nvSpPr>
+          <p:cNvPr id="7" name="Slide Number Placeholder 6"/>
+          <p:cNvSpPr>
+            <a:spLocks noGrp="1"/>
+          </p:cNvSpPr>
+          <p:nvPr>
+            <p:ph type="sldNum" sz="quarter" idx="12"/>
+          </p:nvPr>
+        </p:nvSpPr>
+        <p:spPr/>
+        <p:txBody>
+          <a:bodyPr/>
+          <a:lstStyle/>
+          <a:p>
+            <a:fld id="{886BB73A-582F-4420-9A14-CB10A2B2E5E8}" type="slidenum">
+              <a:rPr lang="en-US" smtClean="0"/>
+              <a:t>19</a:t>
+            </a:fld>
+            <a:endParaRPr lang="en-US"/>
+          </a:p>
+        </p:txBody>
+      </p:sp>
     </p:spTree>
     <p:extLst>
       <p:ext uri="{BB962C8B-B14F-4D97-AF65-F5344CB8AC3E}">
@@ -6325,17 +7683,10 @@
   <p:clrMapOvr>
     <a:masterClrMapping/>
   </p:clrMapOvr>
-  <p:timing>
-    <p:tnLst>
-      <p:par>
-        <p:cTn id="1" dur="indefinite" restart="never" nodeType="tmRoot"/>
-      </p:par>
-    </p:tnLst>
-  </p:timing>
 </p:sld>
 </file>
 
-<file path=ppt/slides/slide16.xml><?xml version="1.0" encoding="utf-8"?>
+<file path=ppt/slides/slide2.xml><?xml version="1.0" encoding="utf-8"?>
 <p:sld xmlns:a="http://schemas.openxmlformats.org/drawingml/2006/main" xmlns:r="http://schemas.openxmlformats.org/officeDocument/2006/relationships" xmlns:p="http://schemas.openxmlformats.org/presentationml/2006/main">
   <p:cSld>
     <p:spTree>
@@ -6354,7 +7705,26 @@
       </p:grpSpPr>
       <p:sp>
         <p:nvSpPr>
-          <p:cNvPr id="2" name="Title 1"/>
+          <p:cNvPr id="5" name="Content Placeholder 4"/>
+          <p:cNvSpPr>
+            <a:spLocks noGrp="1"/>
+          </p:cNvSpPr>
+          <p:nvPr>
+            <p:ph idx="1"/>
+          </p:nvPr>
+        </p:nvSpPr>
+        <p:spPr/>
+        <p:txBody>
+          <a:bodyPr/>
+          <a:lstStyle/>
+          <a:p>
+            <a:endParaRPr lang="fr-CA" dirty="0"/>
+          </a:p>
+        </p:txBody>
+      </p:sp>
+      <p:sp>
+        <p:nvSpPr>
+          <p:cNvPr id="7" name="Title 6"/>
           <p:cNvSpPr>
             <a:spLocks noGrp="1"/>
           </p:cNvSpPr>
@@ -6367,141 +7737,80 @@
           <a:bodyPr/>
           <a:lstStyle/>
           <a:p>
-            <a:pPr algn="ctr"/>
-            <a:r>
-              <a:rPr lang="fr-CA" dirty="0" err="1" smtClean="0"/>
-              <a:t>View</a:t>
-            </a:r>
-            <a:r>
-              <a:rPr lang="fr-CA" dirty="0" smtClean="0"/>
-              <a:t> </a:t>
-            </a:r>
-            <a:r>
-              <a:rPr lang="fr-CA" dirty="0" err="1" smtClean="0"/>
-              <a:t>Weekly</a:t>
-            </a:r>
-            <a:r>
-              <a:rPr lang="fr-CA" dirty="0" smtClean="0"/>
-              <a:t> Schedule</a:t>
-            </a:r>
             <a:endParaRPr lang="fr-CA" dirty="0"/>
           </a:p>
         </p:txBody>
       </p:sp>
       <p:pic>
         <p:nvPicPr>
-          <p:cNvPr id="7" name="Picture 6" descr="Screen Shot 2016-11-26 at 11.07.54 PM.png"/>
-          <p:cNvPicPr>
-            <a:picLocks noChangeAspect="1"/>
-          </p:cNvPicPr>
+          <p:cNvPr id="8" name="Picture 7" descr="Macintosh HD:Users:Noah:Desktop:Project:Diagrams:Use Case Diagram.pdf"/>
+          <p:cNvPicPr/>
           <p:nvPr/>
         </p:nvPicPr>
         <p:blipFill>
-          <a:blip r:embed="rId2">
+          <a:blip r:embed="rId2" cstate="email">
             <a:extLst>
               <a:ext uri="{28A0092B-C50C-407E-A947-70E740481C1C}">
                 <a14:useLocalDpi xmlns:a14="http://schemas.microsoft.com/office/drawing/2010/main" val="0"/>
               </a:ext>
             </a:extLst>
           </a:blip>
+          <a:srcRect/>
           <a:stretch>
             <a:fillRect/>
           </a:stretch>
         </p:blipFill>
-        <p:spPr>
-          <a:xfrm>
-            <a:off x="202030" y="2773553"/>
-            <a:ext cx="4213922" cy="3041709"/>
+        <p:spPr bwMode="auto">
+          <a:xfrm>
+            <a:off x="173789" y="429207"/>
+            <a:ext cx="8457027" cy="6214897"/>
           </a:xfrm>
           <a:prstGeom prst="rect">
             <a:avLst/>
           </a:prstGeom>
+          <a:noFill/>
+          <a:ln>
+            <a:noFill/>
+          </a:ln>
         </p:spPr>
       </p:pic>
-      <p:pic>
-        <p:nvPicPr>
-          <p:cNvPr id="9" name="Picture 8" descr="Screen Shot 2016-11-26 at 11.23.43 PM.png"/>
-          <p:cNvPicPr>
-            <a:picLocks noChangeAspect="1"/>
-          </p:cNvPicPr>
-          <p:nvPr/>
-        </p:nvPicPr>
-        <p:blipFill>
-          <a:blip r:embed="rId3">
-            <a:extLst>
-              <a:ext uri="{28A0092B-C50C-407E-A947-70E740481C1C}">
-                <a14:useLocalDpi xmlns:a14="http://schemas.microsoft.com/office/drawing/2010/main" val="0"/>
-              </a:ext>
-            </a:extLst>
-          </a:blip>
-          <a:stretch>
-            <a:fillRect/>
-          </a:stretch>
-        </p:blipFill>
-        <p:spPr>
-          <a:xfrm>
-            <a:off x="3167057" y="3449052"/>
-            <a:ext cx="5704633" cy="2112211"/>
-          </a:xfrm>
-          <a:prstGeom prst="rect">
-            <a:avLst/>
-          </a:prstGeom>
-        </p:spPr>
-      </p:pic>
-      <p:cxnSp>
-        <p:nvCxnSpPr>
-          <p:cNvPr id="10" name="Straight Arrow Connector 9"/>
-          <p:cNvCxnSpPr/>
-          <p:nvPr/>
-        </p:nvCxnSpPr>
-        <p:spPr>
-          <a:xfrm flipH="1">
-            <a:off x="1671055" y="3556000"/>
-            <a:ext cx="2446419" cy="1844842"/>
-          </a:xfrm>
-          <a:prstGeom prst="straightConnector1">
-            <a:avLst/>
-          </a:prstGeom>
-          <a:ln>
-            <a:tailEnd type="arrow"/>
-          </a:ln>
-        </p:spPr>
-        <p:style>
-          <a:lnRef idx="2">
-            <a:schemeClr val="accent1"/>
-          </a:lnRef>
-          <a:fillRef idx="0">
-            <a:schemeClr val="accent1"/>
-          </a:fillRef>
-          <a:effectRef idx="1">
-            <a:schemeClr val="accent1"/>
-          </a:effectRef>
-          <a:fontRef idx="minor">
-            <a:schemeClr val="tx1"/>
-          </a:fontRef>
-        </p:style>
-      </p:cxnSp>
+      <p:sp>
+        <p:nvSpPr>
+          <p:cNvPr id="2" name="Slide Number Placeholder 1"/>
+          <p:cNvSpPr>
+            <a:spLocks noGrp="1"/>
+          </p:cNvSpPr>
+          <p:nvPr>
+            <p:ph type="sldNum" sz="quarter" idx="12"/>
+          </p:nvPr>
+        </p:nvSpPr>
+        <p:spPr/>
+        <p:txBody>
+          <a:bodyPr/>
+          <a:lstStyle/>
+          <a:p>
+            <a:fld id="{886BB73A-582F-4420-9A14-CB10A2B2E5E8}" type="slidenum">
+              <a:rPr lang="en-US" smtClean="0"/>
+              <a:t>2</a:t>
+            </a:fld>
+            <a:endParaRPr lang="en-US"/>
+          </a:p>
+        </p:txBody>
+      </p:sp>
     </p:spTree>
     <p:extLst>
       <p:ext uri="{BB962C8B-B14F-4D97-AF65-F5344CB8AC3E}">
-        <p14:creationId xmlns:p14="http://schemas.microsoft.com/office/powerpoint/2010/main" val="1110795539"/>
+        <p14:creationId xmlns:p14="http://schemas.microsoft.com/office/powerpoint/2010/main" val="1424573079"/>
       </p:ext>
     </p:extLst>
   </p:cSld>
   <p:clrMapOvr>
     <a:masterClrMapping/>
   </p:clrMapOvr>
-  <p:timing>
-    <p:tnLst>
-      <p:par>
-        <p:cTn id="1" dur="indefinite" restart="never" nodeType="tmRoot"/>
-      </p:par>
-    </p:tnLst>
-  </p:timing>
 </p:sld>
 </file>
 
-<file path=ppt/slides/slide17.xml><?xml version="1.0" encoding="utf-8"?>
+<file path=ppt/slides/slide20.xml><?xml version="1.0" encoding="utf-8"?>
 <p:sld xmlns:a="http://schemas.openxmlformats.org/drawingml/2006/main" xmlns:r="http://schemas.openxmlformats.org/officeDocument/2006/relationships" xmlns:p="http://schemas.openxmlformats.org/presentationml/2006/main">
   <p:cSld>
     <p:spTree>
@@ -6535,22 +7844,202 @@
           <a:p>
             <a:pPr algn="ctr"/>
             <a:r>
-              <a:rPr lang="fr-CA" dirty="0" err="1" smtClean="0"/>
+              <a:rPr lang="fr-CA" dirty="0" err="1"/>
               <a:t>View</a:t>
             </a:r>
             <a:r>
-              <a:rPr lang="fr-CA" dirty="0" smtClean="0"/>
+              <a:rPr lang="fr-CA" dirty="0"/>
               <a:t> </a:t>
             </a:r>
             <a:r>
-              <a:rPr lang="fr-CA" dirty="0" err="1" smtClean="0"/>
+              <a:rPr lang="fr-CA" dirty="0" err="1"/>
+              <a:t>Weekly</a:t>
+            </a:r>
+            <a:r>
+              <a:rPr lang="fr-CA" dirty="0"/>
+              <a:t> Schedule</a:t>
+            </a:r>
+          </a:p>
+        </p:txBody>
+      </p:sp>
+      <p:pic>
+        <p:nvPicPr>
+          <p:cNvPr id="7" name="Picture 6" descr="Screen Shot 2016-11-26 at 11.07.54 PM.png"/>
+          <p:cNvPicPr>
+            <a:picLocks noChangeAspect="1"/>
+          </p:cNvPicPr>
+          <p:nvPr/>
+        </p:nvPicPr>
+        <p:blipFill>
+          <a:blip r:embed="rId2" cstate="email">
+            <a:extLst>
+              <a:ext uri="{28A0092B-C50C-407E-A947-70E740481C1C}">
+                <a14:useLocalDpi xmlns:a14="http://schemas.microsoft.com/office/drawing/2010/main" val="0"/>
+              </a:ext>
+            </a:extLst>
+          </a:blip>
+          <a:stretch>
+            <a:fillRect/>
+          </a:stretch>
+        </p:blipFill>
+        <p:spPr>
+          <a:xfrm>
+            <a:off x="202030" y="2773553"/>
+            <a:ext cx="4213922" cy="3041709"/>
+          </a:xfrm>
+          <a:prstGeom prst="rect">
+            <a:avLst/>
+          </a:prstGeom>
+        </p:spPr>
+      </p:pic>
+      <p:pic>
+        <p:nvPicPr>
+          <p:cNvPr id="9" name="Picture 8" descr="Screen Shot 2016-11-26 at 11.23.43 PM.png"/>
+          <p:cNvPicPr>
+            <a:picLocks noChangeAspect="1"/>
+          </p:cNvPicPr>
+          <p:nvPr/>
+        </p:nvPicPr>
+        <p:blipFill>
+          <a:blip r:embed="rId3" cstate="email">
+            <a:extLst>
+              <a:ext uri="{28A0092B-C50C-407E-A947-70E740481C1C}">
+                <a14:useLocalDpi xmlns:a14="http://schemas.microsoft.com/office/drawing/2010/main" val="0"/>
+              </a:ext>
+            </a:extLst>
+          </a:blip>
+          <a:stretch>
+            <a:fillRect/>
+          </a:stretch>
+        </p:blipFill>
+        <p:spPr>
+          <a:xfrm>
+            <a:off x="3167057" y="3449052"/>
+            <a:ext cx="5704633" cy="2112211"/>
+          </a:xfrm>
+          <a:prstGeom prst="rect">
+            <a:avLst/>
+          </a:prstGeom>
+        </p:spPr>
+      </p:pic>
+      <p:cxnSp>
+        <p:nvCxnSpPr>
+          <p:cNvPr id="10" name="Straight Arrow Connector 9"/>
+          <p:cNvCxnSpPr/>
+          <p:nvPr/>
+        </p:nvCxnSpPr>
+        <p:spPr>
+          <a:xfrm flipH="1">
+            <a:off x="1671055" y="3556000"/>
+            <a:ext cx="2446419" cy="1844842"/>
+          </a:xfrm>
+          <a:prstGeom prst="straightConnector1">
+            <a:avLst/>
+          </a:prstGeom>
+          <a:ln>
+            <a:tailEnd type="arrow"/>
+          </a:ln>
+        </p:spPr>
+        <p:style>
+          <a:lnRef idx="2">
+            <a:schemeClr val="accent1"/>
+          </a:lnRef>
+          <a:fillRef idx="0">
+            <a:schemeClr val="accent1"/>
+          </a:fillRef>
+          <a:effectRef idx="1">
+            <a:schemeClr val="accent1"/>
+          </a:effectRef>
+          <a:fontRef idx="minor">
+            <a:schemeClr val="tx1"/>
+          </a:fontRef>
+        </p:style>
+      </p:cxnSp>
+      <p:sp>
+        <p:nvSpPr>
+          <p:cNvPr id="3" name="Slide Number Placeholder 2"/>
+          <p:cNvSpPr>
+            <a:spLocks noGrp="1"/>
+          </p:cNvSpPr>
+          <p:nvPr>
+            <p:ph type="sldNum" sz="quarter" idx="12"/>
+          </p:nvPr>
+        </p:nvSpPr>
+        <p:spPr/>
+        <p:txBody>
+          <a:bodyPr/>
+          <a:lstStyle/>
+          <a:p>
+            <a:fld id="{886BB73A-582F-4420-9A14-CB10A2B2E5E8}" type="slidenum">
+              <a:rPr lang="en-US" smtClean="0"/>
+              <a:t>20</a:t>
+            </a:fld>
+            <a:endParaRPr lang="en-US"/>
+          </a:p>
+        </p:txBody>
+      </p:sp>
+    </p:spTree>
+    <p:extLst>
+      <p:ext uri="{BB962C8B-B14F-4D97-AF65-F5344CB8AC3E}">
+        <p14:creationId xmlns:p14="http://schemas.microsoft.com/office/powerpoint/2010/main" val="1110795539"/>
+      </p:ext>
+    </p:extLst>
+  </p:cSld>
+  <p:clrMapOvr>
+    <a:masterClrMapping/>
+  </p:clrMapOvr>
+</p:sld>
+</file>
+
+<file path=ppt/slides/slide21.xml><?xml version="1.0" encoding="utf-8"?>
+<p:sld xmlns:a="http://schemas.openxmlformats.org/drawingml/2006/main" xmlns:r="http://schemas.openxmlformats.org/officeDocument/2006/relationships" xmlns:p="http://schemas.openxmlformats.org/presentationml/2006/main">
+  <p:cSld>
+    <p:spTree>
+      <p:nvGrpSpPr>
+        <p:cNvPr id="1" name=""/>
+        <p:cNvGrpSpPr/>
+        <p:nvPr/>
+      </p:nvGrpSpPr>
+      <p:grpSpPr>
+        <a:xfrm>
+          <a:off x="0" y="0"/>
+          <a:ext cx="0" cy="0"/>
+          <a:chOff x="0" y="0"/>
+          <a:chExt cx="0" cy="0"/>
+        </a:xfrm>
+      </p:grpSpPr>
+      <p:sp>
+        <p:nvSpPr>
+          <p:cNvPr id="2" name="Title 1"/>
+          <p:cNvSpPr>
+            <a:spLocks noGrp="1"/>
+          </p:cNvSpPr>
+          <p:nvPr>
+            <p:ph type="title"/>
+          </p:nvPr>
+        </p:nvSpPr>
+        <p:spPr/>
+        <p:txBody>
+          <a:bodyPr/>
+          <a:lstStyle/>
+          <a:p>
+            <a:pPr algn="ctr"/>
+            <a:r>
+              <a:rPr lang="fr-CA" dirty="0" err="1"/>
+              <a:t>View</a:t>
+            </a:r>
+            <a:r>
+              <a:rPr lang="fr-CA" dirty="0"/>
+              <a:t> </a:t>
+            </a:r>
+            <a:r>
+              <a:rPr lang="fr-CA" dirty="0" err="1"/>
               <a:t>Popularity</a:t>
             </a:r>
             <a:r>
-              <a:rPr lang="fr-CA" dirty="0" smtClean="0"/>
+              <a:rPr lang="fr-CA" dirty="0"/>
               <a:t> Report</a:t>
             </a:r>
-            <a:endParaRPr lang="fr-CA" dirty="0"/>
           </a:p>
         </p:txBody>
       </p:sp>
@@ -6582,7 +8071,7 @@
           <p:nvPr/>
         </p:nvPicPr>
         <p:blipFill>
-          <a:blip r:embed="rId2">
+          <a:blip r:embed="rId2" cstate="email">
             <a:extLst>
               <a:ext uri="{28A0092B-C50C-407E-A947-70E740481C1C}">
                 <a14:useLocalDpi xmlns:a14="http://schemas.microsoft.com/office/drawing/2010/main" val="0"/>
@@ -6666,6 +8155,29 @@
           </a:prstGeom>
         </p:spPr>
       </p:pic>
+      <p:sp>
+        <p:nvSpPr>
+          <p:cNvPr id="4" name="Slide Number Placeholder 3"/>
+          <p:cNvSpPr>
+            <a:spLocks noGrp="1"/>
+          </p:cNvSpPr>
+          <p:nvPr>
+            <p:ph type="sldNum" sz="quarter" idx="12"/>
+          </p:nvPr>
+        </p:nvSpPr>
+        <p:spPr/>
+        <p:txBody>
+          <a:bodyPr/>
+          <a:lstStyle/>
+          <a:p>
+            <a:fld id="{886BB73A-582F-4420-9A14-CB10A2B2E5E8}" type="slidenum">
+              <a:rPr lang="en-US" smtClean="0"/>
+              <a:t>21</a:t>
+            </a:fld>
+            <a:endParaRPr lang="en-US"/>
+          </a:p>
+        </p:txBody>
+      </p:sp>
     </p:spTree>
     <p:extLst>
       <p:ext uri="{BB962C8B-B14F-4D97-AF65-F5344CB8AC3E}">
@@ -6676,17 +8188,10 @@
   <p:clrMapOvr>
     <a:masterClrMapping/>
   </p:clrMapOvr>
-  <p:timing>
-    <p:tnLst>
-      <p:par>
-        <p:cTn id="1" dur="indefinite" restart="never" nodeType="tmRoot"/>
-      </p:par>
-    </p:tnLst>
-  </p:timing>
 </p:sld>
 </file>
 
-<file path=ppt/slides/slide2.xml><?xml version="1.0" encoding="utf-8"?>
+<file path=ppt/slides/slide22.xml><?xml version="1.0" encoding="utf-8"?>
 <p:sld xmlns:a="http://schemas.openxmlformats.org/drawingml/2006/main" xmlns:r="http://schemas.openxmlformats.org/officeDocument/2006/relationships" xmlns:p="http://schemas.openxmlformats.org/presentationml/2006/main">
   <p:cSld>
     <p:spTree>
@@ -6705,7 +8210,29 @@
       </p:grpSpPr>
       <p:sp>
         <p:nvSpPr>
-          <p:cNvPr id="5" name="Content Placeholder 4"/>
+          <p:cNvPr id="2" name="Title 1"/>
+          <p:cNvSpPr>
+            <a:spLocks noGrp="1"/>
+          </p:cNvSpPr>
+          <p:nvPr>
+            <p:ph type="title"/>
+          </p:nvPr>
+        </p:nvSpPr>
+        <p:spPr/>
+        <p:txBody>
+          <a:bodyPr/>
+          <a:lstStyle/>
+          <a:p>
+            <a:r>
+              <a:rPr lang="en-CA" dirty="0"/>
+              <a:t>The Great Showcase</a:t>
+            </a:r>
+          </a:p>
+        </p:txBody>
+      </p:sp>
+      <p:sp>
+        <p:nvSpPr>
+          <p:cNvPr id="3" name="Content Placeholder 2"/>
           <p:cNvSpPr>
             <a:spLocks noGrp="1"/>
           </p:cNvSpPr>
@@ -6718,79 +8245,155 @@
           <a:bodyPr/>
           <a:lstStyle/>
           <a:p>
-            <a:endParaRPr lang="fr-CA" dirty="0"/>
-          </a:p>
-        </p:txBody>
-      </p:sp>
-      <p:sp>
-        <p:nvSpPr>
-          <p:cNvPr id="7" name="Title 6"/>
-          <p:cNvSpPr>
-            <a:spLocks noGrp="1"/>
-          </p:cNvSpPr>
-          <p:nvPr>
-            <p:ph type="title"/>
-          </p:nvPr>
-        </p:nvSpPr>
-        <p:spPr/>
-        <p:txBody>
-          <a:bodyPr/>
-          <a:lstStyle/>
-          <a:p>
-            <a:endParaRPr lang="fr-CA" dirty="0"/>
-          </a:p>
-        </p:txBody>
-      </p:sp>
-      <p:pic>
-        <p:nvPicPr>
-          <p:cNvPr id="8" name="Picture 7" descr="Macintosh HD:Users:Noah:Desktop:Project:Diagrams:Use Case Diagram.pdf"/>
-          <p:cNvPicPr/>
-          <p:nvPr/>
-        </p:nvPicPr>
-        <p:blipFill>
-          <a:blip r:embed="rId2">
-            <a:extLst>
-              <a:ext uri="{28A0092B-C50C-407E-A947-70E740481C1C}">
-                <a14:useLocalDpi xmlns:a14="http://schemas.microsoft.com/office/drawing/2010/main" val="0"/>
-              </a:ext>
-            </a:extLst>
-          </a:blip>
-          <a:srcRect/>
-          <a:stretch>
-            <a:fillRect/>
-          </a:stretch>
-        </p:blipFill>
-        <p:spPr bwMode="auto">
-          <a:xfrm>
-            <a:off x="173789" y="193055"/>
-            <a:ext cx="8756316" cy="6451050"/>
-          </a:xfrm>
-          <a:prstGeom prst="rect">
-            <a:avLst/>
-          </a:prstGeom>
-          <a:noFill/>
-          <a:ln>
-            <a:noFill/>
-          </a:ln>
-        </p:spPr>
-      </p:pic>
+            <a:endParaRPr lang="en-CA" dirty="0"/>
+          </a:p>
+        </p:txBody>
+      </p:sp>
+      <p:sp>
+        <p:nvSpPr>
+          <p:cNvPr id="4" name="Slide Number Placeholder 3"/>
+          <p:cNvSpPr>
+            <a:spLocks noGrp="1"/>
+          </p:cNvSpPr>
+          <p:nvPr>
+            <p:ph type="sldNum" sz="quarter" idx="12"/>
+          </p:nvPr>
+        </p:nvSpPr>
+        <p:spPr/>
+        <p:txBody>
+          <a:bodyPr/>
+          <a:lstStyle/>
+          <a:p>
+            <a:fld id="{886BB73A-582F-4420-9A14-CB10A2B2E5E8}" type="slidenum">
+              <a:rPr lang="en-US" smtClean="0"/>
+              <a:t>22</a:t>
+            </a:fld>
+            <a:endParaRPr lang="en-US"/>
+          </a:p>
+        </p:txBody>
+      </p:sp>
     </p:spTree>
     <p:extLst>
       <p:ext uri="{BB962C8B-B14F-4D97-AF65-F5344CB8AC3E}">
-        <p14:creationId xmlns:p14="http://schemas.microsoft.com/office/powerpoint/2010/main" val="1424573079"/>
+        <p14:creationId xmlns:p14="http://schemas.microsoft.com/office/powerpoint/2010/main" val="2005719921"/>
       </p:ext>
     </p:extLst>
   </p:cSld>
   <p:clrMapOvr>
     <a:masterClrMapping/>
   </p:clrMapOvr>
-  <p:timing>
-    <p:tnLst>
-      <p:par>
-        <p:cTn id="1" dur="indefinite" restart="never" nodeType="tmRoot"/>
-      </p:par>
-    </p:tnLst>
-  </p:timing>
+</p:sld>
+</file>
+
+<file path=ppt/slides/slide23.xml><?xml version="1.0" encoding="utf-8"?>
+<p:sld xmlns:a="http://schemas.openxmlformats.org/drawingml/2006/main" xmlns:r="http://schemas.openxmlformats.org/officeDocument/2006/relationships" xmlns:p="http://schemas.openxmlformats.org/presentationml/2006/main">
+  <p:cSld>
+    <p:spTree>
+      <p:nvGrpSpPr>
+        <p:cNvPr id="1" name=""/>
+        <p:cNvGrpSpPr/>
+        <p:nvPr/>
+      </p:nvGrpSpPr>
+      <p:grpSpPr>
+        <a:xfrm>
+          <a:off x="0" y="0"/>
+          <a:ext cx="0" cy="0"/>
+          <a:chOff x="0" y="0"/>
+          <a:chExt cx="0" cy="0"/>
+        </a:xfrm>
+      </p:grpSpPr>
+      <p:sp>
+        <p:nvSpPr>
+          <p:cNvPr id="2" name="Title 1"/>
+          <p:cNvSpPr>
+            <a:spLocks noGrp="1"/>
+          </p:cNvSpPr>
+          <p:nvPr>
+            <p:ph type="title"/>
+          </p:nvPr>
+        </p:nvSpPr>
+        <p:spPr/>
+        <p:txBody>
+          <a:bodyPr/>
+          <a:lstStyle/>
+          <a:p>
+            <a:r>
+              <a:rPr lang="en-CA" dirty="0"/>
+              <a:t>Conclusion</a:t>
+            </a:r>
+          </a:p>
+        </p:txBody>
+      </p:sp>
+      <p:sp>
+        <p:nvSpPr>
+          <p:cNvPr id="3" name="Content Placeholder 2"/>
+          <p:cNvSpPr>
+            <a:spLocks noGrp="1"/>
+          </p:cNvSpPr>
+          <p:nvPr>
+            <p:ph idx="1"/>
+          </p:nvPr>
+        </p:nvSpPr>
+        <p:spPr/>
+        <p:txBody>
+          <a:bodyPr/>
+          <a:lstStyle/>
+          <a:p>
+            <a:r>
+              <a:rPr lang="en-CA" dirty="0"/>
+              <a:t>Group Organisation</a:t>
+            </a:r>
+          </a:p>
+          <a:p>
+            <a:r>
+              <a:rPr lang="en-CA" dirty="0"/>
+              <a:t>Testing</a:t>
+            </a:r>
+          </a:p>
+          <a:p>
+            <a:r>
+              <a:rPr lang="en-CA" dirty="0"/>
+              <a:t>UI</a:t>
+            </a:r>
+          </a:p>
+          <a:p>
+            <a:endParaRPr lang="en-CA" dirty="0"/>
+          </a:p>
+        </p:txBody>
+      </p:sp>
+      <p:sp>
+        <p:nvSpPr>
+          <p:cNvPr id="4" name="Slide Number Placeholder 3"/>
+          <p:cNvSpPr>
+            <a:spLocks noGrp="1"/>
+          </p:cNvSpPr>
+          <p:nvPr>
+            <p:ph type="sldNum" sz="quarter" idx="12"/>
+          </p:nvPr>
+        </p:nvSpPr>
+        <p:spPr/>
+        <p:txBody>
+          <a:bodyPr/>
+          <a:lstStyle/>
+          <a:p>
+            <a:fld id="{886BB73A-582F-4420-9A14-CB10A2B2E5E8}" type="slidenum">
+              <a:rPr lang="en-US" smtClean="0"/>
+              <a:t>23</a:t>
+            </a:fld>
+            <a:endParaRPr lang="en-US"/>
+          </a:p>
+        </p:txBody>
+      </p:sp>
+    </p:spTree>
+    <p:extLst>
+      <p:ext uri="{BB962C8B-B14F-4D97-AF65-F5344CB8AC3E}">
+        <p14:creationId xmlns:p14="http://schemas.microsoft.com/office/powerpoint/2010/main" val="625353741"/>
+      </p:ext>
+    </p:extLst>
+  </p:cSld>
+  <p:clrMapOvr>
+    <a:masterClrMapping/>
+  </p:clrMapOvr>
 </p:sld>
 </file>
 
@@ -6833,10 +8436,9 @@
           <a:p>
             <a:pPr algn="ctr"/>
             <a:r>
-              <a:rPr lang="fr-CA" dirty="0" smtClean="0"/>
+              <a:rPr lang="fr-CA" dirty="0"/>
               <a:t>Architecture - MVC</a:t>
             </a:r>
-            <a:endParaRPr lang="fr-CA" dirty="0"/>
           </a:p>
         </p:txBody>
       </p:sp>
@@ -6868,7 +8470,7 @@
           <p:nvPr/>
         </p:nvPicPr>
         <p:blipFill>
-          <a:blip r:embed="rId2">
+          <a:blip r:embed="rId2" cstate="email">
             <a:extLst>
               <a:ext uri="{28A0092B-C50C-407E-A947-70E740481C1C}">
                 <a14:useLocalDpi xmlns:a14="http://schemas.microsoft.com/office/drawing/2010/main" val="0"/>
@@ -6898,7 +8500,7 @@
           <p:nvPr/>
         </p:nvPicPr>
         <p:blipFill>
-          <a:blip r:embed="rId3">
+          <a:blip r:embed="rId3" cstate="email">
             <a:extLst>
               <a:ext uri="{28A0092B-C50C-407E-A947-70E740481C1C}">
                 <a14:useLocalDpi xmlns:a14="http://schemas.microsoft.com/office/drawing/2010/main" val="0"/>
@@ -6919,6 +8521,29 @@
           </a:prstGeom>
         </p:spPr>
       </p:pic>
+      <p:sp>
+        <p:nvSpPr>
+          <p:cNvPr id="3" name="Slide Number Placeholder 2"/>
+          <p:cNvSpPr>
+            <a:spLocks noGrp="1"/>
+          </p:cNvSpPr>
+          <p:nvPr>
+            <p:ph type="sldNum" sz="quarter" idx="12"/>
+          </p:nvPr>
+        </p:nvSpPr>
+        <p:spPr/>
+        <p:txBody>
+          <a:bodyPr/>
+          <a:lstStyle/>
+          <a:p>
+            <a:fld id="{886BB73A-582F-4420-9A14-CB10A2B2E5E8}" type="slidenum">
+              <a:rPr lang="en-US" smtClean="0"/>
+              <a:t>3</a:t>
+            </a:fld>
+            <a:endParaRPr lang="en-US"/>
+          </a:p>
+        </p:txBody>
+      </p:sp>
     </p:spTree>
     <p:extLst>
       <p:ext uri="{BB962C8B-B14F-4D97-AF65-F5344CB8AC3E}">
@@ -6929,13 +8554,6 @@
   <p:clrMapOvr>
     <a:masterClrMapping/>
   </p:clrMapOvr>
-  <p:timing>
-    <p:tnLst>
-      <p:par>
-        <p:cTn id="1" dur="indefinite" restart="never" nodeType="tmRoot"/>
-      </p:par>
-    </p:tnLst>
-  </p:timing>
 </p:sld>
 </file>
 
@@ -6977,10 +8595,9 @@
           <a:lstStyle/>
           <a:p>
             <a:r>
-              <a:rPr lang="fr-CA" dirty="0" smtClean="0"/>
+              <a:rPr lang="fr-CA" dirty="0"/>
               <a:t>Domain Model</a:t>
             </a:r>
-            <a:endParaRPr lang="fr-CA" dirty="0"/>
           </a:p>
         </p:txBody>
       </p:sp>
@@ -6993,7 +8610,7 @@
           <p:nvPr/>
         </p:nvPicPr>
         <p:blipFill>
-          <a:blip r:embed="rId2">
+          <a:blip r:embed="rId2" cstate="email">
             <a:extLst>
               <a:ext uri="{28A0092B-C50C-407E-A947-70E740481C1C}">
                 <a14:useLocalDpi xmlns:a14="http://schemas.microsoft.com/office/drawing/2010/main" val="0"/>
@@ -7014,6 +8631,29 @@
           </a:prstGeom>
         </p:spPr>
       </p:pic>
+      <p:sp>
+        <p:nvSpPr>
+          <p:cNvPr id="3" name="Slide Number Placeholder 2"/>
+          <p:cNvSpPr>
+            <a:spLocks noGrp="1"/>
+          </p:cNvSpPr>
+          <p:nvPr>
+            <p:ph type="sldNum" sz="quarter" idx="12"/>
+          </p:nvPr>
+        </p:nvSpPr>
+        <p:spPr/>
+        <p:txBody>
+          <a:bodyPr/>
+          <a:lstStyle/>
+          <a:p>
+            <a:fld id="{886BB73A-582F-4420-9A14-CB10A2B2E5E8}" type="slidenum">
+              <a:rPr lang="en-US" smtClean="0"/>
+              <a:t>4</a:t>
+            </a:fld>
+            <a:endParaRPr lang="en-US"/>
+          </a:p>
+        </p:txBody>
+      </p:sp>
     </p:spTree>
     <p:extLst>
       <p:ext uri="{BB962C8B-B14F-4D97-AF65-F5344CB8AC3E}">
@@ -7024,13 +8664,6 @@
   <p:clrMapOvr>
     <a:masterClrMapping/>
   </p:clrMapOvr>
-  <p:timing>
-    <p:tnLst>
-      <p:par>
-        <p:cTn id="1" dur="indefinite" restart="never" nodeType="tmRoot"/>
-      </p:par>
-    </p:tnLst>
-  </p:timing>
 </p:sld>
 </file>
 
@@ -7068,7 +8701,7 @@
           <a:p>
             <a:pPr algn="ctr"/>
             <a:r>
-              <a:rPr lang="fr-CA" dirty="0" err="1" smtClean="0"/>
+              <a:rPr lang="fr-CA" dirty="0" err="1"/>
               <a:t>Controllers</a:t>
             </a:r>
             <a:endParaRPr lang="fr-CA" dirty="0"/>
@@ -7090,38 +8723,37 @@
           <a:bodyPr/>
           <a:lstStyle/>
           <a:p>
-            <a:endParaRPr lang="fr-CA" dirty="0" smtClean="0"/>
-          </a:p>
-          <a:p>
-            <a:r>
-              <a:rPr lang="fr-CA" dirty="0" smtClean="0"/>
+            <a:endParaRPr lang="fr-CA" dirty="0"/>
+          </a:p>
+          <a:p>
+            <a:r>
+              <a:rPr lang="fr-CA" dirty="0"/>
               <a:t>Abstract </a:t>
             </a:r>
             <a:r>
-              <a:rPr lang="fr-CA" dirty="0" err="1" smtClean="0"/>
+              <a:rPr lang="fr-CA" dirty="0" err="1"/>
               <a:t>Supply</a:t>
             </a:r>
             <a:r>
-              <a:rPr lang="fr-CA" dirty="0" smtClean="0"/>
+              <a:rPr lang="fr-CA" dirty="0"/>
               <a:t> Controller</a:t>
             </a:r>
           </a:p>
           <a:p>
             <a:r>
-              <a:rPr lang="fr-CA" dirty="0" smtClean="0"/>
+              <a:rPr lang="fr-CA" dirty="0"/>
               <a:t>Equipment Controller</a:t>
             </a:r>
           </a:p>
           <a:p>
             <a:r>
-              <a:rPr lang="fr-CA" dirty="0" err="1" smtClean="0"/>
+              <a:rPr lang="fr-CA" dirty="0" err="1"/>
               <a:t>MenuItem</a:t>
             </a:r>
             <a:r>
-              <a:rPr lang="fr-CA" dirty="0" smtClean="0"/>
+              <a:rPr lang="fr-CA" dirty="0"/>
               <a:t> Controller</a:t>
             </a:r>
-            <a:endParaRPr lang="fr-CA" dirty="0"/>
           </a:p>
         </p:txBody>
       </p:sp>
@@ -7134,7 +8766,7 @@
           <p:nvPr/>
         </p:nvPicPr>
         <p:blipFill>
-          <a:blip r:embed="rId2">
+          <a:blip r:embed="rId2" cstate="email">
             <a:extLst>
               <a:ext uri="{28A0092B-C50C-407E-A947-70E740481C1C}">
                 <a14:useLocalDpi xmlns:a14="http://schemas.microsoft.com/office/drawing/2010/main" val="0"/>
@@ -7155,6 +8787,29 @@
           </a:prstGeom>
         </p:spPr>
       </p:pic>
+      <p:sp>
+        <p:nvSpPr>
+          <p:cNvPr id="4" name="Slide Number Placeholder 3"/>
+          <p:cNvSpPr>
+            <a:spLocks noGrp="1"/>
+          </p:cNvSpPr>
+          <p:nvPr>
+            <p:ph type="sldNum" sz="quarter" idx="12"/>
+          </p:nvPr>
+        </p:nvSpPr>
+        <p:spPr/>
+        <p:txBody>
+          <a:bodyPr/>
+          <a:lstStyle/>
+          <a:p>
+            <a:fld id="{886BB73A-582F-4420-9A14-CB10A2B2E5E8}" type="slidenum">
+              <a:rPr lang="en-US" smtClean="0"/>
+              <a:t>5</a:t>
+            </a:fld>
+            <a:endParaRPr lang="en-US"/>
+          </a:p>
+        </p:txBody>
+      </p:sp>
     </p:spTree>
     <p:extLst>
       <p:ext uri="{BB962C8B-B14F-4D97-AF65-F5344CB8AC3E}">
@@ -7165,13 +8820,6 @@
   <p:clrMapOvr>
     <a:masterClrMapping/>
   </p:clrMapOvr>
-  <p:timing>
-    <p:tnLst>
-      <p:par>
-        <p:cTn id="1" dur="indefinite" restart="never" nodeType="tmRoot"/>
-      </p:par>
-    </p:tnLst>
-  </p:timing>
 </p:sld>
 </file>
 
@@ -7209,14 +8857,13 @@
           <a:p>
             <a:pPr algn="ctr"/>
             <a:r>
-              <a:rPr lang="fr-CA" sz="3200" dirty="0" err="1" smtClean="0"/>
+              <a:rPr lang="fr-CA" sz="3200" dirty="0" err="1"/>
               <a:t>Supply</a:t>
             </a:r>
             <a:r>
-              <a:rPr lang="fr-CA" sz="3200" dirty="0" smtClean="0"/>
+              <a:rPr lang="fr-CA" sz="3200" dirty="0"/>
               <a:t> Controller – Template Design Pattern</a:t>
             </a:r>
-            <a:endParaRPr lang="fr-CA" sz="3200" dirty="0"/>
           </a:p>
         </p:txBody>
       </p:sp>
@@ -7229,7 +8876,7 @@
           <p:nvPr/>
         </p:nvPicPr>
         <p:blipFill>
-          <a:blip r:embed="rId2">
+          <a:blip r:embed="rId2" cstate="email">
             <a:extLst>
               <a:ext uri="{28A0092B-C50C-407E-A947-70E740481C1C}">
                 <a14:useLocalDpi xmlns:a14="http://schemas.microsoft.com/office/drawing/2010/main" val="0"/>
@@ -7250,6 +8897,29 @@
           </a:prstGeom>
         </p:spPr>
       </p:pic>
+      <p:sp>
+        <p:nvSpPr>
+          <p:cNvPr id="3" name="Slide Number Placeholder 2"/>
+          <p:cNvSpPr>
+            <a:spLocks noGrp="1"/>
+          </p:cNvSpPr>
+          <p:nvPr>
+            <p:ph type="sldNum" sz="quarter" idx="12"/>
+          </p:nvPr>
+        </p:nvSpPr>
+        <p:spPr/>
+        <p:txBody>
+          <a:bodyPr/>
+          <a:lstStyle/>
+          <a:p>
+            <a:fld id="{886BB73A-582F-4420-9A14-CB10A2B2E5E8}" type="slidenum">
+              <a:rPr lang="en-US" smtClean="0"/>
+              <a:t>6</a:t>
+            </a:fld>
+            <a:endParaRPr lang="en-US"/>
+          </a:p>
+        </p:txBody>
+      </p:sp>
     </p:spTree>
     <p:extLst>
       <p:ext uri="{BB962C8B-B14F-4D97-AF65-F5344CB8AC3E}">
@@ -7260,13 +8930,6 @@
   <p:clrMapOvr>
     <a:masterClrMapping/>
   </p:clrMapOvr>
-  <p:timing>
-    <p:tnLst>
-      <p:par>
-        <p:cTn id="1" dur="indefinite" restart="never" nodeType="tmRoot"/>
-      </p:par>
-    </p:tnLst>
-  </p:timing>
 </p:sld>
 </file>
 
@@ -7304,23 +8967,23 @@
           <a:p>
             <a:pPr algn="ctr"/>
             <a:r>
-              <a:rPr lang="fr-CA" dirty="0" err="1" smtClean="0"/>
+              <a:rPr lang="fr-CA" dirty="0" err="1"/>
               <a:t>Employee</a:t>
             </a:r>
             <a:r>
-              <a:rPr lang="fr-CA" dirty="0" smtClean="0"/>
+              <a:rPr lang="fr-CA" dirty="0"/>
               <a:t> + </a:t>
             </a:r>
             <a:r>
-              <a:rPr lang="fr-CA" dirty="0" err="1" smtClean="0"/>
+              <a:rPr lang="fr-CA" dirty="0" err="1"/>
               <a:t>MenuItem</a:t>
             </a:r>
             <a:r>
-              <a:rPr lang="fr-CA" dirty="0" smtClean="0"/>
+              <a:rPr lang="fr-CA" dirty="0"/>
               <a:t> </a:t>
             </a:r>
             <a:r>
-              <a:rPr lang="fr-CA" dirty="0" err="1" smtClean="0"/>
+              <a:rPr lang="fr-CA" dirty="0" err="1"/>
               <a:t>Controllers</a:t>
             </a:r>
             <a:endParaRPr lang="fr-CA" dirty="0"/>
@@ -7387,6 +9050,29 @@
           </a:prstGeom>
         </p:spPr>
       </p:pic>
+      <p:sp>
+        <p:nvSpPr>
+          <p:cNvPr id="3" name="Slide Number Placeholder 2"/>
+          <p:cNvSpPr>
+            <a:spLocks noGrp="1"/>
+          </p:cNvSpPr>
+          <p:nvPr>
+            <p:ph type="sldNum" sz="quarter" idx="12"/>
+          </p:nvPr>
+        </p:nvSpPr>
+        <p:spPr/>
+        <p:txBody>
+          <a:bodyPr/>
+          <a:lstStyle/>
+          <a:p>
+            <a:fld id="{886BB73A-582F-4420-9A14-CB10A2B2E5E8}" type="slidenum">
+              <a:rPr lang="en-US" smtClean="0"/>
+              <a:t>7</a:t>
+            </a:fld>
+            <a:endParaRPr lang="en-US"/>
+          </a:p>
+        </p:txBody>
+      </p:sp>
     </p:spTree>
     <p:extLst>
       <p:ext uri="{BB962C8B-B14F-4D97-AF65-F5344CB8AC3E}">
@@ -7590,11 +9276,11 @@
           <a:p>
             <a:pPr algn="ctr"/>
             <a:r>
-              <a:rPr lang="fr-CA" dirty="0" smtClean="0"/>
+              <a:rPr lang="fr-CA" dirty="0"/>
               <a:t>Desktop </a:t>
             </a:r>
             <a:r>
-              <a:rPr lang="fr-CA" dirty="0" err="1" smtClean="0"/>
+              <a:rPr lang="fr-CA" dirty="0" err="1"/>
               <a:t>View</a:t>
             </a:r>
             <a:endParaRPr lang="fr-CA" dirty="0"/>
@@ -7610,7 +9296,7 @@
           <p:nvPr/>
         </p:nvPicPr>
         <p:blipFill>
-          <a:blip r:embed="rId2">
+          <a:blip r:embed="rId2" cstate="email">
             <a:extLst>
               <a:ext uri="{28A0092B-C50C-407E-A947-70E740481C1C}">
                 <a14:useLocalDpi xmlns:a14="http://schemas.microsoft.com/office/drawing/2010/main" val="0"/>
@@ -7631,6 +9317,29 @@
           </a:prstGeom>
         </p:spPr>
       </p:pic>
+      <p:sp>
+        <p:nvSpPr>
+          <p:cNvPr id="3" name="Slide Number Placeholder 2"/>
+          <p:cNvSpPr>
+            <a:spLocks noGrp="1"/>
+          </p:cNvSpPr>
+          <p:nvPr>
+            <p:ph type="sldNum" sz="quarter" idx="12"/>
+          </p:nvPr>
+        </p:nvSpPr>
+        <p:spPr/>
+        <p:txBody>
+          <a:bodyPr/>
+          <a:lstStyle/>
+          <a:p>
+            <a:fld id="{886BB73A-582F-4420-9A14-CB10A2B2E5E8}" type="slidenum">
+              <a:rPr lang="en-US" smtClean="0"/>
+              <a:t>8</a:t>
+            </a:fld>
+            <a:endParaRPr lang="en-US"/>
+          </a:p>
+        </p:txBody>
+      </p:sp>
     </p:spTree>
     <p:extLst>
       <p:ext uri="{BB962C8B-B14F-4D97-AF65-F5344CB8AC3E}">
@@ -7641,13 +9350,6 @@
   <p:clrMapOvr>
     <a:masterClrMapping/>
   </p:clrMapOvr>
-  <p:timing>
-    <p:tnLst>
-      <p:par>
-        <p:cTn id="1" dur="indefinite" restart="never" nodeType="tmRoot"/>
-      </p:par>
-    </p:tnLst>
-  </p:timing>
 </p:sld>
 </file>
 
@@ -7685,11 +9387,11 @@
           <a:p>
             <a:pPr algn="ctr"/>
             <a:r>
-              <a:rPr lang="fr-CA" dirty="0" smtClean="0"/>
+              <a:rPr lang="fr-CA" dirty="0"/>
               <a:t>Browser </a:t>
             </a:r>
             <a:r>
-              <a:rPr lang="fr-CA" dirty="0" err="1" smtClean="0"/>
+              <a:rPr lang="fr-CA" dirty="0" err="1"/>
               <a:t>View</a:t>
             </a:r>
             <a:endParaRPr lang="fr-CA" dirty="0"/>
@@ -7705,7 +9407,7 @@
           <p:nvPr/>
         </p:nvPicPr>
         <p:blipFill>
-          <a:blip r:embed="rId2">
+          <a:blip r:embed="rId2" cstate="email">
             <a:extLst>
               <a:ext uri="{28A0092B-C50C-407E-A947-70E740481C1C}">
                 <a14:useLocalDpi xmlns:a14="http://schemas.microsoft.com/office/drawing/2010/main" val="0"/>
@@ -7735,7 +9437,7 @@
           <p:nvPr/>
         </p:nvPicPr>
         <p:blipFill>
-          <a:blip r:embed="rId3">
+          <a:blip r:embed="rId3" cstate="email">
             <a:extLst>
               <a:ext uri="{28A0092B-C50C-407E-A947-70E740481C1C}">
                 <a14:useLocalDpi xmlns:a14="http://schemas.microsoft.com/office/drawing/2010/main" val="0"/>
@@ -7756,6 +9458,29 @@
           </a:prstGeom>
         </p:spPr>
       </p:pic>
+      <p:sp>
+        <p:nvSpPr>
+          <p:cNvPr id="3" name="Slide Number Placeholder 2"/>
+          <p:cNvSpPr>
+            <a:spLocks noGrp="1"/>
+          </p:cNvSpPr>
+          <p:nvPr>
+            <p:ph type="sldNum" sz="quarter" idx="12"/>
+          </p:nvPr>
+        </p:nvSpPr>
+        <p:spPr/>
+        <p:txBody>
+          <a:bodyPr/>
+          <a:lstStyle/>
+          <a:p>
+            <a:fld id="{886BB73A-582F-4420-9A14-CB10A2B2E5E8}" type="slidenum">
+              <a:rPr lang="en-US" smtClean="0"/>
+              <a:t>9</a:t>
+            </a:fld>
+            <a:endParaRPr lang="en-US"/>
+          </a:p>
+        </p:txBody>
+      </p:sp>
     </p:spTree>
     <p:extLst>
       <p:ext uri="{BB962C8B-B14F-4D97-AF65-F5344CB8AC3E}">
@@ -8028,4 +9753,299 @@
   </a:objectDefaults>
   <a:extraClrSchemeLst/>
 </a:theme>
+</file>
+
+<file path=ppt/theme/theme2.xml><?xml version="1.0" encoding="utf-8"?>
+<a:theme xmlns:a="http://schemas.openxmlformats.org/drawingml/2006/main" name="Office Theme">
+  <a:themeElements>
+    <a:clrScheme name="Office">
+      <a:dk1>
+        <a:sysClr val="windowText" lastClr="000000"/>
+      </a:dk1>
+      <a:lt1>
+        <a:sysClr val="window" lastClr="FFFFFF"/>
+      </a:lt1>
+      <a:dk2>
+        <a:srgbClr val="44546A"/>
+      </a:dk2>
+      <a:lt2>
+        <a:srgbClr val="E7E6E6"/>
+      </a:lt2>
+      <a:accent1>
+        <a:srgbClr val="5B9BD5"/>
+      </a:accent1>
+      <a:accent2>
+        <a:srgbClr val="ED7D31"/>
+      </a:accent2>
+      <a:accent3>
+        <a:srgbClr val="A5A5A5"/>
+      </a:accent3>
+      <a:accent4>
+        <a:srgbClr val="FFC000"/>
+      </a:accent4>
+      <a:accent5>
+        <a:srgbClr val="4472C4"/>
+      </a:accent5>
+      <a:accent6>
+        <a:srgbClr val="70AD47"/>
+      </a:accent6>
+      <a:hlink>
+        <a:srgbClr val="0563C1"/>
+      </a:hlink>
+      <a:folHlink>
+        <a:srgbClr val="954F72"/>
+      </a:folHlink>
+    </a:clrScheme>
+    <a:fontScheme name="Office">
+      <a:majorFont>
+        <a:latin typeface="Calibri Light" panose="020F0302020204030204"/>
+        <a:ea typeface=""/>
+        <a:cs typeface=""/>
+        <a:font script="Jpan" typeface="游ゴシック Light"/>
+        <a:font script="Hang" typeface="맑은 고딕"/>
+        <a:font script="Hans" typeface="等线 Light"/>
+        <a:font script="Hant" typeface="新細明體"/>
+        <a:font script="Arab" typeface="Times New Roman"/>
+        <a:font script="Hebr" typeface="Times New Roman"/>
+        <a:font script="Thai" typeface="Angsana New"/>
+        <a:font script="Ethi" typeface="Nyala"/>
+        <a:font script="Beng" typeface="Vrinda"/>
+        <a:font script="Gujr" typeface="Shruti"/>
+        <a:font script="Khmr" typeface="MoolBoran"/>
+        <a:font script="Knda" typeface="Tunga"/>
+        <a:font script="Guru" typeface="Raavi"/>
+        <a:font script="Cans" typeface="Euphemia"/>
+        <a:font script="Cher" typeface="Plantagenet Cherokee"/>
+        <a:font script="Yiii" typeface="Microsoft Yi Baiti"/>
+        <a:font script="Tibt" typeface="Microsoft Himalaya"/>
+        <a:font script="Thaa" typeface="MV Boli"/>
+        <a:font script="Deva" typeface="Mangal"/>
+        <a:font script="Telu" typeface="Gautami"/>
+        <a:font script="Taml" typeface="Latha"/>
+        <a:font script="Syrc" typeface="Estrangelo Edessa"/>
+        <a:font script="Orya" typeface="Kalinga"/>
+        <a:font script="Mlym" typeface="Kartika"/>
+        <a:font script="Laoo" typeface="DokChampa"/>
+        <a:font script="Sinh" typeface="Iskoola Pota"/>
+        <a:font script="Mong" typeface="Mongolian Baiti"/>
+        <a:font script="Viet" typeface="Times New Roman"/>
+        <a:font script="Uigh" typeface="Microsoft Uighur"/>
+        <a:font script="Geor" typeface="Sylfaen"/>
+        <a:font script="Armn" typeface="Arial"/>
+        <a:font script="Bugi" typeface="Leelawadee UI"/>
+        <a:font script="Bopo" typeface="Microsoft JhengHei"/>
+        <a:font script="Java" typeface="Javanese Text"/>
+        <a:font script="Lisu" typeface="Segoe UI"/>
+        <a:font script="Mymr" typeface="Myanmar Text"/>
+        <a:font script="Nkoo" typeface="Ebrima"/>
+        <a:font script="Olck" typeface="Nirmala UI"/>
+        <a:font script="Osma" typeface="Ebrima"/>
+        <a:font script="Phag" typeface="Phagspa"/>
+        <a:font script="Syrn" typeface="Estrangelo Edessa"/>
+        <a:font script="Syrj" typeface="Estrangelo Edessa"/>
+        <a:font script="Syre" typeface="Estrangelo Edessa"/>
+        <a:font script="Sora" typeface="Nirmala UI"/>
+        <a:font script="Tale" typeface="Microsoft Tai Le"/>
+        <a:font script="Talu" typeface="Microsoft New Tai Lue"/>
+        <a:font script="Tfng" typeface="Ebrima"/>
+      </a:majorFont>
+      <a:minorFont>
+        <a:latin typeface="Calibri" panose="020F0502020204030204"/>
+        <a:ea typeface=""/>
+        <a:cs typeface=""/>
+        <a:font script="Jpan" typeface="游ゴシック"/>
+        <a:font script="Hang" typeface="맑은 고딕"/>
+        <a:font script="Hans" typeface="等线"/>
+        <a:font script="Hant" typeface="新細明體"/>
+        <a:font script="Arab" typeface="Arial"/>
+        <a:font script="Hebr" typeface="Arial"/>
+        <a:font script="Thai" typeface="Cordia New"/>
+        <a:font script="Ethi" typeface="Nyala"/>
+        <a:font script="Beng" typeface="Vrinda"/>
+        <a:font script="Gujr" typeface="Shruti"/>
+        <a:font script="Khmr" typeface="DaunPenh"/>
+        <a:font script="Knda" typeface="Tunga"/>
+        <a:font script="Guru" typeface="Raavi"/>
+        <a:font script="Cans" typeface="Euphemia"/>
+        <a:font script="Cher" typeface="Plantagenet Cherokee"/>
+        <a:font script="Yiii" typeface="Microsoft Yi Baiti"/>
+        <a:font script="Tibt" typeface="Microsoft Himalaya"/>
+        <a:font script="Thaa" typeface="MV Boli"/>
+        <a:font script="Deva" typeface="Mangal"/>
+        <a:font script="Telu" typeface="Gautami"/>
+        <a:font script="Taml" typeface="Latha"/>
+        <a:font script="Syrc" typeface="Estrangelo Edessa"/>
+        <a:font script="Orya" typeface="Kalinga"/>
+        <a:font script="Mlym" typeface="Kartika"/>
+        <a:font script="Laoo" typeface="DokChampa"/>
+        <a:font script="Sinh" typeface="Iskoola Pota"/>
+        <a:font script="Mong" typeface="Mongolian Baiti"/>
+        <a:font script="Viet" typeface="Arial"/>
+        <a:font script="Uigh" typeface="Microsoft Uighur"/>
+        <a:font script="Geor" typeface="Sylfaen"/>
+        <a:font script="Armn" typeface="Arial"/>
+        <a:font script="Bugi" typeface="Leelawadee UI"/>
+        <a:font script="Bopo" typeface="Microsoft JhengHei"/>
+        <a:font script="Java" typeface="Javanese Text"/>
+        <a:font script="Lisu" typeface="Segoe UI"/>
+        <a:font script="Mymr" typeface="Myanmar Text"/>
+        <a:font script="Nkoo" typeface="Ebrima"/>
+        <a:font script="Olck" typeface="Nirmala UI"/>
+        <a:font script="Osma" typeface="Ebrima"/>
+        <a:font script="Phag" typeface="Phagspa"/>
+        <a:font script="Syrn" typeface="Estrangelo Edessa"/>
+        <a:font script="Syrj" typeface="Estrangelo Edessa"/>
+        <a:font script="Syre" typeface="Estrangelo Edessa"/>
+        <a:font script="Sora" typeface="Nirmala UI"/>
+        <a:font script="Tale" typeface="Microsoft Tai Le"/>
+        <a:font script="Talu" typeface="Microsoft New Tai Lue"/>
+        <a:font script="Tfng" typeface="Ebrima"/>
+      </a:minorFont>
+    </a:fontScheme>
+    <a:fmtScheme name="Office">
+      <a:fillStyleLst>
+        <a:solidFill>
+          <a:schemeClr val="phClr"/>
+        </a:solidFill>
+        <a:gradFill rotWithShape="1">
+          <a:gsLst>
+            <a:gs pos="0">
+              <a:schemeClr val="phClr">
+                <a:lumMod val="110000"/>
+                <a:satMod val="105000"/>
+                <a:tint val="67000"/>
+              </a:schemeClr>
+            </a:gs>
+            <a:gs pos="50000">
+              <a:schemeClr val="phClr">
+                <a:lumMod val="105000"/>
+                <a:satMod val="103000"/>
+                <a:tint val="73000"/>
+              </a:schemeClr>
+            </a:gs>
+            <a:gs pos="100000">
+              <a:schemeClr val="phClr">
+                <a:lumMod val="105000"/>
+                <a:satMod val="109000"/>
+                <a:tint val="81000"/>
+              </a:schemeClr>
+            </a:gs>
+          </a:gsLst>
+          <a:lin ang="5400000" scaled="0"/>
+        </a:gradFill>
+        <a:gradFill rotWithShape="1">
+          <a:gsLst>
+            <a:gs pos="0">
+              <a:schemeClr val="phClr">
+                <a:satMod val="103000"/>
+                <a:lumMod val="102000"/>
+                <a:tint val="94000"/>
+              </a:schemeClr>
+            </a:gs>
+            <a:gs pos="50000">
+              <a:schemeClr val="phClr">
+                <a:satMod val="110000"/>
+                <a:lumMod val="100000"/>
+                <a:shade val="100000"/>
+              </a:schemeClr>
+            </a:gs>
+            <a:gs pos="100000">
+              <a:schemeClr val="phClr">
+                <a:lumMod val="99000"/>
+                <a:satMod val="120000"/>
+                <a:shade val="78000"/>
+              </a:schemeClr>
+            </a:gs>
+          </a:gsLst>
+          <a:lin ang="5400000" scaled="0"/>
+        </a:gradFill>
+      </a:fillStyleLst>
+      <a:lnStyleLst>
+        <a:ln w="6350" cap="flat" cmpd="sng" algn="ctr">
+          <a:solidFill>
+            <a:schemeClr val="phClr"/>
+          </a:solidFill>
+          <a:prstDash val="solid"/>
+          <a:miter lim="800000"/>
+        </a:ln>
+        <a:ln w="12700" cap="flat" cmpd="sng" algn="ctr">
+          <a:solidFill>
+            <a:schemeClr val="phClr"/>
+          </a:solidFill>
+          <a:prstDash val="solid"/>
+          <a:miter lim="800000"/>
+        </a:ln>
+        <a:ln w="19050" cap="flat" cmpd="sng" algn="ctr">
+          <a:solidFill>
+            <a:schemeClr val="phClr"/>
+          </a:solidFill>
+          <a:prstDash val="solid"/>
+          <a:miter lim="800000"/>
+        </a:ln>
+      </a:lnStyleLst>
+      <a:effectStyleLst>
+        <a:effectStyle>
+          <a:effectLst/>
+        </a:effectStyle>
+        <a:effectStyle>
+          <a:effectLst/>
+        </a:effectStyle>
+        <a:effectStyle>
+          <a:effectLst>
+            <a:outerShdw blurRad="57150" dist="19050" dir="5400000" algn="ctr" rotWithShape="0">
+              <a:srgbClr val="000000">
+                <a:alpha val="63000"/>
+              </a:srgbClr>
+            </a:outerShdw>
+          </a:effectLst>
+        </a:effectStyle>
+      </a:effectStyleLst>
+      <a:bgFillStyleLst>
+        <a:solidFill>
+          <a:schemeClr val="phClr"/>
+        </a:solidFill>
+        <a:solidFill>
+          <a:schemeClr val="phClr">
+            <a:tint val="95000"/>
+            <a:satMod val="170000"/>
+          </a:schemeClr>
+        </a:solidFill>
+        <a:gradFill rotWithShape="1">
+          <a:gsLst>
+            <a:gs pos="0">
+              <a:schemeClr val="phClr">
+                <a:tint val="93000"/>
+                <a:satMod val="150000"/>
+                <a:shade val="98000"/>
+                <a:lumMod val="102000"/>
+              </a:schemeClr>
+            </a:gs>
+            <a:gs pos="50000">
+              <a:schemeClr val="phClr">
+                <a:tint val="98000"/>
+                <a:satMod val="130000"/>
+                <a:shade val="90000"/>
+                <a:lumMod val="103000"/>
+              </a:schemeClr>
+            </a:gs>
+            <a:gs pos="100000">
+              <a:schemeClr val="phClr">
+                <a:shade val="63000"/>
+                <a:satMod val="120000"/>
+              </a:schemeClr>
+            </a:gs>
+          </a:gsLst>
+          <a:lin ang="5400000" scaled="0"/>
+        </a:gradFill>
+      </a:bgFillStyleLst>
+    </a:fmtScheme>
+  </a:themeElements>
+  <a:objectDefaults/>
+  <a:extraClrSchemeLst/>
+  <a:extLst>
+    <a:ext uri="{05A4C25C-085E-4340-85A3-A5531E510DB2}">
+      <thm15:themeFamily xmlns:thm15="http://schemas.microsoft.com/office/thememl/2012/main" name="Office Theme" id="{62F939B6-93AF-4DB8-9C6B-D6C7DFDC589F}" vid="{4A3C46E8-61CC-4603-A589-7422A47A8E4A}"/>
+    </a:ext>
+  </a:extLst>
+</a:theme>
 </file>
</xml_diff>

<commit_message>
Added use case diagram and fixed other slides
</commit_message>
<xml_diff>
--- a/Deliverable_5.pptx
+++ b/Deliverable_5.pptx
@@ -131,7 +131,7 @@
   </p:defaultTextStyle>
   <p:extLst>
     <p:ext uri="{EFAFB233-063F-42B5-8137-9DF3F51BA10A}">
-      <p15:sldGuideLst xmlns:p15="http://schemas.microsoft.com/office/powerpoint/2012/main">
+      <p15:sldGuideLst xmlns:p15="http://schemas.microsoft.com/office/powerpoint/2012/main" xmlns="">
         <p15:guide id="1" orient="horz" pos="2160">
           <p15:clr>
             <a:srgbClr val="A4A3A4"/>
@@ -722,7 +722,7 @@
           <a:p>
             <a:fld id="{2C95243B-3204-49B9-9153-5DC712CA66CA}" type="datetime1">
               <a:rPr lang="en-US" smtClean="0"/>
-              <a:t>11/29/2016</a:t>
+              <a:t>2016-11-29</a:t>
             </a:fld>
             <a:endParaRPr lang="en-US"/>
           </a:p>
@@ -1056,7 +1056,7 @@
           <a:p>
             <a:fld id="{74F686FD-7527-4BC9-911B-810F5230F2C9}" type="datetime1">
               <a:rPr lang="en-US" smtClean="0"/>
-              <a:t>11/29/2016</a:t>
+              <a:t>2016-11-29</a:t>
             </a:fld>
             <a:endParaRPr lang="en-US"/>
           </a:p>
@@ -1295,7 +1295,7 @@
           <a:p>
             <a:fld id="{E50121F8-520D-48A6-8C59-F518097FFFB4}" type="datetime1">
               <a:rPr lang="en-US" smtClean="0"/>
-              <a:t>11/29/2016</a:t>
+              <a:t>2016-11-29</a:t>
             </a:fld>
             <a:endParaRPr lang="en-US"/>
           </a:p>
@@ -1595,7 +1595,7 @@
           <a:p>
             <a:fld id="{3BB9FF3A-17E0-4305-9390-B64A8AE1671E}" type="datetime1">
               <a:rPr lang="en-US" smtClean="0"/>
-              <a:t>11/29/2016</a:t>
+              <a:t>2016-11-29</a:t>
             </a:fld>
             <a:endParaRPr lang="en-US"/>
           </a:p>
@@ -1811,7 +1811,7 @@
           <a:p>
             <a:fld id="{6A0D4AAE-82DD-462D-B7E6-44989E39F8A0}" type="datetime1">
               <a:rPr lang="en-US" smtClean="0"/>
-              <a:t>11/29/2016</a:t>
+              <a:t>2016-11-29</a:t>
             </a:fld>
             <a:endParaRPr lang="en-US"/>
           </a:p>
@@ -2171,7 +2171,7 @@
           <a:p>
             <a:fld id="{C19927EA-3FA8-43B8-93B9-31A904DCB859}" type="datetime1">
               <a:rPr lang="en-US" smtClean="0"/>
-              <a:t>11/29/2016</a:t>
+              <a:t>2016-11-29</a:t>
             </a:fld>
             <a:endParaRPr lang="en-US"/>
           </a:p>
@@ -2438,7 +2438,7 @@
           <a:p>
             <a:fld id="{5F85AEF8-B7FD-46B5-B914-C2F7CC454AEB}" type="datetime1">
               <a:rPr lang="en-US" smtClean="0"/>
-              <a:t>11/29/2016</a:t>
+              <a:t>2016-11-29</a:t>
             </a:fld>
             <a:endParaRPr lang="en-US"/>
           </a:p>
@@ -2528,7 +2528,7 @@
           <a:p>
             <a:fld id="{0622A0DD-DCB8-4BBE-ABF7-BA036909C239}" type="datetime1">
               <a:rPr lang="en-US" smtClean="0"/>
-              <a:t>11/29/2016</a:t>
+              <a:t>2016-11-29</a:t>
             </a:fld>
             <a:endParaRPr lang="en-US"/>
           </a:p>
@@ -2829,7 +2829,7 @@
           <a:p>
             <a:fld id="{9177164F-74FA-4CB8-9B5B-662FD7CFA6B9}" type="datetime1">
               <a:rPr lang="en-US" smtClean="0"/>
-              <a:t>11/29/2016</a:t>
+              <a:t>2016-11-29</a:t>
             </a:fld>
             <a:endParaRPr lang="en-US"/>
           </a:p>
@@ -3135,7 +3135,7 @@
           <a:p>
             <a:fld id="{80E9FE78-BEA2-42AA-ABA2-4F3DBE40661E}" type="datetime1">
               <a:rPr lang="en-US" smtClean="0"/>
-              <a:t>11/29/2016</a:t>
+              <a:t>2016-11-29</a:t>
             </a:fld>
             <a:endParaRPr lang="en-US"/>
           </a:p>
@@ -3415,7 +3415,7 @@
           <a:p>
             <a:fld id="{7A7E742C-2A8E-46FF-B5F9-FBFD4DD3A72F}" type="datetime1">
               <a:rPr lang="en-US" smtClean="0"/>
-              <a:t>11/29/2016</a:t>
+              <a:t>2016-11-29</a:t>
             </a:fld>
             <a:endParaRPr lang="en-US"/>
           </a:p>
@@ -3823,7 +3823,7 @@
           <a:p>
             <a:fld id="{EC6B436B-803D-4EBD-AFA9-4A1FDDAC9946}" type="datetime1">
               <a:rPr lang="en-US" smtClean="0"/>
-              <a:t>11/29/2016</a:t>
+              <a:t>2016-11-29</a:t>
             </a:fld>
             <a:endParaRPr lang="en-US"/>
           </a:p>
@@ -4383,7 +4383,7 @@
           <a:p>
             <a:fld id="{59369CFD-0A25-4FD9-88F8-ACD9F30E477C}" type="datetime1">
               <a:rPr lang="en-US" smtClean="0"/>
-              <a:t>11/29/2016</a:t>
+              <a:t>2016-11-29</a:t>
             </a:fld>
             <a:endParaRPr lang="en-US"/>
           </a:p>
@@ -4531,7 +4531,7 @@
           <a:p>
             <a:fld id="{8DC3DC1D-9899-460F-A841-78CA654D383D}" type="datetime1">
               <a:rPr lang="en-US" smtClean="0"/>
-              <a:t>11/29/2016</a:t>
+              <a:t>2016-11-29</a:t>
             </a:fld>
             <a:endParaRPr lang="en-US"/>
           </a:p>
@@ -4621,7 +4621,7 @@
           <a:p>
             <a:fld id="{3AACFB54-97A0-49AB-97FB-216ECFDECFA0}" type="datetime1">
               <a:rPr lang="en-US" smtClean="0"/>
-              <a:t>11/29/2016</a:t>
+              <a:t>2016-11-29</a:t>
             </a:fld>
             <a:endParaRPr lang="en-US"/>
           </a:p>
@@ -4963,7 +4963,7 @@
           <a:p>
             <a:fld id="{8DF80C95-1EBD-48A9-8279-190D726CD90B}" type="datetime1">
               <a:rPr lang="en-US" smtClean="0"/>
-              <a:t>11/29/2016</a:t>
+              <a:t>2016-11-29</a:t>
             </a:fld>
             <a:endParaRPr lang="en-US"/>
           </a:p>
@@ -5172,7 +5172,7 @@
           <a:p>
             <a:fld id="{79B136B0-5659-4479-A06E-E667F6904DE6}" type="datetime1">
               <a:rPr lang="en-US" smtClean="0"/>
-              <a:t>11/29/2016</a:t>
+              <a:t>2016-11-29</a:t>
             </a:fld>
             <a:endParaRPr lang="en-US"/>
           </a:p>
@@ -5735,7 +5735,13 @@
           <a:lstStyle/>
           <a:p>
             <a:r>
-              <a:rPr lang="fr-CA" dirty="0"/>
+              <a:rPr lang="fr-CA" b="1" i="1" dirty="0" smtClean="0"/>
+              <a:t>Team 12</a:t>
+            </a:r>
+          </a:p>
+          <a:p>
+            <a:r>
+              <a:rPr lang="fr-CA" dirty="0" smtClean="0"/>
               <a:t>Noah </a:t>
             </a:r>
             <a:r>
@@ -5815,6 +5821,13 @@
   <p:clrMapOvr>
     <a:masterClrMapping/>
   </p:clrMapOvr>
+  <p:timing>
+    <p:tnLst>
+      <p:par>
+        <p:cTn xmlns:p14="http://schemas.microsoft.com/office/powerpoint/2010/main" id="1" dur="indefinite" restart="never" nodeType="tmRoot"/>
+      </p:par>
+    </p:tnLst>
+  </p:timing>
 </p:sld>
 </file>
 
@@ -6295,9 +6308,10 @@
               <a:buChar char="•"/>
             </a:pPr>
             <a:r>
-              <a:rPr lang="en-CA" sz="2000" dirty="0"/>
+              <a:rPr lang="en-CA" sz="2000" dirty="0" smtClean="0"/>
               <a:t>Android</a:t>
             </a:r>
+            <a:endParaRPr lang="en-CA" sz="2000" dirty="0"/>
           </a:p>
           <a:p>
             <a:pPr marL="257175" indent="-257175" algn="l">
@@ -6305,8 +6319,8 @@
               <a:buChar char="•"/>
             </a:pPr>
             <a:r>
-              <a:rPr lang="en-CA" sz="2000" dirty="0"/>
-              <a:t>IOS</a:t>
+              <a:rPr lang="en-CA" sz="2000" dirty="0" smtClean="0"/>
+              <a:t>Desktop Computers</a:t>
             </a:r>
           </a:p>
           <a:p>
@@ -6315,9 +6329,17 @@
               <a:buChar char="•"/>
             </a:pPr>
             <a:r>
-              <a:rPr lang="en-CA" sz="2000" dirty="0"/>
-              <a:t>Personal computers</a:t>
-            </a:r>
+              <a:rPr lang="en-CA" sz="2000" dirty="0" smtClean="0"/>
+              <a:t>Web Browsers</a:t>
+            </a:r>
+            <a:endParaRPr lang="en-CA" sz="2000" dirty="0" smtClean="0"/>
+          </a:p>
+          <a:p>
+            <a:pPr marL="257175" indent="-257175" algn="l">
+              <a:buFont typeface="Arial" panose="020B0604020202020204" pitchFamily="34" charset="0"/>
+              <a:buChar char="•"/>
+            </a:pPr>
+            <a:endParaRPr lang="en-CA" sz="2000" dirty="0"/>
           </a:p>
         </p:txBody>
       </p:sp>
@@ -6352,7 +6374,7 @@
           </a:prstGeom>
           <a:noFill/>
           <a:extLst>
-            <a:ext uri="{909E8E84-426E-40DD-AFC4-6F175D3DCCD1}">
+            <a:ext uri="{909E8E84-426E-40dd-AFC4-6F175D3DCCD1}">
               <a14:hiddenFill xmlns:a14="http://schemas.microsoft.com/office/drawing/2010/main">
                 <a:solidFill>
                   <a:srgbClr val="FFFFFF"/>
@@ -6393,7 +6415,7 @@
           </a:prstGeom>
           <a:noFill/>
           <a:extLst>
-            <a:ext uri="{909E8E84-426E-40DD-AFC4-6F175D3DCCD1}">
+            <a:ext uri="{909E8E84-426E-40dd-AFC4-6F175D3DCCD1}">
               <a14:hiddenFill xmlns:a14="http://schemas.microsoft.com/office/drawing/2010/main">
                 <a:solidFill>
                   <a:srgbClr val="FFFFFF"/>
@@ -6434,7 +6456,7 @@
           </a:prstGeom>
           <a:noFill/>
           <a:extLst>
-            <a:ext uri="{909E8E84-426E-40DD-AFC4-6F175D3DCCD1}">
+            <a:ext uri="{909E8E84-426E-40dd-AFC4-6F175D3DCCD1}">
               <a14:hiddenFill xmlns:a14="http://schemas.microsoft.com/office/drawing/2010/main">
                 <a:solidFill>
                   <a:srgbClr val="FFFFFF"/>
@@ -6475,7 +6497,7 @@
           </a:prstGeom>
           <a:noFill/>
           <a:extLst>
-            <a:ext uri="{909E8E84-426E-40DD-AFC4-6F175D3DCCD1}">
+            <a:ext uri="{909E8E84-426E-40dd-AFC4-6F175D3DCCD1}">
               <a14:hiddenFill xmlns:a14="http://schemas.microsoft.com/office/drawing/2010/main">
                 <a:solidFill>
                   <a:srgbClr val="FFFFFF"/>
@@ -6652,7 +6674,7 @@
           </a:prstGeom>
           <a:noFill/>
           <a:extLst>
-            <a:ext uri="{909E8E84-426E-40DD-AFC4-6F175D3DCCD1}">
+            <a:ext uri="{909E8E84-426E-40dd-AFC4-6F175D3DCCD1}">
               <a14:hiddenFill xmlns:a14="http://schemas.microsoft.com/office/drawing/2010/main">
                 <a:solidFill>
                   <a:srgbClr val="FFFFFF"/>
@@ -6770,14 +6792,12 @@
           </a:p>
           <a:p>
             <a:r>
+              <a:rPr lang="en-CA" dirty="0" smtClean="0"/>
+              <a:t>Code </a:t>
+            </a:r>
+            <a:r>
               <a:rPr lang="en-CA" dirty="0"/>
-              <a:t>Automated testing</a:t>
-            </a:r>
-          </a:p>
-          <a:p>
-            <a:r>
-              <a:rPr lang="en-CA" dirty="0"/>
-              <a:t>Code reviews</a:t>
+              <a:t>reviews</a:t>
             </a:r>
           </a:p>
         </p:txBody>
@@ -6813,7 +6833,7 @@
           </a:prstGeom>
           <a:noFill/>
           <a:extLst>
-            <a:ext uri="{909E8E84-426E-40DD-AFC4-6F175D3DCCD1}">
+            <a:ext uri="{909E8E84-426E-40dd-AFC4-6F175D3DCCD1}">
               <a14:hiddenFill xmlns:a14="http://schemas.microsoft.com/office/drawing/2010/main">
                 <a:solidFill>
                   <a:srgbClr val="FFFFFF"/>
@@ -6854,7 +6874,7 @@
           </a:prstGeom>
           <a:noFill/>
           <a:extLst>
-            <a:ext uri="{909E8E84-426E-40DD-AFC4-6F175D3DCCD1}">
+            <a:ext uri="{909E8E84-426E-40dd-AFC4-6F175D3DCCD1}">
               <a14:hiddenFill xmlns:a14="http://schemas.microsoft.com/office/drawing/2010/main">
                 <a:solidFill>
                   <a:srgbClr val="FFFFFF"/>
@@ -7000,7 +7020,7 @@
           </a:prstGeom>
           <a:noFill/>
           <a:extLst>
-            <a:ext uri="{909E8E84-426E-40DD-AFC4-6F175D3DCCD1}">
+            <a:ext uri="{909E8E84-426E-40dd-AFC4-6F175D3DCCD1}">
               <a14:hiddenFill xmlns:a14="http://schemas.microsoft.com/office/drawing/2010/main">
                 <a:solidFill>
                   <a:srgbClr val="FFFFFF"/>
@@ -7149,7 +7169,7 @@
           </a:prstGeom>
           <a:noFill/>
           <a:extLst>
-            <a:ext uri="{909E8E84-426E-40DD-AFC4-6F175D3DCCD1}">
+            <a:ext uri="{909E8E84-426E-40dd-AFC4-6F175D3DCCD1}">
               <a14:hiddenFill xmlns:a14="http://schemas.microsoft.com/office/drawing/2010/main">
                 <a:solidFill>
                   <a:srgbClr val="FFFFFF"/>
@@ -7705,12 +7725,12 @@
       </p:grpSpPr>
       <p:sp>
         <p:nvSpPr>
-          <p:cNvPr id="5" name="Content Placeholder 4"/>
-          <p:cNvSpPr>
-            <a:spLocks noGrp="1"/>
-          </p:cNvSpPr>
-          <p:nvPr>
-            <p:ph idx="1"/>
+          <p:cNvPr id="7" name="Title 6"/>
+          <p:cNvSpPr>
+            <a:spLocks noGrp="1"/>
+          </p:cNvSpPr>
+          <p:nvPr>
+            <p:ph type="title"/>
           </p:nvPr>
         </p:nvSpPr>
         <p:spPr/>
@@ -7718,18 +7738,27 @@
           <a:bodyPr/>
           <a:lstStyle/>
           <a:p>
+            <a:pPr algn="ctr"/>
+            <a:r>
+              <a:rPr lang="fr-CA" dirty="0" smtClean="0"/>
+              <a:t>Use Case </a:t>
+            </a:r>
+            <a:r>
+              <a:rPr lang="fr-CA" dirty="0" err="1" smtClean="0"/>
+              <a:t>Diagram</a:t>
+            </a:r>
             <a:endParaRPr lang="fr-CA" dirty="0"/>
           </a:p>
         </p:txBody>
       </p:sp>
       <p:sp>
         <p:nvSpPr>
-          <p:cNvPr id="7" name="Title 6"/>
-          <p:cNvSpPr>
-            <a:spLocks noGrp="1"/>
-          </p:cNvSpPr>
-          <p:nvPr>
-            <p:ph type="title"/>
+          <p:cNvPr id="2" name="Slide Number Placeholder 1"/>
+          <p:cNvSpPr>
+            <a:spLocks noGrp="1"/>
+          </p:cNvSpPr>
+          <p:nvPr>
+            <p:ph type="sldNum" sz="quarter" idx="12"/>
           </p:nvPr>
         </p:nvSpPr>
         <p:spPr/>
@@ -7737,66 +7766,74 @@
           <a:bodyPr/>
           <a:lstStyle/>
           <a:p>
-            <a:endParaRPr lang="fr-CA" dirty="0"/>
+            <a:fld id="{886BB73A-582F-4420-9A14-CB10A2B2E5E8}" type="slidenum">
+              <a:rPr lang="en-US" smtClean="0"/>
+              <a:t>2</a:t>
+            </a:fld>
+            <a:endParaRPr lang="en-US"/>
           </a:p>
         </p:txBody>
       </p:sp>
       <p:pic>
         <p:nvPicPr>
-          <p:cNvPr id="8" name="Picture 7" descr="Macintosh HD:Users:Noah:Desktop:Project:Diagrams:Use Case Diagram.pdf"/>
-          <p:cNvPicPr/>
+          <p:cNvPr id="4" name="Picture 3" descr="Screen Shot 2016-11-29 at 11.09.15 PM.png"/>
+          <p:cNvPicPr>
+            <a:picLocks noChangeAspect="1"/>
+          </p:cNvPicPr>
           <p:nvPr/>
         </p:nvPicPr>
         <p:blipFill>
-          <a:blip r:embed="rId2" cstate="email">
+          <a:blip r:embed="rId2">
             <a:extLst>
               <a:ext uri="{28A0092B-C50C-407E-A947-70E740481C1C}">
                 <a14:useLocalDpi xmlns:a14="http://schemas.microsoft.com/office/drawing/2010/main" val="0"/>
               </a:ext>
             </a:extLst>
           </a:blip>
-          <a:srcRect/>
           <a:stretch>
             <a:fillRect/>
           </a:stretch>
         </p:blipFill>
-        <p:spPr bwMode="auto">
-          <a:xfrm>
-            <a:off x="173789" y="429207"/>
-            <a:ext cx="8457027" cy="6214897"/>
+        <p:spPr>
+          <a:xfrm>
+            <a:off x="297256" y="270681"/>
+            <a:ext cx="8618144" cy="4619929"/>
           </a:xfrm>
           <a:prstGeom prst="rect">
             <a:avLst/>
           </a:prstGeom>
-          <a:noFill/>
-          <a:ln>
-            <a:noFill/>
-          </a:ln>
         </p:spPr>
       </p:pic>
-      <p:sp>
-        <p:nvSpPr>
-          <p:cNvPr id="2" name="Slide Number Placeholder 1"/>
-          <p:cNvSpPr>
-            <a:spLocks noGrp="1"/>
-          </p:cNvSpPr>
-          <p:nvPr>
-            <p:ph type="sldNum" sz="quarter" idx="12"/>
-          </p:nvPr>
-        </p:nvSpPr>
-        <p:spPr/>
-        <p:txBody>
-          <a:bodyPr/>
-          <a:lstStyle/>
-          <a:p>
-            <a:fld id="{886BB73A-582F-4420-9A14-CB10A2B2E5E8}" type="slidenum">
-              <a:rPr lang="en-US" smtClean="0"/>
-              <a:t>2</a:t>
-            </a:fld>
-            <a:endParaRPr lang="en-US"/>
-          </a:p>
-        </p:txBody>
-      </p:sp>
+      <p:pic>
+        <p:nvPicPr>
+          <p:cNvPr id="6" name="Picture 5" descr="Screen Shot 2016-11-29 at 11.09.32 PM.png"/>
+          <p:cNvPicPr>
+            <a:picLocks noChangeAspect="1"/>
+          </p:cNvPicPr>
+          <p:nvPr/>
+        </p:nvPicPr>
+        <p:blipFill>
+          <a:blip r:embed="rId3">
+            <a:extLst>
+              <a:ext uri="{28A0092B-C50C-407E-A947-70E740481C1C}">
+                <a14:useLocalDpi xmlns:a14="http://schemas.microsoft.com/office/drawing/2010/main" val="0"/>
+              </a:ext>
+            </a:extLst>
+          </a:blip>
+          <a:stretch>
+            <a:fillRect/>
+          </a:stretch>
+        </p:blipFill>
+        <p:spPr>
+          <a:xfrm>
+            <a:off x="1431136" y="4890610"/>
+            <a:ext cx="7484264" cy="1566908"/>
+          </a:xfrm>
+          <a:prstGeom prst="rect">
+            <a:avLst/>
+          </a:prstGeom>
+        </p:spPr>
+      </p:pic>
     </p:spTree>
     <p:extLst>
       <p:ext uri="{BB962C8B-B14F-4D97-AF65-F5344CB8AC3E}">
@@ -7807,6 +7844,124 @@
   <p:clrMapOvr>
     <a:masterClrMapping/>
   </p:clrMapOvr>
+  <p:timing>
+    <p:tnLst>
+      <p:par>
+        <p:cTn xmlns:p14="http://schemas.microsoft.com/office/powerpoint/2010/main" id="1" dur="indefinite" restart="never" nodeType="tmRoot">
+          <p:childTnLst>
+            <p:seq concurrent="1" nextAc="seek">
+              <p:cTn id="2" dur="indefinite" nodeType="mainSeq">
+                <p:childTnLst>
+                  <p:par>
+                    <p:cTn id="3" fill="hold">
+                      <p:stCondLst>
+                        <p:cond delay="indefinite"/>
+                      </p:stCondLst>
+                      <p:childTnLst>
+                        <p:par>
+                          <p:cTn id="4" fill="hold">
+                            <p:stCondLst>
+                              <p:cond delay="0"/>
+                            </p:stCondLst>
+                            <p:childTnLst>
+                              <p:par>
+                                <p:cTn id="5" presetID="3" presetClass="entr" presetSubtype="10" fill="hold" nodeType="clickEffect">
+                                  <p:stCondLst>
+                                    <p:cond delay="0"/>
+                                  </p:stCondLst>
+                                  <p:childTnLst>
+                                    <p:set>
+                                      <p:cBhvr>
+                                        <p:cTn id="6" dur="1" fill="hold">
+                                          <p:stCondLst>
+                                            <p:cond delay="0"/>
+                                          </p:stCondLst>
+                                        </p:cTn>
+                                        <p:tgtEl>
+                                          <p:spTgt spid="6"/>
+                                        </p:tgtEl>
+                                        <p:attrNameLst>
+                                          <p:attrName>style.visibility</p:attrName>
+                                        </p:attrNameLst>
+                                      </p:cBhvr>
+                                      <p:to>
+                                        <p:strVal val="visible"/>
+                                      </p:to>
+                                    </p:set>
+                                    <p:animEffect transition="in" filter="blinds(horizontal)">
+                                      <p:cBhvr>
+                                        <p:cTn id="7" dur="500"/>
+                                        <p:tgtEl>
+                                          <p:spTgt spid="6"/>
+                                        </p:tgtEl>
+                                      </p:cBhvr>
+                                    </p:animEffect>
+                                  </p:childTnLst>
+                                </p:cTn>
+                              </p:par>
+                              <p:par>
+                                <p:cTn id="8" presetID="3" presetClass="entr" presetSubtype="10" fill="hold" nodeType="withEffect">
+                                  <p:stCondLst>
+                                    <p:cond delay="0"/>
+                                  </p:stCondLst>
+                                  <p:childTnLst>
+                                    <p:set>
+                                      <p:cBhvr>
+                                        <p:cTn id="9" dur="1" fill="hold">
+                                          <p:stCondLst>
+                                            <p:cond delay="0"/>
+                                          </p:stCondLst>
+                                        </p:cTn>
+                                        <p:tgtEl>
+                                          <p:spTgt spid="4"/>
+                                        </p:tgtEl>
+                                        <p:attrNameLst>
+                                          <p:attrName>style.visibility</p:attrName>
+                                        </p:attrNameLst>
+                                      </p:cBhvr>
+                                      <p:to>
+                                        <p:strVal val="visible"/>
+                                      </p:to>
+                                    </p:set>
+                                    <p:animEffect transition="in" filter="blinds(horizontal)">
+                                      <p:cBhvr>
+                                        <p:cTn id="10" dur="500"/>
+                                        <p:tgtEl>
+                                          <p:spTgt spid="4"/>
+                                        </p:tgtEl>
+                                      </p:cBhvr>
+                                    </p:animEffect>
+                                  </p:childTnLst>
+                                </p:cTn>
+                              </p:par>
+                            </p:childTnLst>
+                          </p:cTn>
+                        </p:par>
+                      </p:childTnLst>
+                    </p:cTn>
+                  </p:par>
+                </p:childTnLst>
+              </p:cTn>
+              <p:prevCondLst>
+                <p:cond evt="onPrev" delay="0">
+                  <p:tgtEl>
+                    <p:sldTgt/>
+                  </p:tgtEl>
+                </p:cond>
+              </p:prevCondLst>
+              <p:nextCondLst>
+                <p:cond evt="onNext" delay="0">
+                  <p:tgtEl>
+                    <p:sldTgt/>
+                  </p:tgtEl>
+                </p:cond>
+              </p:nextCondLst>
+            </p:seq>
+          </p:childTnLst>
+        </p:cTn>
+      </p:par>
+    </p:tnLst>
+  </p:timing>
 </p:sld>
 </file>
 
@@ -8554,6 +8709,13 @@
   <p:clrMapOvr>
     <a:masterClrMapping/>
   </p:clrMapOvr>
+  <p:timing>
+    <p:tnLst>
+      <p:par>
+        <p:cTn xmlns:p14="http://schemas.microsoft.com/office/powerpoint/2010/main" id="1" dur="indefinite" restart="never" nodeType="tmRoot"/>
+      </p:par>
+    </p:tnLst>
+  </p:timing>
 </p:sld>
 </file>
 
@@ -8623,7 +8785,7 @@
         </p:blipFill>
         <p:spPr>
           <a:xfrm>
-            <a:off x="2067660" y="2625184"/>
+            <a:off x="2067660" y="2652796"/>
             <a:ext cx="4669115" cy="3753066"/>
           </a:xfrm>
           <a:prstGeom prst="rect">
@@ -8664,6 +8826,13 @@
   <p:clrMapOvr>
     <a:masterClrMapping/>
   </p:clrMapOvr>
+  <p:timing>
+    <p:tnLst>
+      <p:par>
+        <p:cTn xmlns:p14="http://schemas.microsoft.com/office/powerpoint/2010/main" id="1" dur="indefinite" restart="never" nodeType="tmRoot"/>
+      </p:par>
+    </p:tnLst>
+  </p:timing>
 </p:sld>
 </file>
 
@@ -8820,6 +8989,13 @@
   <p:clrMapOvr>
     <a:masterClrMapping/>
   </p:clrMapOvr>
+  <p:timing>
+    <p:tnLst>
+      <p:par>
+        <p:cTn xmlns:p14="http://schemas.microsoft.com/office/powerpoint/2010/main" id="1" dur="indefinite" restart="never" nodeType="tmRoot"/>
+      </p:par>
+    </p:tnLst>
+  </p:timing>
 </p:sld>
 </file>
 
@@ -8930,6 +9106,13 @@
   <p:clrMapOvr>
     <a:masterClrMapping/>
   </p:clrMapOvr>
+  <p:timing>
+    <p:tnLst>
+      <p:par>
+        <p:cTn xmlns:p14="http://schemas.microsoft.com/office/powerpoint/2010/main" id="1" dur="indefinite" restart="never" nodeType="tmRoot"/>
+      </p:par>
+    </p:tnLst>
+  </p:timing>
 </p:sld>
 </file>
 
@@ -9086,7 +9269,7 @@
   <p:timing>
     <p:tnLst>
       <p:par>
-        <p:cTn id="1" dur="indefinite" restart="never" nodeType="tmRoot">
+        <p:cTn xmlns:p14="http://schemas.microsoft.com/office/powerpoint/2010/main" id="1" dur="indefinite" restart="never" nodeType="tmRoot">
           <p:childTnLst>
             <p:seq concurrent="1" nextAc="seek">
               <p:cTn id="2" dur="indefinite" nodeType="mainSeq">
@@ -9798,7 +9981,7 @@
     </a:clrScheme>
     <a:fontScheme name="Office">
       <a:majorFont>
-        <a:latin typeface="Calibri Light" panose="020F0302020204030204"/>
+        <a:latin typeface="Calibri Light"/>
         <a:ea typeface=""/>
         <a:cs typeface=""/>
         <a:font script="Jpan" typeface="游ゴシック Light"/>
@@ -9850,7 +10033,7 @@
         <a:font script="Tfng" typeface="Ebrima"/>
       </a:majorFont>
       <a:minorFont>
-        <a:latin typeface="Calibri" panose="020F0502020204030204"/>
+        <a:latin typeface="Calibri"/>
         <a:ea typeface=""/>
         <a:cs typeface=""/>
         <a:font script="Jpan" typeface="游ゴシック"/>
@@ -10044,7 +10227,7 @@
   <a:extraClrSchemeLst/>
   <a:extLst>
     <a:ext uri="{05A4C25C-085E-4340-85A3-A5531E510DB2}">
-      <thm15:themeFamily xmlns:thm15="http://schemas.microsoft.com/office/thememl/2012/main" name="Office Theme" id="{62F939B6-93AF-4DB8-9C6B-D6C7DFDC589F}" vid="{4A3C46E8-61CC-4603-A589-7422A47A8E4A}"/>
+      <thm15:themeFamily xmlns:thm15="http://schemas.microsoft.com/office/thememl/2012/main" xmlns="" name="Office Theme" id="{62F939B6-93AF-4DB8-9C6B-D6C7DFDC589F}" vid="{4A3C46E8-61CC-4603-A589-7422A47A8E4A}"/>
     </a:ext>
   </a:extLst>
 </a:theme>

</xml_diff>